<commit_message>
added more slides to day 1
</commit_message>
<xml_diff>
--- a/Presentations/Day 1.pptx
+++ b/Presentations/Day 1.pptx
@@ -5,7 +5,7 @@
     <p:sldMasterId id="2147483648" r:id="rId1"/>
   </p:sldMasterIdLst>
   <p:notesMasterIdLst>
-    <p:notesMasterId r:id="rId10"/>
+    <p:notesMasterId r:id="rId11"/>
   </p:notesMasterIdLst>
   <p:sldIdLst>
     <p:sldId id="256" r:id="rId2"/>
@@ -14,8 +14,9 @@
     <p:sldId id="259" r:id="rId5"/>
     <p:sldId id="260" r:id="rId6"/>
     <p:sldId id="263" r:id="rId7"/>
-    <p:sldId id="261" r:id="rId8"/>
-    <p:sldId id="262" r:id="rId9"/>
+    <p:sldId id="264" r:id="rId8"/>
+    <p:sldId id="261" r:id="rId9"/>
+    <p:sldId id="262" r:id="rId10"/>
   </p:sldIdLst>
   <p:sldSz cx="12192000" cy="6858000"/>
   <p:notesSz cx="6858000" cy="9144000"/>
@@ -118,6 +119,753 @@
 </file>
 
 <file path=ppt/diagrams/colors1.xml><?xml version="1.0" encoding="utf-8"?>
+<dgm:colorsDef xmlns:dgm="http://schemas.openxmlformats.org/drawingml/2006/diagram" xmlns:a="http://schemas.openxmlformats.org/drawingml/2006/main" uniqueId="urn:microsoft.com/office/officeart/2005/8/colors/accent1_2">
+  <dgm:title val=""/>
+  <dgm:desc val=""/>
+  <dgm:catLst>
+    <dgm:cat type="accent1" pri="11200"/>
+  </dgm:catLst>
+  <dgm:styleLbl name="node0">
+    <dgm:fillClrLst meth="repeat">
+      <a:schemeClr val="accent1"/>
+    </dgm:fillClrLst>
+    <dgm:linClrLst meth="repeat">
+      <a:schemeClr val="lt1"/>
+    </dgm:linClrLst>
+    <dgm:effectClrLst/>
+    <dgm:txLinClrLst/>
+    <dgm:txFillClrLst/>
+    <dgm:txEffectClrLst/>
+  </dgm:styleLbl>
+  <dgm:styleLbl name="alignNode1">
+    <dgm:fillClrLst meth="repeat">
+      <a:schemeClr val="accent1"/>
+    </dgm:fillClrLst>
+    <dgm:linClrLst meth="repeat">
+      <a:schemeClr val="accent1"/>
+    </dgm:linClrLst>
+    <dgm:effectClrLst/>
+    <dgm:txLinClrLst/>
+    <dgm:txFillClrLst/>
+    <dgm:txEffectClrLst/>
+  </dgm:styleLbl>
+  <dgm:styleLbl name="node1">
+    <dgm:fillClrLst meth="repeat">
+      <a:schemeClr val="accent1"/>
+    </dgm:fillClrLst>
+    <dgm:linClrLst meth="repeat">
+      <a:schemeClr val="lt1"/>
+    </dgm:linClrLst>
+    <dgm:effectClrLst/>
+    <dgm:txLinClrLst/>
+    <dgm:txFillClrLst/>
+    <dgm:txEffectClrLst/>
+  </dgm:styleLbl>
+  <dgm:styleLbl name="lnNode1">
+    <dgm:fillClrLst meth="repeat">
+      <a:schemeClr val="accent1"/>
+    </dgm:fillClrLst>
+    <dgm:linClrLst meth="repeat">
+      <a:schemeClr val="lt1"/>
+    </dgm:linClrLst>
+    <dgm:effectClrLst/>
+    <dgm:txLinClrLst/>
+    <dgm:txFillClrLst/>
+    <dgm:txEffectClrLst/>
+  </dgm:styleLbl>
+  <dgm:styleLbl name="vennNode1">
+    <dgm:fillClrLst meth="repeat">
+      <a:schemeClr val="accent1">
+        <a:alpha val="50000"/>
+      </a:schemeClr>
+    </dgm:fillClrLst>
+    <dgm:linClrLst meth="repeat">
+      <a:schemeClr val="lt1"/>
+    </dgm:linClrLst>
+    <dgm:effectClrLst/>
+    <dgm:txLinClrLst/>
+    <dgm:txFillClrLst/>
+    <dgm:txEffectClrLst/>
+  </dgm:styleLbl>
+  <dgm:styleLbl name="node2">
+    <dgm:fillClrLst meth="repeat">
+      <a:schemeClr val="accent1"/>
+    </dgm:fillClrLst>
+    <dgm:linClrLst meth="repeat">
+      <a:schemeClr val="lt1"/>
+    </dgm:linClrLst>
+    <dgm:effectClrLst/>
+    <dgm:txLinClrLst/>
+    <dgm:txFillClrLst/>
+    <dgm:txEffectClrLst/>
+  </dgm:styleLbl>
+  <dgm:styleLbl name="node3">
+    <dgm:fillClrLst meth="repeat">
+      <a:schemeClr val="accent1"/>
+    </dgm:fillClrLst>
+    <dgm:linClrLst meth="repeat">
+      <a:schemeClr val="lt1"/>
+    </dgm:linClrLst>
+    <dgm:effectClrLst/>
+    <dgm:txLinClrLst/>
+    <dgm:txFillClrLst/>
+    <dgm:txEffectClrLst/>
+  </dgm:styleLbl>
+  <dgm:styleLbl name="node4">
+    <dgm:fillClrLst meth="repeat">
+      <a:schemeClr val="accent1"/>
+    </dgm:fillClrLst>
+    <dgm:linClrLst meth="repeat">
+      <a:schemeClr val="lt1"/>
+    </dgm:linClrLst>
+    <dgm:effectClrLst/>
+    <dgm:txLinClrLst/>
+    <dgm:txFillClrLst/>
+    <dgm:txEffectClrLst/>
+  </dgm:styleLbl>
+  <dgm:styleLbl name="fgImgPlace1">
+    <dgm:fillClrLst meth="repeat">
+      <a:schemeClr val="accent1">
+        <a:tint val="50000"/>
+      </a:schemeClr>
+    </dgm:fillClrLst>
+    <dgm:linClrLst meth="repeat">
+      <a:schemeClr val="lt1"/>
+    </dgm:linClrLst>
+    <dgm:effectClrLst/>
+    <dgm:txLinClrLst/>
+    <dgm:txFillClrLst meth="repeat">
+      <a:schemeClr val="lt1"/>
+    </dgm:txFillClrLst>
+    <dgm:txEffectClrLst/>
+  </dgm:styleLbl>
+  <dgm:styleLbl name="alignImgPlace1">
+    <dgm:fillClrLst meth="repeat">
+      <a:schemeClr val="accent1">
+        <a:tint val="50000"/>
+      </a:schemeClr>
+    </dgm:fillClrLst>
+    <dgm:linClrLst meth="repeat">
+      <a:schemeClr val="lt1"/>
+    </dgm:linClrLst>
+    <dgm:effectClrLst/>
+    <dgm:txLinClrLst/>
+    <dgm:txFillClrLst meth="repeat">
+      <a:schemeClr val="lt1"/>
+    </dgm:txFillClrLst>
+    <dgm:txEffectClrLst/>
+  </dgm:styleLbl>
+  <dgm:styleLbl name="bgImgPlace1">
+    <dgm:fillClrLst meth="repeat">
+      <a:schemeClr val="accent1">
+        <a:tint val="50000"/>
+      </a:schemeClr>
+    </dgm:fillClrLst>
+    <dgm:linClrLst meth="repeat">
+      <a:schemeClr val="lt1"/>
+    </dgm:linClrLst>
+    <dgm:effectClrLst/>
+    <dgm:txLinClrLst/>
+    <dgm:txFillClrLst meth="repeat">
+      <a:schemeClr val="lt1"/>
+    </dgm:txFillClrLst>
+    <dgm:txEffectClrLst/>
+  </dgm:styleLbl>
+  <dgm:styleLbl name="sibTrans2D1">
+    <dgm:fillClrLst meth="repeat">
+      <a:schemeClr val="accent1">
+        <a:tint val="60000"/>
+      </a:schemeClr>
+    </dgm:fillClrLst>
+    <dgm:linClrLst meth="repeat">
+      <a:schemeClr val="accent1">
+        <a:tint val="60000"/>
+      </a:schemeClr>
+    </dgm:linClrLst>
+    <dgm:effectClrLst/>
+    <dgm:txLinClrLst/>
+    <dgm:txFillClrLst/>
+    <dgm:txEffectClrLst/>
+  </dgm:styleLbl>
+  <dgm:styleLbl name="fgSibTrans2D1">
+    <dgm:fillClrLst meth="repeat">
+      <a:schemeClr val="accent1">
+        <a:tint val="60000"/>
+      </a:schemeClr>
+    </dgm:fillClrLst>
+    <dgm:linClrLst meth="repeat">
+      <a:schemeClr val="accent1">
+        <a:tint val="60000"/>
+      </a:schemeClr>
+    </dgm:linClrLst>
+    <dgm:effectClrLst/>
+    <dgm:txLinClrLst/>
+    <dgm:txFillClrLst/>
+    <dgm:txEffectClrLst/>
+  </dgm:styleLbl>
+  <dgm:styleLbl name="bgSibTrans2D1">
+    <dgm:fillClrLst meth="repeat">
+      <a:schemeClr val="accent1">
+        <a:tint val="60000"/>
+      </a:schemeClr>
+    </dgm:fillClrLst>
+    <dgm:linClrLst meth="repeat">
+      <a:schemeClr val="accent1">
+        <a:tint val="60000"/>
+      </a:schemeClr>
+    </dgm:linClrLst>
+    <dgm:effectClrLst/>
+    <dgm:txLinClrLst/>
+    <dgm:txFillClrLst/>
+    <dgm:txEffectClrLst/>
+  </dgm:styleLbl>
+  <dgm:styleLbl name="sibTrans1D1">
+    <dgm:fillClrLst meth="repeat">
+      <a:schemeClr val="accent1"/>
+    </dgm:fillClrLst>
+    <dgm:linClrLst meth="repeat">
+      <a:schemeClr val="accent1"/>
+    </dgm:linClrLst>
+    <dgm:effectClrLst/>
+    <dgm:txLinClrLst/>
+    <dgm:txFillClrLst meth="repeat">
+      <a:schemeClr val="tx1"/>
+    </dgm:txFillClrLst>
+    <dgm:txEffectClrLst/>
+  </dgm:styleLbl>
+  <dgm:styleLbl name="callout">
+    <dgm:fillClrLst meth="repeat">
+      <a:schemeClr val="accent1"/>
+    </dgm:fillClrLst>
+    <dgm:linClrLst meth="repeat">
+      <a:schemeClr val="accent1">
+        <a:tint val="50000"/>
+      </a:schemeClr>
+    </dgm:linClrLst>
+    <dgm:effectClrLst/>
+    <dgm:txLinClrLst/>
+    <dgm:txFillClrLst meth="repeat">
+      <a:schemeClr val="tx1"/>
+    </dgm:txFillClrLst>
+    <dgm:txEffectClrLst/>
+  </dgm:styleLbl>
+  <dgm:styleLbl name="asst0">
+    <dgm:fillClrLst meth="repeat">
+      <a:schemeClr val="accent1"/>
+    </dgm:fillClrLst>
+    <dgm:linClrLst meth="repeat">
+      <a:schemeClr val="lt1"/>
+    </dgm:linClrLst>
+    <dgm:effectClrLst/>
+    <dgm:txLinClrLst/>
+    <dgm:txFillClrLst/>
+    <dgm:txEffectClrLst/>
+  </dgm:styleLbl>
+  <dgm:styleLbl name="asst1">
+    <dgm:fillClrLst meth="repeat">
+      <a:schemeClr val="accent1"/>
+    </dgm:fillClrLst>
+    <dgm:linClrLst meth="repeat">
+      <a:schemeClr val="lt1"/>
+    </dgm:linClrLst>
+    <dgm:effectClrLst/>
+    <dgm:txLinClrLst/>
+    <dgm:txFillClrLst/>
+    <dgm:txEffectClrLst/>
+  </dgm:styleLbl>
+  <dgm:styleLbl name="asst2">
+    <dgm:fillClrLst meth="repeat">
+      <a:schemeClr val="accent1"/>
+    </dgm:fillClrLst>
+    <dgm:linClrLst meth="repeat">
+      <a:schemeClr val="lt1"/>
+    </dgm:linClrLst>
+    <dgm:effectClrLst/>
+    <dgm:txLinClrLst/>
+    <dgm:txFillClrLst/>
+    <dgm:txEffectClrLst/>
+  </dgm:styleLbl>
+  <dgm:styleLbl name="asst3">
+    <dgm:fillClrLst meth="repeat">
+      <a:schemeClr val="accent1"/>
+    </dgm:fillClrLst>
+    <dgm:linClrLst meth="repeat">
+      <a:schemeClr val="lt1"/>
+    </dgm:linClrLst>
+    <dgm:effectClrLst/>
+    <dgm:txLinClrLst/>
+    <dgm:txFillClrLst/>
+    <dgm:txEffectClrLst/>
+  </dgm:styleLbl>
+  <dgm:styleLbl name="asst4">
+    <dgm:fillClrLst meth="repeat">
+      <a:schemeClr val="accent1"/>
+    </dgm:fillClrLst>
+    <dgm:linClrLst meth="repeat">
+      <a:schemeClr val="lt1"/>
+    </dgm:linClrLst>
+    <dgm:effectClrLst/>
+    <dgm:txLinClrLst/>
+    <dgm:txFillClrLst/>
+    <dgm:txEffectClrLst/>
+  </dgm:styleLbl>
+  <dgm:styleLbl name="parChTrans2D1">
+    <dgm:fillClrLst meth="repeat">
+      <a:schemeClr val="accent1">
+        <a:tint val="60000"/>
+      </a:schemeClr>
+    </dgm:fillClrLst>
+    <dgm:linClrLst meth="repeat">
+      <a:schemeClr val="accent1">
+        <a:tint val="60000"/>
+      </a:schemeClr>
+    </dgm:linClrLst>
+    <dgm:effectClrLst/>
+    <dgm:txLinClrLst/>
+    <dgm:txFillClrLst meth="repeat">
+      <a:schemeClr val="lt1"/>
+    </dgm:txFillClrLst>
+    <dgm:txEffectClrLst/>
+  </dgm:styleLbl>
+  <dgm:styleLbl name="parChTrans2D2">
+    <dgm:fillClrLst meth="repeat">
+      <a:schemeClr val="accent1"/>
+    </dgm:fillClrLst>
+    <dgm:linClrLst meth="repeat">
+      <a:schemeClr val="accent1"/>
+    </dgm:linClrLst>
+    <dgm:effectClrLst/>
+    <dgm:txLinClrLst/>
+    <dgm:txFillClrLst meth="repeat">
+      <a:schemeClr val="lt1"/>
+    </dgm:txFillClrLst>
+    <dgm:txEffectClrLst/>
+  </dgm:styleLbl>
+  <dgm:styleLbl name="parChTrans2D3">
+    <dgm:fillClrLst meth="repeat">
+      <a:schemeClr val="accent1"/>
+    </dgm:fillClrLst>
+    <dgm:linClrLst meth="repeat">
+      <a:schemeClr val="accent1"/>
+    </dgm:linClrLst>
+    <dgm:effectClrLst/>
+    <dgm:txLinClrLst/>
+    <dgm:txFillClrLst meth="repeat">
+      <a:schemeClr val="lt1"/>
+    </dgm:txFillClrLst>
+    <dgm:txEffectClrLst/>
+  </dgm:styleLbl>
+  <dgm:styleLbl name="parChTrans2D4">
+    <dgm:fillClrLst meth="repeat">
+      <a:schemeClr val="accent1"/>
+    </dgm:fillClrLst>
+    <dgm:linClrLst meth="repeat">
+      <a:schemeClr val="accent1"/>
+    </dgm:linClrLst>
+    <dgm:effectClrLst/>
+    <dgm:txLinClrLst/>
+    <dgm:txFillClrLst meth="repeat">
+      <a:schemeClr val="lt1"/>
+    </dgm:txFillClrLst>
+    <dgm:txEffectClrLst/>
+  </dgm:styleLbl>
+  <dgm:styleLbl name="parChTrans1D1">
+    <dgm:fillClrLst meth="repeat">
+      <a:schemeClr val="accent1"/>
+    </dgm:fillClrLst>
+    <dgm:linClrLst meth="repeat">
+      <a:schemeClr val="accent1">
+        <a:shade val="60000"/>
+      </a:schemeClr>
+    </dgm:linClrLst>
+    <dgm:effectClrLst/>
+    <dgm:txLinClrLst/>
+    <dgm:txFillClrLst meth="repeat">
+      <a:schemeClr val="tx1"/>
+    </dgm:txFillClrLst>
+    <dgm:txEffectClrLst/>
+  </dgm:styleLbl>
+  <dgm:styleLbl name="parChTrans1D2">
+    <dgm:fillClrLst meth="repeat">
+      <a:schemeClr val="accent1"/>
+    </dgm:fillClrLst>
+    <dgm:linClrLst meth="repeat">
+      <a:schemeClr val="accent1">
+        <a:shade val="60000"/>
+      </a:schemeClr>
+    </dgm:linClrLst>
+    <dgm:effectClrLst/>
+    <dgm:txLinClrLst/>
+    <dgm:txFillClrLst meth="repeat">
+      <a:schemeClr val="tx1"/>
+    </dgm:txFillClrLst>
+    <dgm:txEffectClrLst/>
+  </dgm:styleLbl>
+  <dgm:styleLbl name="parChTrans1D3">
+    <dgm:fillClrLst meth="repeat">
+      <a:schemeClr val="accent1"/>
+    </dgm:fillClrLst>
+    <dgm:linClrLst meth="repeat">
+      <a:schemeClr val="accent1">
+        <a:shade val="80000"/>
+      </a:schemeClr>
+    </dgm:linClrLst>
+    <dgm:effectClrLst/>
+    <dgm:txLinClrLst/>
+    <dgm:txFillClrLst meth="repeat">
+      <a:schemeClr val="tx1"/>
+    </dgm:txFillClrLst>
+    <dgm:txEffectClrLst/>
+  </dgm:styleLbl>
+  <dgm:styleLbl name="parChTrans1D4">
+    <dgm:fillClrLst meth="repeat">
+      <a:schemeClr val="accent1"/>
+    </dgm:fillClrLst>
+    <dgm:linClrLst meth="repeat">
+      <a:schemeClr val="accent1">
+        <a:shade val="80000"/>
+      </a:schemeClr>
+    </dgm:linClrLst>
+    <dgm:effectClrLst/>
+    <dgm:txLinClrLst/>
+    <dgm:txFillClrLst meth="repeat">
+      <a:schemeClr val="tx1"/>
+    </dgm:txFillClrLst>
+    <dgm:txEffectClrLst/>
+  </dgm:styleLbl>
+  <dgm:styleLbl name="fgAcc1">
+    <dgm:fillClrLst meth="repeat">
+      <a:schemeClr val="lt1">
+        <a:alpha val="90000"/>
+      </a:schemeClr>
+    </dgm:fillClrLst>
+    <dgm:linClrLst meth="repeat">
+      <a:schemeClr val="accent1"/>
+    </dgm:linClrLst>
+    <dgm:effectClrLst/>
+    <dgm:txLinClrLst/>
+    <dgm:txFillClrLst meth="repeat">
+      <a:schemeClr val="dk1"/>
+    </dgm:txFillClrLst>
+    <dgm:txEffectClrLst/>
+  </dgm:styleLbl>
+  <dgm:styleLbl name="conFgAcc1">
+    <dgm:fillClrLst meth="repeat">
+      <a:schemeClr val="lt1">
+        <a:alpha val="90000"/>
+      </a:schemeClr>
+    </dgm:fillClrLst>
+    <dgm:linClrLst meth="repeat">
+      <a:schemeClr val="accent1"/>
+    </dgm:linClrLst>
+    <dgm:effectClrLst/>
+    <dgm:txLinClrLst/>
+    <dgm:txFillClrLst meth="repeat">
+      <a:schemeClr val="dk1"/>
+    </dgm:txFillClrLst>
+    <dgm:txEffectClrLst/>
+  </dgm:styleLbl>
+  <dgm:styleLbl name="alignAcc1">
+    <dgm:fillClrLst meth="repeat">
+      <a:schemeClr val="lt1">
+        <a:alpha val="90000"/>
+      </a:schemeClr>
+    </dgm:fillClrLst>
+    <dgm:linClrLst meth="repeat">
+      <a:schemeClr val="accent1"/>
+    </dgm:linClrLst>
+    <dgm:effectClrLst/>
+    <dgm:txLinClrLst/>
+    <dgm:txFillClrLst meth="repeat">
+      <a:schemeClr val="dk1"/>
+    </dgm:txFillClrLst>
+    <dgm:txEffectClrLst/>
+  </dgm:styleLbl>
+  <dgm:styleLbl name="trAlignAcc1">
+    <dgm:fillClrLst meth="repeat">
+      <a:schemeClr val="lt1">
+        <a:alpha val="40000"/>
+      </a:schemeClr>
+    </dgm:fillClrLst>
+    <dgm:linClrLst meth="repeat">
+      <a:schemeClr val="accent1"/>
+    </dgm:linClrLst>
+    <dgm:effectClrLst/>
+    <dgm:txLinClrLst/>
+    <dgm:txFillClrLst meth="repeat">
+      <a:schemeClr val="dk1"/>
+    </dgm:txFillClrLst>
+    <dgm:txEffectClrLst/>
+  </dgm:styleLbl>
+  <dgm:styleLbl name="bgAcc1">
+    <dgm:fillClrLst meth="repeat">
+      <a:schemeClr val="lt1">
+        <a:alpha val="90000"/>
+      </a:schemeClr>
+    </dgm:fillClrLst>
+    <dgm:linClrLst meth="repeat">
+      <a:schemeClr val="accent1"/>
+    </dgm:linClrLst>
+    <dgm:effectClrLst/>
+    <dgm:txLinClrLst/>
+    <dgm:txFillClrLst meth="repeat">
+      <a:schemeClr val="dk1"/>
+    </dgm:txFillClrLst>
+    <dgm:txEffectClrLst/>
+  </dgm:styleLbl>
+  <dgm:styleLbl name="solidFgAcc1">
+    <dgm:fillClrLst meth="repeat">
+      <a:schemeClr val="lt1"/>
+    </dgm:fillClrLst>
+    <dgm:linClrLst meth="repeat">
+      <a:schemeClr val="accent1"/>
+    </dgm:linClrLst>
+    <dgm:effectClrLst/>
+    <dgm:txLinClrLst/>
+    <dgm:txFillClrLst meth="repeat">
+      <a:schemeClr val="dk1"/>
+    </dgm:txFillClrLst>
+    <dgm:txEffectClrLst/>
+  </dgm:styleLbl>
+  <dgm:styleLbl name="solidAlignAcc1">
+    <dgm:fillClrLst meth="repeat">
+      <a:schemeClr val="lt1"/>
+    </dgm:fillClrLst>
+    <dgm:linClrLst meth="repeat">
+      <a:schemeClr val="accent1"/>
+    </dgm:linClrLst>
+    <dgm:effectClrLst/>
+    <dgm:txLinClrLst/>
+    <dgm:txFillClrLst meth="repeat">
+      <a:schemeClr val="dk1"/>
+    </dgm:txFillClrLst>
+    <dgm:txEffectClrLst/>
+  </dgm:styleLbl>
+  <dgm:styleLbl name="solidBgAcc1">
+    <dgm:fillClrLst meth="repeat">
+      <a:schemeClr val="lt1"/>
+    </dgm:fillClrLst>
+    <dgm:linClrLst meth="repeat">
+      <a:schemeClr val="accent1"/>
+    </dgm:linClrLst>
+    <dgm:effectClrLst/>
+    <dgm:txLinClrLst/>
+    <dgm:txFillClrLst meth="repeat">
+      <a:schemeClr val="dk1"/>
+    </dgm:txFillClrLst>
+    <dgm:txEffectClrLst/>
+  </dgm:styleLbl>
+  <dgm:styleLbl name="fgAccFollowNode1">
+    <dgm:fillClrLst meth="repeat">
+      <a:schemeClr val="accent1">
+        <a:alpha val="90000"/>
+        <a:tint val="40000"/>
+      </a:schemeClr>
+    </dgm:fillClrLst>
+    <dgm:linClrLst meth="repeat">
+      <a:schemeClr val="accent1">
+        <a:alpha val="90000"/>
+        <a:tint val="40000"/>
+      </a:schemeClr>
+    </dgm:linClrLst>
+    <dgm:effectClrLst/>
+    <dgm:txLinClrLst/>
+    <dgm:txFillClrLst meth="repeat">
+      <a:schemeClr val="dk1"/>
+    </dgm:txFillClrLst>
+    <dgm:txEffectClrLst/>
+  </dgm:styleLbl>
+  <dgm:styleLbl name="alignAccFollowNode1">
+    <dgm:fillClrLst meth="repeat">
+      <a:schemeClr val="accent1">
+        <a:alpha val="90000"/>
+        <a:tint val="40000"/>
+      </a:schemeClr>
+    </dgm:fillClrLst>
+    <dgm:linClrLst meth="repeat">
+      <a:schemeClr val="accent1">
+        <a:alpha val="90000"/>
+        <a:tint val="40000"/>
+      </a:schemeClr>
+    </dgm:linClrLst>
+    <dgm:effectClrLst/>
+    <dgm:txLinClrLst/>
+    <dgm:txFillClrLst meth="repeat">
+      <a:schemeClr val="dk1"/>
+    </dgm:txFillClrLst>
+    <dgm:txEffectClrLst/>
+  </dgm:styleLbl>
+  <dgm:styleLbl name="bgAccFollowNode1">
+    <dgm:fillClrLst meth="repeat">
+      <a:schemeClr val="accent1">
+        <a:alpha val="90000"/>
+        <a:tint val="40000"/>
+      </a:schemeClr>
+    </dgm:fillClrLst>
+    <dgm:linClrLst meth="repeat">
+      <a:schemeClr val="accent1">
+        <a:alpha val="90000"/>
+        <a:tint val="40000"/>
+      </a:schemeClr>
+    </dgm:linClrLst>
+    <dgm:effectClrLst/>
+    <dgm:txLinClrLst/>
+    <dgm:txFillClrLst meth="repeat">
+      <a:schemeClr val="dk1"/>
+    </dgm:txFillClrLst>
+    <dgm:txEffectClrLst/>
+  </dgm:styleLbl>
+  <dgm:styleLbl name="fgAcc0">
+    <dgm:fillClrLst meth="repeat">
+      <a:schemeClr val="lt1">
+        <a:alpha val="90000"/>
+      </a:schemeClr>
+    </dgm:fillClrLst>
+    <dgm:linClrLst meth="repeat">
+      <a:schemeClr val="accent1"/>
+    </dgm:linClrLst>
+    <dgm:effectClrLst/>
+    <dgm:txLinClrLst/>
+    <dgm:txFillClrLst meth="repeat">
+      <a:schemeClr val="dk1"/>
+    </dgm:txFillClrLst>
+    <dgm:txEffectClrLst/>
+  </dgm:styleLbl>
+  <dgm:styleLbl name="fgAcc2">
+    <dgm:fillClrLst meth="repeat">
+      <a:schemeClr val="lt1">
+        <a:alpha val="90000"/>
+      </a:schemeClr>
+    </dgm:fillClrLst>
+    <dgm:linClrLst meth="repeat">
+      <a:schemeClr val="accent1"/>
+    </dgm:linClrLst>
+    <dgm:effectClrLst/>
+    <dgm:txLinClrLst/>
+    <dgm:txFillClrLst meth="repeat">
+      <a:schemeClr val="dk1"/>
+    </dgm:txFillClrLst>
+    <dgm:txEffectClrLst/>
+  </dgm:styleLbl>
+  <dgm:styleLbl name="fgAcc3">
+    <dgm:fillClrLst meth="repeat">
+      <a:schemeClr val="lt1">
+        <a:alpha val="90000"/>
+      </a:schemeClr>
+    </dgm:fillClrLst>
+    <dgm:linClrLst meth="repeat">
+      <a:schemeClr val="accent1"/>
+    </dgm:linClrLst>
+    <dgm:effectClrLst/>
+    <dgm:txLinClrLst/>
+    <dgm:txFillClrLst meth="repeat">
+      <a:schemeClr val="dk1"/>
+    </dgm:txFillClrLst>
+    <dgm:txEffectClrLst/>
+  </dgm:styleLbl>
+  <dgm:styleLbl name="fgAcc4">
+    <dgm:fillClrLst meth="repeat">
+      <a:schemeClr val="lt1">
+        <a:alpha val="90000"/>
+      </a:schemeClr>
+    </dgm:fillClrLst>
+    <dgm:linClrLst meth="repeat">
+      <a:schemeClr val="accent1"/>
+    </dgm:linClrLst>
+    <dgm:effectClrLst/>
+    <dgm:txLinClrLst/>
+    <dgm:txFillClrLst meth="repeat">
+      <a:schemeClr val="dk1"/>
+    </dgm:txFillClrLst>
+    <dgm:txEffectClrLst/>
+  </dgm:styleLbl>
+  <dgm:styleLbl name="bgShp">
+    <dgm:fillClrLst meth="repeat">
+      <a:schemeClr val="accent1">
+        <a:tint val="40000"/>
+      </a:schemeClr>
+    </dgm:fillClrLst>
+    <dgm:linClrLst meth="repeat">
+      <a:schemeClr val="accent1"/>
+    </dgm:linClrLst>
+    <dgm:effectClrLst/>
+    <dgm:txLinClrLst/>
+    <dgm:txFillClrLst meth="repeat">
+      <a:schemeClr val="dk1"/>
+    </dgm:txFillClrLst>
+    <dgm:txEffectClrLst/>
+  </dgm:styleLbl>
+  <dgm:styleLbl name="dkBgShp">
+    <dgm:fillClrLst meth="repeat">
+      <a:schemeClr val="accent1">
+        <a:shade val="80000"/>
+      </a:schemeClr>
+    </dgm:fillClrLst>
+    <dgm:linClrLst meth="repeat">
+      <a:schemeClr val="accent1"/>
+    </dgm:linClrLst>
+    <dgm:effectClrLst/>
+    <dgm:txLinClrLst/>
+    <dgm:txFillClrLst meth="repeat">
+      <a:schemeClr val="lt1"/>
+    </dgm:txFillClrLst>
+    <dgm:txEffectClrLst/>
+  </dgm:styleLbl>
+  <dgm:styleLbl name="trBgShp">
+    <dgm:fillClrLst meth="repeat">
+      <a:schemeClr val="accent1">
+        <a:tint val="50000"/>
+        <a:alpha val="40000"/>
+      </a:schemeClr>
+    </dgm:fillClrLst>
+    <dgm:linClrLst meth="repeat">
+      <a:schemeClr val="accent1"/>
+    </dgm:linClrLst>
+    <dgm:effectClrLst/>
+    <dgm:txLinClrLst/>
+    <dgm:txFillClrLst meth="repeat">
+      <a:schemeClr val="lt1"/>
+    </dgm:txFillClrLst>
+    <dgm:txEffectClrLst/>
+  </dgm:styleLbl>
+  <dgm:styleLbl name="fgShp">
+    <dgm:fillClrLst meth="repeat">
+      <a:schemeClr val="accent1">
+        <a:tint val="60000"/>
+      </a:schemeClr>
+    </dgm:fillClrLst>
+    <dgm:linClrLst meth="repeat">
+      <a:schemeClr val="lt1"/>
+    </dgm:linClrLst>
+    <dgm:effectClrLst/>
+    <dgm:txLinClrLst/>
+    <dgm:txFillClrLst meth="repeat">
+      <a:schemeClr val="dk1"/>
+    </dgm:txFillClrLst>
+    <dgm:txEffectClrLst/>
+  </dgm:styleLbl>
+  <dgm:styleLbl name="revTx">
+    <dgm:fillClrLst meth="repeat">
+      <a:schemeClr val="lt1">
+        <a:alpha val="0"/>
+      </a:schemeClr>
+    </dgm:fillClrLst>
+    <dgm:linClrLst meth="repeat">
+      <a:schemeClr val="dk1">
+        <a:alpha val="0"/>
+      </a:schemeClr>
+    </dgm:linClrLst>
+    <dgm:effectClrLst/>
+    <dgm:txLinClrLst/>
+    <dgm:txFillClrLst meth="repeat">
+      <a:schemeClr val="tx1"/>
+    </dgm:txFillClrLst>
+    <dgm:txEffectClrLst/>
+  </dgm:styleLbl>
+</dgm:colorsDef>
+</file>
+
+<file path=ppt/diagrams/colors2.xml><?xml version="1.0" encoding="utf-8"?>
 <dgm:colorsDef xmlns:dgm="http://schemas.openxmlformats.org/drawingml/2006/diagram" xmlns:a="http://schemas.openxmlformats.org/drawingml/2006/main" uniqueId="urn:microsoft.com/office/officeart/2005/8/colors/accent1_2">
   <dgm:title val=""/>
   <dgm:desc val=""/>
@@ -1269,6 +2017,757 @@
     <dgm:cxn modelId="{0ACD5D7E-26C6-4C0D-8A91-41C3F840D28C}" type="presParOf" srcId="{A7BE4A74-EBDC-4399-A3B4-056ECA949992}" destId="{B49699E1-AA61-49A4-A743-50932894FC9C}" srcOrd="9" destOrd="0" presId="urn:microsoft.com/office/officeart/2005/8/layout/cycle5"/>
     <dgm:cxn modelId="{58BCD24E-736E-4F0B-9541-C85F4162D406}" type="presParOf" srcId="{A7BE4A74-EBDC-4399-A3B4-056ECA949992}" destId="{A0E7481E-4DC7-480B-A2BF-D9A9515EE73A}" srcOrd="10" destOrd="0" presId="urn:microsoft.com/office/officeart/2005/8/layout/cycle5"/>
     <dgm:cxn modelId="{5F512FC2-3166-41E7-A19D-8F87F2848E06}" type="presParOf" srcId="{A7BE4A74-EBDC-4399-A3B4-056ECA949992}" destId="{6D324D13-FB22-4C6C-9420-4942D8096BBA}" srcOrd="11" destOrd="0" presId="urn:microsoft.com/office/officeart/2005/8/layout/cycle5"/>
+  </dgm:cxnLst>
+  <dgm:bg/>
+  <dgm:whole/>
+  <dgm:extLst>
+    <a:ext uri="http://schemas.microsoft.com/office/drawing/2008/diagram">
+      <dsp:dataModelExt xmlns:dsp="http://schemas.microsoft.com/office/drawing/2008/diagram" relId="rId7" minVer="http://schemas.openxmlformats.org/drawingml/2006/diagram"/>
+    </a:ext>
+  </dgm:extLst>
+</dgm:dataModel>
+</file>
+
+<file path=ppt/diagrams/data2.xml><?xml version="1.0" encoding="utf-8"?>
+<dgm:dataModel xmlns:dgm="http://schemas.openxmlformats.org/drawingml/2006/diagram" xmlns:a="http://schemas.openxmlformats.org/drawingml/2006/main">
+  <dgm:ptLst>
+    <dgm:pt modelId="{EF16EF62-5C7D-4636-B8CC-54E821C3C363}" type="doc">
+      <dgm:prSet loTypeId="urn:microsoft.com/office/officeart/2005/8/layout/process1" loCatId="process" qsTypeId="urn:microsoft.com/office/officeart/2005/8/quickstyle/simple1" qsCatId="simple" csTypeId="urn:microsoft.com/office/officeart/2005/8/colors/accent1_2" csCatId="accent1" phldr="1"/>
+      <dgm:spPr/>
+      <dgm:t>
+        <a:bodyPr/>
+        <a:lstStyle/>
+        <a:p>
+          <a:endParaRPr lang="en-GB"/>
+        </a:p>
+      </dgm:t>
+    </dgm:pt>
+    <dgm:pt modelId="{91444C4B-D9F3-4036-9C53-29E661821093}">
+      <dgm:prSet phldrT="[Text]">
+        <dgm:style>
+          <a:lnRef idx="0">
+            <a:schemeClr val="accent1"/>
+          </a:lnRef>
+          <a:fillRef idx="3">
+            <a:schemeClr val="accent1"/>
+          </a:fillRef>
+          <a:effectRef idx="3">
+            <a:schemeClr val="accent1"/>
+          </a:effectRef>
+          <a:fontRef idx="minor">
+            <a:schemeClr val="lt1"/>
+          </a:fontRef>
+        </dgm:style>
+      </dgm:prSet>
+      <dgm:spPr/>
+      <dgm:t>
+        <a:bodyPr/>
+        <a:lstStyle/>
+        <a:p>
+          <a:r>
+            <a:rPr lang="en-US" dirty="0" smtClean="0"/>
+            <a:t>Request</a:t>
+          </a:r>
+          <a:endParaRPr lang="en-GB" dirty="0"/>
+        </a:p>
+      </dgm:t>
+    </dgm:pt>
+    <dgm:pt modelId="{D97BEE88-34B6-492B-A709-93322AD75F5A}" type="parTrans" cxnId="{8F59E69D-EC80-4076-B263-A410C5DA5EDE}">
+      <dgm:prSet/>
+      <dgm:spPr/>
+      <dgm:t>
+        <a:bodyPr/>
+        <a:lstStyle/>
+        <a:p>
+          <a:endParaRPr lang="en-GB"/>
+        </a:p>
+      </dgm:t>
+    </dgm:pt>
+    <dgm:pt modelId="{963ED4E1-14CB-434A-B1D1-A755D048D3B6}" type="sibTrans" cxnId="{8F59E69D-EC80-4076-B263-A410C5DA5EDE}">
+      <dgm:prSet>
+        <dgm:style>
+          <a:lnRef idx="0">
+            <a:schemeClr val="accent5"/>
+          </a:lnRef>
+          <a:fillRef idx="3">
+            <a:schemeClr val="accent5"/>
+          </a:fillRef>
+          <a:effectRef idx="3">
+            <a:schemeClr val="accent5"/>
+          </a:effectRef>
+          <a:fontRef idx="minor">
+            <a:schemeClr val="lt1"/>
+          </a:fontRef>
+        </dgm:style>
+      </dgm:prSet>
+      <dgm:spPr/>
+      <dgm:t>
+        <a:bodyPr/>
+        <a:lstStyle/>
+        <a:p>
+          <a:endParaRPr lang="en-GB"/>
+        </a:p>
+      </dgm:t>
+    </dgm:pt>
+    <dgm:pt modelId="{F1560D04-A30A-4AC1-8B84-26282D9FC351}">
+      <dgm:prSet phldrT="[Text]">
+        <dgm:style>
+          <a:lnRef idx="0">
+            <a:schemeClr val="accent1"/>
+          </a:lnRef>
+          <a:fillRef idx="3">
+            <a:schemeClr val="accent1"/>
+          </a:fillRef>
+          <a:effectRef idx="3">
+            <a:schemeClr val="accent1"/>
+          </a:effectRef>
+          <a:fontRef idx="minor">
+            <a:schemeClr val="lt1"/>
+          </a:fontRef>
+        </dgm:style>
+      </dgm:prSet>
+      <dgm:spPr/>
+      <dgm:t>
+        <a:bodyPr/>
+        <a:lstStyle/>
+        <a:p>
+          <a:r>
+            <a:rPr lang="en-US" dirty="0" smtClean="0"/>
+            <a:t>MVC Handler</a:t>
+          </a:r>
+          <a:endParaRPr lang="en-GB" dirty="0"/>
+        </a:p>
+      </dgm:t>
+    </dgm:pt>
+    <dgm:pt modelId="{6B5D3A38-DA15-46C5-B53F-C0D4820D8565}" type="parTrans" cxnId="{E45D6CFF-098F-4C55-81C4-060C113F8F70}">
+      <dgm:prSet/>
+      <dgm:spPr/>
+      <dgm:t>
+        <a:bodyPr/>
+        <a:lstStyle/>
+        <a:p>
+          <a:endParaRPr lang="en-GB"/>
+        </a:p>
+      </dgm:t>
+    </dgm:pt>
+    <dgm:pt modelId="{A98B8A33-6B13-40A3-A9A7-D2317D0FC2A1}" type="sibTrans" cxnId="{E45D6CFF-098F-4C55-81C4-060C113F8F70}">
+      <dgm:prSet>
+        <dgm:style>
+          <a:lnRef idx="0">
+            <a:schemeClr val="accent5"/>
+          </a:lnRef>
+          <a:fillRef idx="3">
+            <a:schemeClr val="accent5"/>
+          </a:fillRef>
+          <a:effectRef idx="3">
+            <a:schemeClr val="accent5"/>
+          </a:effectRef>
+          <a:fontRef idx="minor">
+            <a:schemeClr val="lt1"/>
+          </a:fontRef>
+        </dgm:style>
+      </dgm:prSet>
+      <dgm:spPr/>
+      <dgm:t>
+        <a:bodyPr/>
+        <a:lstStyle/>
+        <a:p>
+          <a:endParaRPr lang="en-GB"/>
+        </a:p>
+      </dgm:t>
+    </dgm:pt>
+    <dgm:pt modelId="{B43C1950-F91F-4917-9B1F-C342868209AF}">
+      <dgm:prSet phldrT="[Text]">
+        <dgm:style>
+          <a:lnRef idx="0">
+            <a:schemeClr val="accent1"/>
+          </a:lnRef>
+          <a:fillRef idx="3">
+            <a:schemeClr val="accent1"/>
+          </a:fillRef>
+          <a:effectRef idx="3">
+            <a:schemeClr val="accent1"/>
+          </a:effectRef>
+          <a:fontRef idx="minor">
+            <a:schemeClr val="lt1"/>
+          </a:fontRef>
+        </dgm:style>
+      </dgm:prSet>
+      <dgm:spPr/>
+      <dgm:t>
+        <a:bodyPr/>
+        <a:lstStyle/>
+        <a:p>
+          <a:r>
+            <a:rPr lang="en-US" dirty="0" smtClean="0"/>
+            <a:t>Controller Action Invoker</a:t>
+          </a:r>
+          <a:endParaRPr lang="en-GB" dirty="0"/>
+        </a:p>
+      </dgm:t>
+    </dgm:pt>
+    <dgm:pt modelId="{4A7C29AD-7460-4B0D-A230-EB1BAC8224B8}" type="parTrans" cxnId="{9F428610-985F-4198-9B8D-65C56A84B1A4}">
+      <dgm:prSet/>
+      <dgm:spPr/>
+      <dgm:t>
+        <a:bodyPr/>
+        <a:lstStyle/>
+        <a:p>
+          <a:endParaRPr lang="en-GB"/>
+        </a:p>
+      </dgm:t>
+    </dgm:pt>
+    <dgm:pt modelId="{AF637F04-EEA1-415B-B6AA-9564A0BCEEF5}" type="sibTrans" cxnId="{9F428610-985F-4198-9B8D-65C56A84B1A4}">
+      <dgm:prSet>
+        <dgm:style>
+          <a:lnRef idx="0">
+            <a:schemeClr val="accent5"/>
+          </a:lnRef>
+          <a:fillRef idx="3">
+            <a:schemeClr val="accent5"/>
+          </a:fillRef>
+          <a:effectRef idx="3">
+            <a:schemeClr val="accent5"/>
+          </a:effectRef>
+          <a:fontRef idx="minor">
+            <a:schemeClr val="lt1"/>
+          </a:fontRef>
+        </dgm:style>
+      </dgm:prSet>
+      <dgm:spPr/>
+      <dgm:t>
+        <a:bodyPr/>
+        <a:lstStyle/>
+        <a:p>
+          <a:endParaRPr lang="en-GB"/>
+        </a:p>
+      </dgm:t>
+    </dgm:pt>
+    <dgm:pt modelId="{01DA2CB0-7A77-4576-B6D3-DC65DC76FCB3}">
+      <dgm:prSet phldrT="[Text]">
+        <dgm:style>
+          <a:lnRef idx="0">
+            <a:schemeClr val="accent1"/>
+          </a:lnRef>
+          <a:fillRef idx="3">
+            <a:schemeClr val="accent1"/>
+          </a:fillRef>
+          <a:effectRef idx="3">
+            <a:schemeClr val="accent1"/>
+          </a:effectRef>
+          <a:fontRef idx="minor">
+            <a:schemeClr val="lt1"/>
+          </a:fontRef>
+        </dgm:style>
+      </dgm:prSet>
+      <dgm:spPr/>
+      <dgm:t>
+        <a:bodyPr/>
+        <a:lstStyle/>
+        <a:p>
+          <a:r>
+            <a:rPr lang="en-US" dirty="0" smtClean="0"/>
+            <a:t>Controller Factory</a:t>
+          </a:r>
+          <a:endParaRPr lang="en-GB" dirty="0"/>
+        </a:p>
+      </dgm:t>
+    </dgm:pt>
+    <dgm:pt modelId="{CEEBED6F-BDB4-43F7-9746-C51F93080207}" type="parTrans" cxnId="{0F0F03EB-C377-4F91-8F8E-D9427EB589E4}">
+      <dgm:prSet/>
+      <dgm:spPr/>
+      <dgm:t>
+        <a:bodyPr/>
+        <a:lstStyle/>
+        <a:p>
+          <a:endParaRPr lang="en-GB"/>
+        </a:p>
+      </dgm:t>
+    </dgm:pt>
+    <dgm:pt modelId="{AC9B9CAB-31A6-4B5C-996E-69E367C1CDE4}" type="sibTrans" cxnId="{0F0F03EB-C377-4F91-8F8E-D9427EB589E4}">
+      <dgm:prSet>
+        <dgm:style>
+          <a:lnRef idx="0">
+            <a:schemeClr val="accent5"/>
+          </a:lnRef>
+          <a:fillRef idx="3">
+            <a:schemeClr val="accent5"/>
+          </a:fillRef>
+          <a:effectRef idx="3">
+            <a:schemeClr val="accent5"/>
+          </a:effectRef>
+          <a:fontRef idx="minor">
+            <a:schemeClr val="lt1"/>
+          </a:fontRef>
+        </dgm:style>
+      </dgm:prSet>
+      <dgm:spPr/>
+      <dgm:t>
+        <a:bodyPr/>
+        <a:lstStyle/>
+        <a:p>
+          <a:endParaRPr lang="en-GB"/>
+        </a:p>
+      </dgm:t>
+    </dgm:pt>
+    <dgm:pt modelId="{7A6CDD7C-6F78-474A-9000-135BFEB9D06C}">
+      <dgm:prSet phldrT="[Text]">
+        <dgm:style>
+          <a:lnRef idx="0">
+            <a:schemeClr val="accent1"/>
+          </a:lnRef>
+          <a:fillRef idx="3">
+            <a:schemeClr val="accent1"/>
+          </a:fillRef>
+          <a:effectRef idx="3">
+            <a:schemeClr val="accent1"/>
+          </a:effectRef>
+          <a:fontRef idx="minor">
+            <a:schemeClr val="lt1"/>
+          </a:fontRef>
+        </dgm:style>
+      </dgm:prSet>
+      <dgm:spPr/>
+      <dgm:t>
+        <a:bodyPr/>
+        <a:lstStyle/>
+        <a:p>
+          <a:r>
+            <a:rPr lang="en-US" dirty="0" smtClean="0"/>
+            <a:t>Action Result</a:t>
+          </a:r>
+          <a:endParaRPr lang="en-GB" dirty="0"/>
+        </a:p>
+      </dgm:t>
+    </dgm:pt>
+    <dgm:pt modelId="{982FC414-AEF5-4BE6-BD57-FA28427AD666}" type="parTrans" cxnId="{60F20C3C-C8C0-4D73-B48E-9FB65DE66D33}">
+      <dgm:prSet/>
+      <dgm:spPr/>
+      <dgm:t>
+        <a:bodyPr/>
+        <a:lstStyle/>
+        <a:p>
+          <a:endParaRPr lang="en-GB"/>
+        </a:p>
+      </dgm:t>
+    </dgm:pt>
+    <dgm:pt modelId="{547443E2-0F03-469A-A437-9E2747B02374}" type="sibTrans" cxnId="{60F20C3C-C8C0-4D73-B48E-9FB65DE66D33}">
+      <dgm:prSet>
+        <dgm:style>
+          <a:lnRef idx="0">
+            <a:schemeClr val="accent5"/>
+          </a:lnRef>
+          <a:fillRef idx="3">
+            <a:schemeClr val="accent5"/>
+          </a:fillRef>
+          <a:effectRef idx="3">
+            <a:schemeClr val="accent5"/>
+          </a:effectRef>
+          <a:fontRef idx="minor">
+            <a:schemeClr val="lt1"/>
+          </a:fontRef>
+        </dgm:style>
+      </dgm:prSet>
+      <dgm:spPr/>
+      <dgm:t>
+        <a:bodyPr/>
+        <a:lstStyle/>
+        <a:p>
+          <a:endParaRPr lang="en-GB"/>
+        </a:p>
+      </dgm:t>
+    </dgm:pt>
+    <dgm:pt modelId="{8BC5456B-F7D8-438A-AE80-C1EF55162446}">
+      <dgm:prSet phldrT="[Text]">
+        <dgm:style>
+          <a:lnRef idx="0">
+            <a:schemeClr val="accent1"/>
+          </a:lnRef>
+          <a:fillRef idx="3">
+            <a:schemeClr val="accent1"/>
+          </a:fillRef>
+          <a:effectRef idx="3">
+            <a:schemeClr val="accent1"/>
+          </a:effectRef>
+          <a:fontRef idx="minor">
+            <a:schemeClr val="lt1"/>
+          </a:fontRef>
+        </dgm:style>
+      </dgm:prSet>
+      <dgm:spPr/>
+      <dgm:t>
+        <a:bodyPr/>
+        <a:lstStyle/>
+        <a:p>
+          <a:r>
+            <a:rPr lang="en-US" dirty="0" smtClean="0"/>
+            <a:t>View Engine</a:t>
+          </a:r>
+          <a:endParaRPr lang="en-GB" dirty="0"/>
+        </a:p>
+      </dgm:t>
+    </dgm:pt>
+    <dgm:pt modelId="{3EB03288-01F3-4587-AE89-C3C0BAD10938}" type="parTrans" cxnId="{3E9026D8-7F36-4AE3-AFC5-4A4217BA8A68}">
+      <dgm:prSet/>
+      <dgm:spPr/>
+      <dgm:t>
+        <a:bodyPr/>
+        <a:lstStyle/>
+        <a:p>
+          <a:endParaRPr lang="en-GB"/>
+        </a:p>
+      </dgm:t>
+    </dgm:pt>
+    <dgm:pt modelId="{C94BB955-669E-466F-BC7C-24FD692B1F2F}" type="sibTrans" cxnId="{3E9026D8-7F36-4AE3-AFC5-4A4217BA8A68}">
+      <dgm:prSet>
+        <dgm:style>
+          <a:lnRef idx="0">
+            <a:schemeClr val="accent5"/>
+          </a:lnRef>
+          <a:fillRef idx="3">
+            <a:schemeClr val="accent5"/>
+          </a:fillRef>
+          <a:effectRef idx="3">
+            <a:schemeClr val="accent5"/>
+          </a:effectRef>
+          <a:fontRef idx="minor">
+            <a:schemeClr val="lt1"/>
+          </a:fontRef>
+        </dgm:style>
+      </dgm:prSet>
+      <dgm:spPr/>
+      <dgm:t>
+        <a:bodyPr/>
+        <a:lstStyle/>
+        <a:p>
+          <a:endParaRPr lang="en-GB"/>
+        </a:p>
+      </dgm:t>
+    </dgm:pt>
+    <dgm:pt modelId="{EF9B84EE-86AC-49E8-9A54-7647D02AF1AA}">
+      <dgm:prSet phldrT="[Text]">
+        <dgm:style>
+          <a:lnRef idx="0">
+            <a:schemeClr val="accent1"/>
+          </a:lnRef>
+          <a:fillRef idx="3">
+            <a:schemeClr val="accent1"/>
+          </a:fillRef>
+          <a:effectRef idx="3">
+            <a:schemeClr val="accent1"/>
+          </a:effectRef>
+          <a:fontRef idx="minor">
+            <a:schemeClr val="lt1"/>
+          </a:fontRef>
+        </dgm:style>
+      </dgm:prSet>
+      <dgm:spPr/>
+      <dgm:t>
+        <a:bodyPr/>
+        <a:lstStyle/>
+        <a:p>
+          <a:r>
+            <a:rPr lang="en-US" dirty="0" smtClean="0"/>
+            <a:t>View</a:t>
+          </a:r>
+          <a:endParaRPr lang="en-GB" dirty="0"/>
+        </a:p>
+      </dgm:t>
+    </dgm:pt>
+    <dgm:pt modelId="{13C46BB0-CCC1-46A6-B2FD-0D12361E8522}" type="parTrans" cxnId="{38D7BEDA-43D5-4F62-9905-9226E2EC32C1}">
+      <dgm:prSet/>
+      <dgm:spPr/>
+      <dgm:t>
+        <a:bodyPr/>
+        <a:lstStyle/>
+        <a:p>
+          <a:endParaRPr lang="en-GB"/>
+        </a:p>
+      </dgm:t>
+    </dgm:pt>
+    <dgm:pt modelId="{C345A66C-E41A-4086-9AB6-2F469D8387D5}" type="sibTrans" cxnId="{38D7BEDA-43D5-4F62-9905-9226E2EC32C1}">
+      <dgm:prSet/>
+      <dgm:spPr/>
+      <dgm:t>
+        <a:bodyPr/>
+        <a:lstStyle/>
+        <a:p>
+          <a:endParaRPr lang="en-GB"/>
+        </a:p>
+      </dgm:t>
+    </dgm:pt>
+    <dgm:pt modelId="{B06C7D9D-40D3-4441-82DB-296714CE91D6}">
+      <dgm:prSet phldrT="[Text]">
+        <dgm:style>
+          <a:lnRef idx="0">
+            <a:schemeClr val="accent1"/>
+          </a:lnRef>
+          <a:fillRef idx="3">
+            <a:schemeClr val="accent1"/>
+          </a:fillRef>
+          <a:effectRef idx="3">
+            <a:schemeClr val="accent1"/>
+          </a:effectRef>
+          <a:fontRef idx="minor">
+            <a:schemeClr val="lt1"/>
+          </a:fontRef>
+        </dgm:style>
+      </dgm:prSet>
+      <dgm:spPr/>
+      <dgm:t>
+        <a:bodyPr/>
+        <a:lstStyle/>
+        <a:p>
+          <a:r>
+            <a:rPr lang="en-US" dirty="0" smtClean="0"/>
+            <a:t>Routing</a:t>
+          </a:r>
+          <a:endParaRPr lang="en-GB" dirty="0"/>
+        </a:p>
+      </dgm:t>
+    </dgm:pt>
+    <dgm:pt modelId="{DBE20468-2334-4532-9382-B5970E00D768}" type="parTrans" cxnId="{18886119-515D-431D-B578-DED13088F93F}">
+      <dgm:prSet/>
+      <dgm:spPr/>
+      <dgm:t>
+        <a:bodyPr/>
+        <a:lstStyle/>
+        <a:p>
+          <a:endParaRPr lang="en-GB"/>
+        </a:p>
+      </dgm:t>
+    </dgm:pt>
+    <dgm:pt modelId="{42E9DDAB-9777-41DD-9A13-24C1A490D842}" type="sibTrans" cxnId="{18886119-515D-431D-B578-DED13088F93F}">
+      <dgm:prSet>
+        <dgm:style>
+          <a:lnRef idx="0">
+            <a:schemeClr val="accent5"/>
+          </a:lnRef>
+          <a:fillRef idx="3">
+            <a:schemeClr val="accent5"/>
+          </a:fillRef>
+          <a:effectRef idx="3">
+            <a:schemeClr val="accent5"/>
+          </a:effectRef>
+          <a:fontRef idx="minor">
+            <a:schemeClr val="lt1"/>
+          </a:fontRef>
+        </dgm:style>
+      </dgm:prSet>
+      <dgm:spPr/>
+      <dgm:t>
+        <a:bodyPr/>
+        <a:lstStyle/>
+        <a:p>
+          <a:endParaRPr lang="en-GB"/>
+        </a:p>
+      </dgm:t>
+    </dgm:pt>
+    <dgm:pt modelId="{5514927E-A2D3-48A3-88CD-8821C319108A}" type="pres">
+      <dgm:prSet presAssocID="{EF16EF62-5C7D-4636-B8CC-54E821C3C363}" presName="Name0" presStyleCnt="0">
+        <dgm:presLayoutVars>
+          <dgm:dir/>
+          <dgm:resizeHandles val="exact"/>
+        </dgm:presLayoutVars>
+      </dgm:prSet>
+      <dgm:spPr/>
+    </dgm:pt>
+    <dgm:pt modelId="{40FA7AC9-749D-4BC7-B685-6BB5AE1C9139}" type="pres">
+      <dgm:prSet presAssocID="{91444C4B-D9F3-4036-9C53-29E661821093}" presName="node" presStyleLbl="node1" presStyleIdx="0" presStyleCnt="8" custLinFactX="54671" custLinFactNeighborX="100000" custLinFactNeighborY="-71779">
+        <dgm:presLayoutVars>
+          <dgm:bulletEnabled val="1"/>
+        </dgm:presLayoutVars>
+      </dgm:prSet>
+      <dgm:spPr/>
+      <dgm:t>
+        <a:bodyPr/>
+        <a:lstStyle/>
+        <a:p>
+          <a:endParaRPr lang="en-GB"/>
+        </a:p>
+      </dgm:t>
+    </dgm:pt>
+    <dgm:pt modelId="{809C56AC-D77C-4C45-8C47-265979E2361B}" type="pres">
+      <dgm:prSet presAssocID="{963ED4E1-14CB-434A-B1D1-A755D048D3B6}" presName="sibTrans" presStyleLbl="sibTrans2D1" presStyleIdx="0" presStyleCnt="7"/>
+      <dgm:spPr/>
+    </dgm:pt>
+    <dgm:pt modelId="{21A2A613-7A1B-4148-A239-25DB39D736FB}" type="pres">
+      <dgm:prSet presAssocID="{963ED4E1-14CB-434A-B1D1-A755D048D3B6}" presName="connectorText" presStyleLbl="sibTrans2D1" presStyleIdx="0" presStyleCnt="7"/>
+      <dgm:spPr/>
+    </dgm:pt>
+    <dgm:pt modelId="{E025BFF6-B5ED-4111-A424-117C92BC8FA3}" type="pres">
+      <dgm:prSet presAssocID="{B06C7D9D-40D3-4441-82DB-296714CE91D6}" presName="node" presStyleLbl="node1" presStyleIdx="1" presStyleCnt="8" custLinFactX="54671" custLinFactNeighborX="100000" custLinFactNeighborY="-71779">
+        <dgm:presLayoutVars>
+          <dgm:bulletEnabled val="1"/>
+        </dgm:presLayoutVars>
+      </dgm:prSet>
+      <dgm:spPr/>
+      <dgm:t>
+        <a:bodyPr/>
+        <a:lstStyle/>
+        <a:p>
+          <a:endParaRPr lang="en-GB"/>
+        </a:p>
+      </dgm:t>
+    </dgm:pt>
+    <dgm:pt modelId="{EC48F8E3-7DCB-4035-852C-116E59A3B8B8}" type="pres">
+      <dgm:prSet presAssocID="{42E9DDAB-9777-41DD-9A13-24C1A490D842}" presName="sibTrans" presStyleLbl="sibTrans2D1" presStyleIdx="1" presStyleCnt="7"/>
+      <dgm:spPr/>
+    </dgm:pt>
+    <dgm:pt modelId="{78F59ED9-ECFD-463E-8C1D-F304DF1F9BAF}" type="pres">
+      <dgm:prSet presAssocID="{42E9DDAB-9777-41DD-9A13-24C1A490D842}" presName="connectorText" presStyleLbl="sibTrans2D1" presStyleIdx="1" presStyleCnt="7"/>
+      <dgm:spPr/>
+    </dgm:pt>
+    <dgm:pt modelId="{444A1B2E-3E6F-4558-A6DD-0B28C76448BB}" type="pres">
+      <dgm:prSet presAssocID="{F1560D04-A30A-4AC1-8B84-26282D9FC351}" presName="node" presStyleLbl="node1" presStyleIdx="2" presStyleCnt="8" custLinFactX="54671" custLinFactNeighborX="100000" custLinFactNeighborY="-71779">
+        <dgm:presLayoutVars>
+          <dgm:bulletEnabled val="1"/>
+        </dgm:presLayoutVars>
+      </dgm:prSet>
+      <dgm:spPr/>
+    </dgm:pt>
+    <dgm:pt modelId="{99FDB18D-7266-4F24-9021-F06EE2A9A8BA}" type="pres">
+      <dgm:prSet presAssocID="{A98B8A33-6B13-40A3-A9A7-D2317D0FC2A1}" presName="sibTrans" presStyleLbl="sibTrans2D1" presStyleIdx="2" presStyleCnt="7"/>
+      <dgm:spPr/>
+    </dgm:pt>
+    <dgm:pt modelId="{518FC971-4957-408D-9581-C6E150F88DB8}" type="pres">
+      <dgm:prSet presAssocID="{A98B8A33-6B13-40A3-A9A7-D2317D0FC2A1}" presName="connectorText" presStyleLbl="sibTrans2D1" presStyleIdx="2" presStyleCnt="7"/>
+      <dgm:spPr/>
+    </dgm:pt>
+    <dgm:pt modelId="{2341B51D-F38F-4A68-A4CA-E60773E2899C}" type="pres">
+      <dgm:prSet presAssocID="{01DA2CB0-7A77-4576-B6D3-DC65DC76FCB3}" presName="node" presStyleLbl="node1" presStyleIdx="3" presStyleCnt="8" custLinFactX="54671" custLinFactNeighborX="100000" custLinFactNeighborY="-71779">
+        <dgm:presLayoutVars>
+          <dgm:bulletEnabled val="1"/>
+        </dgm:presLayoutVars>
+      </dgm:prSet>
+      <dgm:spPr/>
+    </dgm:pt>
+    <dgm:pt modelId="{40761719-92EB-45BF-8276-E0AF49836817}" type="pres">
+      <dgm:prSet presAssocID="{AC9B9CAB-31A6-4B5C-996E-69E367C1CDE4}" presName="sibTrans" presStyleLbl="sibTrans2D1" presStyleIdx="3" presStyleCnt="7"/>
+      <dgm:spPr/>
+    </dgm:pt>
+    <dgm:pt modelId="{3577B2C6-B1A4-4078-8FBD-C39A83B67F79}" type="pres">
+      <dgm:prSet presAssocID="{AC9B9CAB-31A6-4B5C-996E-69E367C1CDE4}" presName="connectorText" presStyleLbl="sibTrans2D1" presStyleIdx="3" presStyleCnt="7"/>
+      <dgm:spPr/>
+    </dgm:pt>
+    <dgm:pt modelId="{1EFB8979-CEDC-40B1-A6D1-15531EDF1E10}" type="pres">
+      <dgm:prSet presAssocID="{B43C1950-F91F-4917-9B1F-C342868209AF}" presName="node" presStyleLbl="node1" presStyleIdx="4" presStyleCnt="8" custLinFactX="54671" custLinFactNeighborX="100000" custLinFactNeighborY="-71779">
+        <dgm:presLayoutVars>
+          <dgm:bulletEnabled val="1"/>
+        </dgm:presLayoutVars>
+      </dgm:prSet>
+      <dgm:spPr/>
+    </dgm:pt>
+    <dgm:pt modelId="{A6EBFDB1-4B32-4940-8A3B-20818AC0F4A5}" type="pres">
+      <dgm:prSet presAssocID="{AF637F04-EEA1-415B-B6AA-9564A0BCEEF5}" presName="sibTrans" presStyleLbl="sibTrans2D1" presStyleIdx="4" presStyleCnt="7"/>
+      <dgm:spPr/>
+    </dgm:pt>
+    <dgm:pt modelId="{9FFAA13C-5E48-428B-A98A-7094404CC0B6}" type="pres">
+      <dgm:prSet presAssocID="{AF637F04-EEA1-415B-B6AA-9564A0BCEEF5}" presName="connectorText" presStyleLbl="sibTrans2D1" presStyleIdx="4" presStyleCnt="7"/>
+      <dgm:spPr/>
+    </dgm:pt>
+    <dgm:pt modelId="{123CFA72-13AB-4378-A500-9788AF12239E}" type="pres">
+      <dgm:prSet presAssocID="{7A6CDD7C-6F78-474A-9000-135BFEB9D06C}" presName="node" presStyleLbl="node1" presStyleIdx="5" presStyleCnt="8" custLinFactX="-2136" custLinFactNeighborX="-100000" custLinFactNeighborY="73574">
+        <dgm:presLayoutVars>
+          <dgm:bulletEnabled val="1"/>
+        </dgm:presLayoutVars>
+      </dgm:prSet>
+      <dgm:spPr/>
+    </dgm:pt>
+    <dgm:pt modelId="{5324E3CB-4947-48C7-9448-EDC903F0867C}" type="pres">
+      <dgm:prSet presAssocID="{547443E2-0F03-469A-A437-9E2747B02374}" presName="sibTrans" presStyleLbl="sibTrans2D1" presStyleIdx="5" presStyleCnt="7"/>
+      <dgm:spPr/>
+    </dgm:pt>
+    <dgm:pt modelId="{9DB798A0-73F4-4F06-9990-861FF4F4441E}" type="pres">
+      <dgm:prSet presAssocID="{547443E2-0F03-469A-A437-9E2747B02374}" presName="connectorText" presStyleLbl="sibTrans2D1" presStyleIdx="5" presStyleCnt="7"/>
+      <dgm:spPr/>
+    </dgm:pt>
+    <dgm:pt modelId="{6F975970-5D49-4274-A96F-32B42483DD3D}" type="pres">
+      <dgm:prSet presAssocID="{8BC5456B-F7D8-438A-AE80-C1EF55162446}" presName="node" presStyleLbl="node1" presStyleIdx="6" presStyleCnt="8" custLinFactX="-203421" custLinFactNeighborX="-300000" custLinFactNeighborY="77163">
+        <dgm:presLayoutVars>
+          <dgm:bulletEnabled val="1"/>
+        </dgm:presLayoutVars>
+      </dgm:prSet>
+      <dgm:spPr/>
+      <dgm:t>
+        <a:bodyPr/>
+        <a:lstStyle/>
+        <a:p>
+          <a:endParaRPr lang="en-GB"/>
+        </a:p>
+      </dgm:t>
+    </dgm:pt>
+    <dgm:pt modelId="{D892B3A8-C072-4930-9EEB-58D47D4E8943}" type="pres">
+      <dgm:prSet presAssocID="{C94BB955-669E-466F-BC7C-24FD692B1F2F}" presName="sibTrans" presStyleLbl="sibTrans2D1" presStyleIdx="6" presStyleCnt="7"/>
+      <dgm:spPr/>
+    </dgm:pt>
+    <dgm:pt modelId="{BEDD0B67-9C46-4A13-9443-62346533CAA1}" type="pres">
+      <dgm:prSet presAssocID="{C94BB955-669E-466F-BC7C-24FD692B1F2F}" presName="connectorText" presStyleLbl="sibTrans2D1" presStyleIdx="6" presStyleCnt="7"/>
+      <dgm:spPr/>
+    </dgm:pt>
+    <dgm:pt modelId="{DD678B2C-6F52-476E-BB5B-B0223FFEEA8F}" type="pres">
+      <dgm:prSet presAssocID="{EF9B84EE-86AC-49E8-9A54-7647D02AF1AA}" presName="node" presStyleLbl="node1" presStyleIdx="7" presStyleCnt="8" custLinFactX="-407263" custLinFactNeighborX="-500000" custLinFactNeighborY="78958">
+        <dgm:presLayoutVars>
+          <dgm:bulletEnabled val="1"/>
+        </dgm:presLayoutVars>
+      </dgm:prSet>
+      <dgm:spPr/>
+    </dgm:pt>
+  </dgm:ptLst>
+  <dgm:cxnLst>
+    <dgm:cxn modelId="{0F0F03EB-C377-4F91-8F8E-D9427EB589E4}" srcId="{EF16EF62-5C7D-4636-B8CC-54E821C3C363}" destId="{01DA2CB0-7A77-4576-B6D3-DC65DC76FCB3}" srcOrd="3" destOrd="0" parTransId="{CEEBED6F-BDB4-43F7-9746-C51F93080207}" sibTransId="{AC9B9CAB-31A6-4B5C-996E-69E367C1CDE4}"/>
+    <dgm:cxn modelId="{A05AB3DE-DF35-40B6-8774-B9898EE91114}" type="presOf" srcId="{A98B8A33-6B13-40A3-A9A7-D2317D0FC2A1}" destId="{99FDB18D-7266-4F24-9021-F06EE2A9A8BA}" srcOrd="0" destOrd="0" presId="urn:microsoft.com/office/officeart/2005/8/layout/process1"/>
+    <dgm:cxn modelId="{9F428610-985F-4198-9B8D-65C56A84B1A4}" srcId="{EF16EF62-5C7D-4636-B8CC-54E821C3C363}" destId="{B43C1950-F91F-4917-9B1F-C342868209AF}" srcOrd="4" destOrd="0" parTransId="{4A7C29AD-7460-4B0D-A230-EB1BAC8224B8}" sibTransId="{AF637F04-EEA1-415B-B6AA-9564A0BCEEF5}"/>
+    <dgm:cxn modelId="{8F59E69D-EC80-4076-B263-A410C5DA5EDE}" srcId="{EF16EF62-5C7D-4636-B8CC-54E821C3C363}" destId="{91444C4B-D9F3-4036-9C53-29E661821093}" srcOrd="0" destOrd="0" parTransId="{D97BEE88-34B6-492B-A709-93322AD75F5A}" sibTransId="{963ED4E1-14CB-434A-B1D1-A755D048D3B6}"/>
+    <dgm:cxn modelId="{2956AA48-2DA6-4811-B487-B0C9132DFF01}" type="presOf" srcId="{963ED4E1-14CB-434A-B1D1-A755D048D3B6}" destId="{21A2A613-7A1B-4148-A239-25DB39D736FB}" srcOrd="1" destOrd="0" presId="urn:microsoft.com/office/officeart/2005/8/layout/process1"/>
+    <dgm:cxn modelId="{97B6A244-99EE-4C65-94F8-C8CB21415365}" type="presOf" srcId="{A98B8A33-6B13-40A3-A9A7-D2317D0FC2A1}" destId="{518FC971-4957-408D-9581-C6E150F88DB8}" srcOrd="1" destOrd="0" presId="urn:microsoft.com/office/officeart/2005/8/layout/process1"/>
+    <dgm:cxn modelId="{E45D6CFF-098F-4C55-81C4-060C113F8F70}" srcId="{EF16EF62-5C7D-4636-B8CC-54E821C3C363}" destId="{F1560D04-A30A-4AC1-8B84-26282D9FC351}" srcOrd="2" destOrd="0" parTransId="{6B5D3A38-DA15-46C5-B53F-C0D4820D8565}" sibTransId="{A98B8A33-6B13-40A3-A9A7-D2317D0FC2A1}"/>
+    <dgm:cxn modelId="{E46CC505-E866-4E46-9B8D-50ABE19313ED}" type="presOf" srcId="{547443E2-0F03-469A-A437-9E2747B02374}" destId="{9DB798A0-73F4-4F06-9990-861FF4F4441E}" srcOrd="1" destOrd="0" presId="urn:microsoft.com/office/officeart/2005/8/layout/process1"/>
+    <dgm:cxn modelId="{CCA80644-E7DD-4E1F-BD93-95C4AFD3DD7C}" type="presOf" srcId="{7A6CDD7C-6F78-474A-9000-135BFEB9D06C}" destId="{123CFA72-13AB-4378-A500-9788AF12239E}" srcOrd="0" destOrd="0" presId="urn:microsoft.com/office/officeart/2005/8/layout/process1"/>
+    <dgm:cxn modelId="{5044342E-3AB8-4608-B8D6-F0584EFFBB4A}" type="presOf" srcId="{C94BB955-669E-466F-BC7C-24FD692B1F2F}" destId="{BEDD0B67-9C46-4A13-9443-62346533CAA1}" srcOrd="1" destOrd="0" presId="urn:microsoft.com/office/officeart/2005/8/layout/process1"/>
+    <dgm:cxn modelId="{3B561964-8E85-4795-AC92-4E78097E542C}" type="presOf" srcId="{B06C7D9D-40D3-4441-82DB-296714CE91D6}" destId="{E025BFF6-B5ED-4111-A424-117C92BC8FA3}" srcOrd="0" destOrd="0" presId="urn:microsoft.com/office/officeart/2005/8/layout/process1"/>
+    <dgm:cxn modelId="{4B4CBC92-F4D3-4523-8588-8A1D6E717A08}" type="presOf" srcId="{AF637F04-EEA1-415B-B6AA-9564A0BCEEF5}" destId="{9FFAA13C-5E48-428B-A98A-7094404CC0B6}" srcOrd="1" destOrd="0" presId="urn:microsoft.com/office/officeart/2005/8/layout/process1"/>
+    <dgm:cxn modelId="{18886119-515D-431D-B578-DED13088F93F}" srcId="{EF16EF62-5C7D-4636-B8CC-54E821C3C363}" destId="{B06C7D9D-40D3-4441-82DB-296714CE91D6}" srcOrd="1" destOrd="0" parTransId="{DBE20468-2334-4532-9382-B5970E00D768}" sibTransId="{42E9DDAB-9777-41DD-9A13-24C1A490D842}"/>
+    <dgm:cxn modelId="{7E513310-D4BE-48B5-9475-D713260ACC1D}" type="presOf" srcId="{42E9DDAB-9777-41DD-9A13-24C1A490D842}" destId="{EC48F8E3-7DCB-4035-852C-116E59A3B8B8}" srcOrd="0" destOrd="0" presId="urn:microsoft.com/office/officeart/2005/8/layout/process1"/>
+    <dgm:cxn modelId="{D72CCEEE-FDA6-424A-935C-802C7FF5EFB6}" type="presOf" srcId="{EF9B84EE-86AC-49E8-9A54-7647D02AF1AA}" destId="{DD678B2C-6F52-476E-BB5B-B0223FFEEA8F}" srcOrd="0" destOrd="0" presId="urn:microsoft.com/office/officeart/2005/8/layout/process1"/>
+    <dgm:cxn modelId="{235B8D37-646E-43FE-B024-792F869F4DE5}" type="presOf" srcId="{42E9DDAB-9777-41DD-9A13-24C1A490D842}" destId="{78F59ED9-ECFD-463E-8C1D-F304DF1F9BAF}" srcOrd="1" destOrd="0" presId="urn:microsoft.com/office/officeart/2005/8/layout/process1"/>
+    <dgm:cxn modelId="{EB78D339-D34C-496E-A3EA-BA426AD2E9F7}" type="presOf" srcId="{C94BB955-669E-466F-BC7C-24FD692B1F2F}" destId="{D892B3A8-C072-4930-9EEB-58D47D4E8943}" srcOrd="0" destOrd="0" presId="urn:microsoft.com/office/officeart/2005/8/layout/process1"/>
+    <dgm:cxn modelId="{A0782DBD-4FDB-49A0-8A60-376C8F9E5211}" type="presOf" srcId="{AC9B9CAB-31A6-4B5C-996E-69E367C1CDE4}" destId="{3577B2C6-B1A4-4078-8FBD-C39A83B67F79}" srcOrd="1" destOrd="0" presId="urn:microsoft.com/office/officeart/2005/8/layout/process1"/>
+    <dgm:cxn modelId="{2297620F-74CC-4010-9610-6E2175E5365E}" type="presOf" srcId="{547443E2-0F03-469A-A437-9E2747B02374}" destId="{5324E3CB-4947-48C7-9448-EDC903F0867C}" srcOrd="0" destOrd="0" presId="urn:microsoft.com/office/officeart/2005/8/layout/process1"/>
+    <dgm:cxn modelId="{AF11264B-378B-4E1D-9C38-36634276C386}" type="presOf" srcId="{AC9B9CAB-31A6-4B5C-996E-69E367C1CDE4}" destId="{40761719-92EB-45BF-8276-E0AF49836817}" srcOrd="0" destOrd="0" presId="urn:microsoft.com/office/officeart/2005/8/layout/process1"/>
+    <dgm:cxn modelId="{B5C84766-9FA6-4EC6-9BC4-5A07817EC089}" type="presOf" srcId="{8BC5456B-F7D8-438A-AE80-C1EF55162446}" destId="{6F975970-5D49-4274-A96F-32B42483DD3D}" srcOrd="0" destOrd="0" presId="urn:microsoft.com/office/officeart/2005/8/layout/process1"/>
+    <dgm:cxn modelId="{60F20C3C-C8C0-4D73-B48E-9FB65DE66D33}" srcId="{EF16EF62-5C7D-4636-B8CC-54E821C3C363}" destId="{7A6CDD7C-6F78-474A-9000-135BFEB9D06C}" srcOrd="5" destOrd="0" parTransId="{982FC414-AEF5-4BE6-BD57-FA28427AD666}" sibTransId="{547443E2-0F03-469A-A437-9E2747B02374}"/>
+    <dgm:cxn modelId="{6CE4A4B8-D0EF-408C-B8CD-D78E68858323}" type="presOf" srcId="{AF637F04-EEA1-415B-B6AA-9564A0BCEEF5}" destId="{A6EBFDB1-4B32-4940-8A3B-20818AC0F4A5}" srcOrd="0" destOrd="0" presId="urn:microsoft.com/office/officeart/2005/8/layout/process1"/>
+    <dgm:cxn modelId="{3E9026D8-7F36-4AE3-AFC5-4A4217BA8A68}" srcId="{EF16EF62-5C7D-4636-B8CC-54E821C3C363}" destId="{8BC5456B-F7D8-438A-AE80-C1EF55162446}" srcOrd="6" destOrd="0" parTransId="{3EB03288-01F3-4587-AE89-C3C0BAD10938}" sibTransId="{C94BB955-669E-466F-BC7C-24FD692B1F2F}"/>
+    <dgm:cxn modelId="{C0BEF0B8-962D-4404-AE83-B5191EA90BAB}" type="presOf" srcId="{01DA2CB0-7A77-4576-B6D3-DC65DC76FCB3}" destId="{2341B51D-F38F-4A68-A4CA-E60773E2899C}" srcOrd="0" destOrd="0" presId="urn:microsoft.com/office/officeart/2005/8/layout/process1"/>
+    <dgm:cxn modelId="{4BEE56AB-7C03-44B0-BEE6-73338EBE1399}" type="presOf" srcId="{B43C1950-F91F-4917-9B1F-C342868209AF}" destId="{1EFB8979-CEDC-40B1-A6D1-15531EDF1E10}" srcOrd="0" destOrd="0" presId="urn:microsoft.com/office/officeart/2005/8/layout/process1"/>
+    <dgm:cxn modelId="{8665B025-E26E-4795-93DC-0512C5062B70}" type="presOf" srcId="{EF16EF62-5C7D-4636-B8CC-54E821C3C363}" destId="{5514927E-A2D3-48A3-88CD-8821C319108A}" srcOrd="0" destOrd="0" presId="urn:microsoft.com/office/officeart/2005/8/layout/process1"/>
+    <dgm:cxn modelId="{36AEB845-4C70-4859-97A4-36952F955D2E}" type="presOf" srcId="{963ED4E1-14CB-434A-B1D1-A755D048D3B6}" destId="{809C56AC-D77C-4C45-8C47-265979E2361B}" srcOrd="0" destOrd="0" presId="urn:microsoft.com/office/officeart/2005/8/layout/process1"/>
+    <dgm:cxn modelId="{C208875C-B29B-4CD8-83DE-4A03A955F7F7}" type="presOf" srcId="{91444C4B-D9F3-4036-9C53-29E661821093}" destId="{40FA7AC9-749D-4BC7-B685-6BB5AE1C9139}" srcOrd="0" destOrd="0" presId="urn:microsoft.com/office/officeart/2005/8/layout/process1"/>
+    <dgm:cxn modelId="{9F1451E0-F180-4D14-B152-E74CBCB8D526}" type="presOf" srcId="{F1560D04-A30A-4AC1-8B84-26282D9FC351}" destId="{444A1B2E-3E6F-4558-A6DD-0B28C76448BB}" srcOrd="0" destOrd="0" presId="urn:microsoft.com/office/officeart/2005/8/layout/process1"/>
+    <dgm:cxn modelId="{38D7BEDA-43D5-4F62-9905-9226E2EC32C1}" srcId="{EF16EF62-5C7D-4636-B8CC-54E821C3C363}" destId="{EF9B84EE-86AC-49E8-9A54-7647D02AF1AA}" srcOrd="7" destOrd="0" parTransId="{13C46BB0-CCC1-46A6-B2FD-0D12361E8522}" sibTransId="{C345A66C-E41A-4086-9AB6-2F469D8387D5}"/>
+    <dgm:cxn modelId="{669ACA5B-300A-4D2A-A4CF-486A649FBC56}" type="presParOf" srcId="{5514927E-A2D3-48A3-88CD-8821C319108A}" destId="{40FA7AC9-749D-4BC7-B685-6BB5AE1C9139}" srcOrd="0" destOrd="0" presId="urn:microsoft.com/office/officeart/2005/8/layout/process1"/>
+    <dgm:cxn modelId="{36754A2F-AF04-464D-9E17-9CE9B06212EA}" type="presParOf" srcId="{5514927E-A2D3-48A3-88CD-8821C319108A}" destId="{809C56AC-D77C-4C45-8C47-265979E2361B}" srcOrd="1" destOrd="0" presId="urn:microsoft.com/office/officeart/2005/8/layout/process1"/>
+    <dgm:cxn modelId="{CF5E9C98-D163-4DAA-BED3-0180A02A6063}" type="presParOf" srcId="{809C56AC-D77C-4C45-8C47-265979E2361B}" destId="{21A2A613-7A1B-4148-A239-25DB39D736FB}" srcOrd="0" destOrd="0" presId="urn:microsoft.com/office/officeart/2005/8/layout/process1"/>
+    <dgm:cxn modelId="{F82D964D-669B-4074-B454-49106ACDD0AB}" type="presParOf" srcId="{5514927E-A2D3-48A3-88CD-8821C319108A}" destId="{E025BFF6-B5ED-4111-A424-117C92BC8FA3}" srcOrd="2" destOrd="0" presId="urn:microsoft.com/office/officeart/2005/8/layout/process1"/>
+    <dgm:cxn modelId="{DC8BA121-3BBD-495E-ACB5-2F64887A86FF}" type="presParOf" srcId="{5514927E-A2D3-48A3-88CD-8821C319108A}" destId="{EC48F8E3-7DCB-4035-852C-116E59A3B8B8}" srcOrd="3" destOrd="0" presId="urn:microsoft.com/office/officeart/2005/8/layout/process1"/>
+    <dgm:cxn modelId="{3F7589EB-16C1-4CC2-AFC2-BBEA3DC34530}" type="presParOf" srcId="{EC48F8E3-7DCB-4035-852C-116E59A3B8B8}" destId="{78F59ED9-ECFD-463E-8C1D-F304DF1F9BAF}" srcOrd="0" destOrd="0" presId="urn:microsoft.com/office/officeart/2005/8/layout/process1"/>
+    <dgm:cxn modelId="{C23C1C9F-2F93-4E9A-9474-CB7AC68CF8D8}" type="presParOf" srcId="{5514927E-A2D3-48A3-88CD-8821C319108A}" destId="{444A1B2E-3E6F-4558-A6DD-0B28C76448BB}" srcOrd="4" destOrd="0" presId="urn:microsoft.com/office/officeart/2005/8/layout/process1"/>
+    <dgm:cxn modelId="{47EAB161-C58B-49D9-9375-00C638593F17}" type="presParOf" srcId="{5514927E-A2D3-48A3-88CD-8821C319108A}" destId="{99FDB18D-7266-4F24-9021-F06EE2A9A8BA}" srcOrd="5" destOrd="0" presId="urn:microsoft.com/office/officeart/2005/8/layout/process1"/>
+    <dgm:cxn modelId="{88D73E3F-8AA3-4A8A-812C-7B466BB6AA60}" type="presParOf" srcId="{99FDB18D-7266-4F24-9021-F06EE2A9A8BA}" destId="{518FC971-4957-408D-9581-C6E150F88DB8}" srcOrd="0" destOrd="0" presId="urn:microsoft.com/office/officeart/2005/8/layout/process1"/>
+    <dgm:cxn modelId="{872641C3-4480-4930-B40F-0888B866AD13}" type="presParOf" srcId="{5514927E-A2D3-48A3-88CD-8821C319108A}" destId="{2341B51D-F38F-4A68-A4CA-E60773E2899C}" srcOrd="6" destOrd="0" presId="urn:microsoft.com/office/officeart/2005/8/layout/process1"/>
+    <dgm:cxn modelId="{DE715926-0585-49A7-9DE9-296234199699}" type="presParOf" srcId="{5514927E-A2D3-48A3-88CD-8821C319108A}" destId="{40761719-92EB-45BF-8276-E0AF49836817}" srcOrd="7" destOrd="0" presId="urn:microsoft.com/office/officeart/2005/8/layout/process1"/>
+    <dgm:cxn modelId="{FB7EC086-0667-43DF-B647-76A5E8D120C3}" type="presParOf" srcId="{40761719-92EB-45BF-8276-E0AF49836817}" destId="{3577B2C6-B1A4-4078-8FBD-C39A83B67F79}" srcOrd="0" destOrd="0" presId="urn:microsoft.com/office/officeart/2005/8/layout/process1"/>
+    <dgm:cxn modelId="{145088E4-D49B-4E51-9828-89B802AC8820}" type="presParOf" srcId="{5514927E-A2D3-48A3-88CD-8821C319108A}" destId="{1EFB8979-CEDC-40B1-A6D1-15531EDF1E10}" srcOrd="8" destOrd="0" presId="urn:microsoft.com/office/officeart/2005/8/layout/process1"/>
+    <dgm:cxn modelId="{2168D714-0F80-4DA7-83A4-6D3B6700B69B}" type="presParOf" srcId="{5514927E-A2D3-48A3-88CD-8821C319108A}" destId="{A6EBFDB1-4B32-4940-8A3B-20818AC0F4A5}" srcOrd="9" destOrd="0" presId="urn:microsoft.com/office/officeart/2005/8/layout/process1"/>
+    <dgm:cxn modelId="{B16C8766-0563-420C-981E-FADC57B2DAFD}" type="presParOf" srcId="{A6EBFDB1-4B32-4940-8A3B-20818AC0F4A5}" destId="{9FFAA13C-5E48-428B-A98A-7094404CC0B6}" srcOrd="0" destOrd="0" presId="urn:microsoft.com/office/officeart/2005/8/layout/process1"/>
+    <dgm:cxn modelId="{307D2335-9383-47BA-879A-083059292C04}" type="presParOf" srcId="{5514927E-A2D3-48A3-88CD-8821C319108A}" destId="{123CFA72-13AB-4378-A500-9788AF12239E}" srcOrd="10" destOrd="0" presId="urn:microsoft.com/office/officeart/2005/8/layout/process1"/>
+    <dgm:cxn modelId="{9D86B912-C81D-4A0D-80BA-8031F3E5BF8B}" type="presParOf" srcId="{5514927E-A2D3-48A3-88CD-8821C319108A}" destId="{5324E3CB-4947-48C7-9448-EDC903F0867C}" srcOrd="11" destOrd="0" presId="urn:microsoft.com/office/officeart/2005/8/layout/process1"/>
+    <dgm:cxn modelId="{8AF5D212-A9E4-49F7-9EB7-62D912CB4625}" type="presParOf" srcId="{5324E3CB-4947-48C7-9448-EDC903F0867C}" destId="{9DB798A0-73F4-4F06-9990-861FF4F4441E}" srcOrd="0" destOrd="0" presId="urn:microsoft.com/office/officeart/2005/8/layout/process1"/>
+    <dgm:cxn modelId="{AB91123A-08C7-45AA-9CB0-C84F3CCF93E0}" type="presParOf" srcId="{5514927E-A2D3-48A3-88CD-8821C319108A}" destId="{6F975970-5D49-4274-A96F-32B42483DD3D}" srcOrd="12" destOrd="0" presId="urn:microsoft.com/office/officeart/2005/8/layout/process1"/>
+    <dgm:cxn modelId="{F4AD6CE6-CE4B-4913-9D1E-E3EFB6E83DB7}" type="presParOf" srcId="{5514927E-A2D3-48A3-88CD-8821C319108A}" destId="{D892B3A8-C072-4930-9EEB-58D47D4E8943}" srcOrd="13" destOrd="0" presId="urn:microsoft.com/office/officeart/2005/8/layout/process1"/>
+    <dgm:cxn modelId="{77D33706-C50B-418F-934C-5DDD1E99305C}" type="presParOf" srcId="{D892B3A8-C072-4930-9EEB-58D47D4E8943}" destId="{BEDD0B67-9C46-4A13-9443-62346533CAA1}" srcOrd="0" destOrd="0" presId="urn:microsoft.com/office/officeart/2005/8/layout/process1"/>
+    <dgm:cxn modelId="{EC3175C4-C79F-4E9C-9167-1EF30489DF8E}" type="presParOf" srcId="{5514927E-A2D3-48A3-88CD-8821C319108A}" destId="{DD678B2C-6F52-476E-BB5B-B0223FFEEA8F}" srcOrd="14" destOrd="0" presId="urn:microsoft.com/office/officeart/2005/8/layout/process1"/>
   </dgm:cxnLst>
   <dgm:bg/>
   <dgm:whole/>
@@ -1804,6 +3303,1437 @@
 </dsp:drawing>
 </file>
 
+<file path=ppt/diagrams/drawing2.xml><?xml version="1.0" encoding="utf-8"?>
+<dsp:drawing xmlns:dgm="http://schemas.openxmlformats.org/drawingml/2006/diagram" xmlns:dsp="http://schemas.microsoft.com/office/drawing/2008/diagram" xmlns:a="http://schemas.openxmlformats.org/drawingml/2006/main">
+  <dsp:spTree>
+    <dsp:nvGrpSpPr>
+      <dsp:cNvPr id="0" name=""/>
+      <dsp:cNvGrpSpPr/>
+    </dsp:nvGrpSpPr>
+    <dsp:grpSpPr/>
+    <dsp:sp modelId="{40FA7AC9-749D-4BC7-B685-6BB5AE1C9139}">
+      <dsp:nvSpPr>
+        <dsp:cNvPr id="0" name=""/>
+        <dsp:cNvSpPr/>
+      </dsp:nvSpPr>
+      <dsp:spPr>
+        <a:xfrm>
+          <a:off x="860386" y="1317944"/>
+          <a:ext cx="905284" cy="645015"/>
+        </a:xfrm>
+        <a:prstGeom prst="roundRect">
+          <a:avLst>
+            <a:gd name="adj" fmla="val 10000"/>
+          </a:avLst>
+        </a:prstGeom>
+        <a:gradFill rotWithShape="1">
+          <a:gsLst>
+            <a:gs pos="0">
+              <a:schemeClr val="accent1">
+                <a:tint val="85000"/>
+                <a:shade val="98000"/>
+                <a:satMod val="110000"/>
+                <a:lumMod val="103000"/>
+              </a:schemeClr>
+            </a:gs>
+            <a:gs pos="50000">
+              <a:schemeClr val="accent1">
+                <a:shade val="85000"/>
+                <a:satMod val="105000"/>
+                <a:lumMod val="100000"/>
+              </a:schemeClr>
+            </a:gs>
+            <a:gs pos="100000">
+              <a:schemeClr val="accent1">
+                <a:shade val="60000"/>
+                <a:satMod val="120000"/>
+                <a:lumMod val="100000"/>
+              </a:schemeClr>
+            </a:gs>
+          </a:gsLst>
+          <a:lin ang="5400000" scaled="0"/>
+        </a:gradFill>
+        <a:ln>
+          <a:noFill/>
+        </a:ln>
+        <a:effectLst>
+          <a:outerShdw blurRad="88900" dist="27940" dir="5400000" algn="ctr" rotWithShape="0">
+            <a:srgbClr val="000000">
+              <a:alpha val="63000"/>
+            </a:srgbClr>
+          </a:outerShdw>
+        </a:effectLst>
+      </dsp:spPr>
+      <dsp:style>
+        <a:lnRef idx="0">
+          <a:schemeClr val="accent1"/>
+        </a:lnRef>
+        <a:fillRef idx="3">
+          <a:schemeClr val="accent1"/>
+        </a:fillRef>
+        <a:effectRef idx="3">
+          <a:schemeClr val="accent1"/>
+        </a:effectRef>
+        <a:fontRef idx="minor">
+          <a:schemeClr val="lt1"/>
+        </a:fontRef>
+      </dsp:style>
+      <dsp:txBody>
+        <a:bodyPr spcFirstLastPara="0" vert="horz" wrap="square" lIns="45720" tIns="45720" rIns="45720" bIns="45720" numCol="1" spcCol="1270" anchor="ctr" anchorCtr="0">
+          <a:noAutofit/>
+        </a:bodyPr>
+        <a:lstStyle/>
+        <a:p>
+          <a:pPr lvl="0" algn="ctr" defTabSz="533400">
+            <a:lnSpc>
+              <a:spcPct val="90000"/>
+            </a:lnSpc>
+            <a:spcBef>
+              <a:spcPct val="0"/>
+            </a:spcBef>
+            <a:spcAft>
+              <a:spcPct val="35000"/>
+            </a:spcAft>
+          </a:pPr>
+          <a:r>
+            <a:rPr lang="en-US" sz="1200" kern="1200" dirty="0" smtClean="0"/>
+            <a:t>Request</a:t>
+          </a:r>
+          <a:endParaRPr lang="en-GB" sz="1200" kern="1200" dirty="0"/>
+        </a:p>
+      </dsp:txBody>
+      <dsp:txXfrm>
+        <a:off x="879278" y="1336836"/>
+        <a:ext cx="867500" cy="607231"/>
+      </dsp:txXfrm>
+    </dsp:sp>
+    <dsp:sp modelId="{809C56AC-D77C-4C45-8C47-265979E2361B}">
+      <dsp:nvSpPr>
+        <dsp:cNvPr id="0" name=""/>
+        <dsp:cNvSpPr/>
+      </dsp:nvSpPr>
+      <dsp:spPr>
+        <a:xfrm>
+          <a:off x="1856199" y="1528196"/>
+          <a:ext cx="191920" cy="224510"/>
+        </a:xfrm>
+        <a:prstGeom prst="rightArrow">
+          <a:avLst>
+            <a:gd name="adj1" fmla="val 60000"/>
+            <a:gd name="adj2" fmla="val 50000"/>
+          </a:avLst>
+        </a:prstGeom>
+        <a:gradFill rotWithShape="1">
+          <a:gsLst>
+            <a:gs pos="0">
+              <a:schemeClr val="accent5">
+                <a:tint val="85000"/>
+                <a:shade val="98000"/>
+                <a:satMod val="110000"/>
+                <a:lumMod val="103000"/>
+              </a:schemeClr>
+            </a:gs>
+            <a:gs pos="50000">
+              <a:schemeClr val="accent5">
+                <a:shade val="85000"/>
+                <a:satMod val="105000"/>
+                <a:lumMod val="100000"/>
+              </a:schemeClr>
+            </a:gs>
+            <a:gs pos="100000">
+              <a:schemeClr val="accent5">
+                <a:shade val="60000"/>
+                <a:satMod val="120000"/>
+                <a:lumMod val="100000"/>
+              </a:schemeClr>
+            </a:gs>
+          </a:gsLst>
+          <a:lin ang="5400000" scaled="0"/>
+        </a:gradFill>
+        <a:ln>
+          <a:noFill/>
+        </a:ln>
+        <a:effectLst>
+          <a:outerShdw blurRad="88900" dist="27940" dir="5400000" algn="ctr" rotWithShape="0">
+            <a:srgbClr val="000000">
+              <a:alpha val="63000"/>
+            </a:srgbClr>
+          </a:outerShdw>
+        </a:effectLst>
+      </dsp:spPr>
+      <dsp:style>
+        <a:lnRef idx="0">
+          <a:schemeClr val="accent5"/>
+        </a:lnRef>
+        <a:fillRef idx="3">
+          <a:schemeClr val="accent5"/>
+        </a:fillRef>
+        <a:effectRef idx="3">
+          <a:schemeClr val="accent5"/>
+        </a:effectRef>
+        <a:fontRef idx="minor">
+          <a:schemeClr val="lt1"/>
+        </a:fontRef>
+      </dsp:style>
+      <dsp:txBody>
+        <a:bodyPr spcFirstLastPara="0" vert="horz" wrap="square" lIns="0" tIns="0" rIns="0" bIns="0" numCol="1" spcCol="1270" anchor="ctr" anchorCtr="0">
+          <a:noAutofit/>
+        </a:bodyPr>
+        <a:lstStyle/>
+        <a:p>
+          <a:pPr lvl="0" algn="ctr" defTabSz="400050">
+            <a:lnSpc>
+              <a:spcPct val="90000"/>
+            </a:lnSpc>
+            <a:spcBef>
+              <a:spcPct val="0"/>
+            </a:spcBef>
+            <a:spcAft>
+              <a:spcPct val="35000"/>
+            </a:spcAft>
+          </a:pPr>
+          <a:endParaRPr lang="en-GB" sz="900" kern="1200"/>
+        </a:p>
+      </dsp:txBody>
+      <dsp:txXfrm>
+        <a:off x="1856199" y="1573098"/>
+        <a:ext cx="134344" cy="134706"/>
+      </dsp:txXfrm>
+    </dsp:sp>
+    <dsp:sp modelId="{E025BFF6-B5ED-4111-A424-117C92BC8FA3}">
+      <dsp:nvSpPr>
+        <dsp:cNvPr id="0" name=""/>
+        <dsp:cNvSpPr/>
+      </dsp:nvSpPr>
+      <dsp:spPr>
+        <a:xfrm>
+          <a:off x="2127784" y="1317944"/>
+          <a:ext cx="905284" cy="645015"/>
+        </a:xfrm>
+        <a:prstGeom prst="roundRect">
+          <a:avLst>
+            <a:gd name="adj" fmla="val 10000"/>
+          </a:avLst>
+        </a:prstGeom>
+        <a:gradFill rotWithShape="1">
+          <a:gsLst>
+            <a:gs pos="0">
+              <a:schemeClr val="accent1">
+                <a:tint val="85000"/>
+                <a:shade val="98000"/>
+                <a:satMod val="110000"/>
+                <a:lumMod val="103000"/>
+              </a:schemeClr>
+            </a:gs>
+            <a:gs pos="50000">
+              <a:schemeClr val="accent1">
+                <a:shade val="85000"/>
+                <a:satMod val="105000"/>
+                <a:lumMod val="100000"/>
+              </a:schemeClr>
+            </a:gs>
+            <a:gs pos="100000">
+              <a:schemeClr val="accent1">
+                <a:shade val="60000"/>
+                <a:satMod val="120000"/>
+                <a:lumMod val="100000"/>
+              </a:schemeClr>
+            </a:gs>
+          </a:gsLst>
+          <a:lin ang="5400000" scaled="0"/>
+        </a:gradFill>
+        <a:ln>
+          <a:noFill/>
+        </a:ln>
+        <a:effectLst>
+          <a:outerShdw blurRad="88900" dist="27940" dir="5400000" algn="ctr" rotWithShape="0">
+            <a:srgbClr val="000000">
+              <a:alpha val="63000"/>
+            </a:srgbClr>
+          </a:outerShdw>
+        </a:effectLst>
+      </dsp:spPr>
+      <dsp:style>
+        <a:lnRef idx="0">
+          <a:schemeClr val="accent1"/>
+        </a:lnRef>
+        <a:fillRef idx="3">
+          <a:schemeClr val="accent1"/>
+        </a:fillRef>
+        <a:effectRef idx="3">
+          <a:schemeClr val="accent1"/>
+        </a:effectRef>
+        <a:fontRef idx="minor">
+          <a:schemeClr val="lt1"/>
+        </a:fontRef>
+      </dsp:style>
+      <dsp:txBody>
+        <a:bodyPr spcFirstLastPara="0" vert="horz" wrap="square" lIns="45720" tIns="45720" rIns="45720" bIns="45720" numCol="1" spcCol="1270" anchor="ctr" anchorCtr="0">
+          <a:noAutofit/>
+        </a:bodyPr>
+        <a:lstStyle/>
+        <a:p>
+          <a:pPr lvl="0" algn="ctr" defTabSz="533400">
+            <a:lnSpc>
+              <a:spcPct val="90000"/>
+            </a:lnSpc>
+            <a:spcBef>
+              <a:spcPct val="0"/>
+            </a:spcBef>
+            <a:spcAft>
+              <a:spcPct val="35000"/>
+            </a:spcAft>
+          </a:pPr>
+          <a:r>
+            <a:rPr lang="en-US" sz="1200" kern="1200" dirty="0" smtClean="0"/>
+            <a:t>Routing</a:t>
+          </a:r>
+          <a:endParaRPr lang="en-GB" sz="1200" kern="1200" dirty="0"/>
+        </a:p>
+      </dsp:txBody>
+      <dsp:txXfrm>
+        <a:off x="2146676" y="1336836"/>
+        <a:ext cx="867500" cy="607231"/>
+      </dsp:txXfrm>
+    </dsp:sp>
+    <dsp:sp modelId="{EC48F8E3-7DCB-4035-852C-116E59A3B8B8}">
+      <dsp:nvSpPr>
+        <dsp:cNvPr id="0" name=""/>
+        <dsp:cNvSpPr/>
+      </dsp:nvSpPr>
+      <dsp:spPr>
+        <a:xfrm>
+          <a:off x="3123597" y="1528196"/>
+          <a:ext cx="191920" cy="224510"/>
+        </a:xfrm>
+        <a:prstGeom prst="rightArrow">
+          <a:avLst>
+            <a:gd name="adj1" fmla="val 60000"/>
+            <a:gd name="adj2" fmla="val 50000"/>
+          </a:avLst>
+        </a:prstGeom>
+        <a:gradFill rotWithShape="1">
+          <a:gsLst>
+            <a:gs pos="0">
+              <a:schemeClr val="accent5">
+                <a:tint val="85000"/>
+                <a:shade val="98000"/>
+                <a:satMod val="110000"/>
+                <a:lumMod val="103000"/>
+              </a:schemeClr>
+            </a:gs>
+            <a:gs pos="50000">
+              <a:schemeClr val="accent5">
+                <a:shade val="85000"/>
+                <a:satMod val="105000"/>
+                <a:lumMod val="100000"/>
+              </a:schemeClr>
+            </a:gs>
+            <a:gs pos="100000">
+              <a:schemeClr val="accent5">
+                <a:shade val="60000"/>
+                <a:satMod val="120000"/>
+                <a:lumMod val="100000"/>
+              </a:schemeClr>
+            </a:gs>
+          </a:gsLst>
+          <a:lin ang="5400000" scaled="0"/>
+        </a:gradFill>
+        <a:ln>
+          <a:noFill/>
+        </a:ln>
+        <a:effectLst>
+          <a:outerShdw blurRad="88900" dist="27940" dir="5400000" algn="ctr" rotWithShape="0">
+            <a:srgbClr val="000000">
+              <a:alpha val="63000"/>
+            </a:srgbClr>
+          </a:outerShdw>
+        </a:effectLst>
+      </dsp:spPr>
+      <dsp:style>
+        <a:lnRef idx="0">
+          <a:schemeClr val="accent5"/>
+        </a:lnRef>
+        <a:fillRef idx="3">
+          <a:schemeClr val="accent5"/>
+        </a:fillRef>
+        <a:effectRef idx="3">
+          <a:schemeClr val="accent5"/>
+        </a:effectRef>
+        <a:fontRef idx="minor">
+          <a:schemeClr val="lt1"/>
+        </a:fontRef>
+      </dsp:style>
+      <dsp:txBody>
+        <a:bodyPr spcFirstLastPara="0" vert="horz" wrap="square" lIns="0" tIns="0" rIns="0" bIns="0" numCol="1" spcCol="1270" anchor="ctr" anchorCtr="0">
+          <a:noAutofit/>
+        </a:bodyPr>
+        <a:lstStyle/>
+        <a:p>
+          <a:pPr lvl="0" algn="ctr" defTabSz="400050">
+            <a:lnSpc>
+              <a:spcPct val="90000"/>
+            </a:lnSpc>
+            <a:spcBef>
+              <a:spcPct val="0"/>
+            </a:spcBef>
+            <a:spcAft>
+              <a:spcPct val="35000"/>
+            </a:spcAft>
+          </a:pPr>
+          <a:endParaRPr lang="en-GB" sz="900" kern="1200"/>
+        </a:p>
+      </dsp:txBody>
+      <dsp:txXfrm>
+        <a:off x="3123597" y="1573098"/>
+        <a:ext cx="134344" cy="134706"/>
+      </dsp:txXfrm>
+    </dsp:sp>
+    <dsp:sp modelId="{444A1B2E-3E6F-4558-A6DD-0B28C76448BB}">
+      <dsp:nvSpPr>
+        <dsp:cNvPr id="0" name=""/>
+        <dsp:cNvSpPr/>
+      </dsp:nvSpPr>
+      <dsp:spPr>
+        <a:xfrm>
+          <a:off x="3395183" y="1317944"/>
+          <a:ext cx="905284" cy="645015"/>
+        </a:xfrm>
+        <a:prstGeom prst="roundRect">
+          <a:avLst>
+            <a:gd name="adj" fmla="val 10000"/>
+          </a:avLst>
+        </a:prstGeom>
+        <a:gradFill rotWithShape="1">
+          <a:gsLst>
+            <a:gs pos="0">
+              <a:schemeClr val="accent1">
+                <a:tint val="85000"/>
+                <a:shade val="98000"/>
+                <a:satMod val="110000"/>
+                <a:lumMod val="103000"/>
+              </a:schemeClr>
+            </a:gs>
+            <a:gs pos="50000">
+              <a:schemeClr val="accent1">
+                <a:shade val="85000"/>
+                <a:satMod val="105000"/>
+                <a:lumMod val="100000"/>
+              </a:schemeClr>
+            </a:gs>
+            <a:gs pos="100000">
+              <a:schemeClr val="accent1">
+                <a:shade val="60000"/>
+                <a:satMod val="120000"/>
+                <a:lumMod val="100000"/>
+              </a:schemeClr>
+            </a:gs>
+          </a:gsLst>
+          <a:lin ang="5400000" scaled="0"/>
+        </a:gradFill>
+        <a:ln>
+          <a:noFill/>
+        </a:ln>
+        <a:effectLst>
+          <a:outerShdw blurRad="88900" dist="27940" dir="5400000" algn="ctr" rotWithShape="0">
+            <a:srgbClr val="000000">
+              <a:alpha val="63000"/>
+            </a:srgbClr>
+          </a:outerShdw>
+        </a:effectLst>
+      </dsp:spPr>
+      <dsp:style>
+        <a:lnRef idx="0">
+          <a:schemeClr val="accent1"/>
+        </a:lnRef>
+        <a:fillRef idx="3">
+          <a:schemeClr val="accent1"/>
+        </a:fillRef>
+        <a:effectRef idx="3">
+          <a:schemeClr val="accent1"/>
+        </a:effectRef>
+        <a:fontRef idx="minor">
+          <a:schemeClr val="lt1"/>
+        </a:fontRef>
+      </dsp:style>
+      <dsp:txBody>
+        <a:bodyPr spcFirstLastPara="0" vert="horz" wrap="square" lIns="45720" tIns="45720" rIns="45720" bIns="45720" numCol="1" spcCol="1270" anchor="ctr" anchorCtr="0">
+          <a:noAutofit/>
+        </a:bodyPr>
+        <a:lstStyle/>
+        <a:p>
+          <a:pPr lvl="0" algn="ctr" defTabSz="533400">
+            <a:lnSpc>
+              <a:spcPct val="90000"/>
+            </a:lnSpc>
+            <a:spcBef>
+              <a:spcPct val="0"/>
+            </a:spcBef>
+            <a:spcAft>
+              <a:spcPct val="35000"/>
+            </a:spcAft>
+          </a:pPr>
+          <a:r>
+            <a:rPr lang="en-US" sz="1200" kern="1200" dirty="0" smtClean="0"/>
+            <a:t>MVC Handler</a:t>
+          </a:r>
+          <a:endParaRPr lang="en-GB" sz="1200" kern="1200" dirty="0"/>
+        </a:p>
+      </dsp:txBody>
+      <dsp:txXfrm>
+        <a:off x="3414075" y="1336836"/>
+        <a:ext cx="867500" cy="607231"/>
+      </dsp:txXfrm>
+    </dsp:sp>
+    <dsp:sp modelId="{99FDB18D-7266-4F24-9021-F06EE2A9A8BA}">
+      <dsp:nvSpPr>
+        <dsp:cNvPr id="0" name=""/>
+        <dsp:cNvSpPr/>
+      </dsp:nvSpPr>
+      <dsp:spPr>
+        <a:xfrm>
+          <a:off x="4390996" y="1528196"/>
+          <a:ext cx="191920" cy="224510"/>
+        </a:xfrm>
+        <a:prstGeom prst="rightArrow">
+          <a:avLst>
+            <a:gd name="adj1" fmla="val 60000"/>
+            <a:gd name="adj2" fmla="val 50000"/>
+          </a:avLst>
+        </a:prstGeom>
+        <a:gradFill rotWithShape="1">
+          <a:gsLst>
+            <a:gs pos="0">
+              <a:schemeClr val="accent5">
+                <a:tint val="85000"/>
+                <a:shade val="98000"/>
+                <a:satMod val="110000"/>
+                <a:lumMod val="103000"/>
+              </a:schemeClr>
+            </a:gs>
+            <a:gs pos="50000">
+              <a:schemeClr val="accent5">
+                <a:shade val="85000"/>
+                <a:satMod val="105000"/>
+                <a:lumMod val="100000"/>
+              </a:schemeClr>
+            </a:gs>
+            <a:gs pos="100000">
+              <a:schemeClr val="accent5">
+                <a:shade val="60000"/>
+                <a:satMod val="120000"/>
+                <a:lumMod val="100000"/>
+              </a:schemeClr>
+            </a:gs>
+          </a:gsLst>
+          <a:lin ang="5400000" scaled="0"/>
+        </a:gradFill>
+        <a:ln>
+          <a:noFill/>
+        </a:ln>
+        <a:effectLst>
+          <a:outerShdw blurRad="88900" dist="27940" dir="5400000" algn="ctr" rotWithShape="0">
+            <a:srgbClr val="000000">
+              <a:alpha val="63000"/>
+            </a:srgbClr>
+          </a:outerShdw>
+        </a:effectLst>
+      </dsp:spPr>
+      <dsp:style>
+        <a:lnRef idx="0">
+          <a:schemeClr val="accent5"/>
+        </a:lnRef>
+        <a:fillRef idx="3">
+          <a:schemeClr val="accent5"/>
+        </a:fillRef>
+        <a:effectRef idx="3">
+          <a:schemeClr val="accent5"/>
+        </a:effectRef>
+        <a:fontRef idx="minor">
+          <a:schemeClr val="lt1"/>
+        </a:fontRef>
+      </dsp:style>
+      <dsp:txBody>
+        <a:bodyPr spcFirstLastPara="0" vert="horz" wrap="square" lIns="0" tIns="0" rIns="0" bIns="0" numCol="1" spcCol="1270" anchor="ctr" anchorCtr="0">
+          <a:noAutofit/>
+        </a:bodyPr>
+        <a:lstStyle/>
+        <a:p>
+          <a:pPr lvl="0" algn="ctr" defTabSz="400050">
+            <a:lnSpc>
+              <a:spcPct val="90000"/>
+            </a:lnSpc>
+            <a:spcBef>
+              <a:spcPct val="0"/>
+            </a:spcBef>
+            <a:spcAft>
+              <a:spcPct val="35000"/>
+            </a:spcAft>
+          </a:pPr>
+          <a:endParaRPr lang="en-GB" sz="900" kern="1200"/>
+        </a:p>
+      </dsp:txBody>
+      <dsp:txXfrm>
+        <a:off x="4390996" y="1573098"/>
+        <a:ext cx="134344" cy="134706"/>
+      </dsp:txXfrm>
+    </dsp:sp>
+    <dsp:sp modelId="{2341B51D-F38F-4A68-A4CA-E60773E2899C}">
+      <dsp:nvSpPr>
+        <dsp:cNvPr id="0" name=""/>
+        <dsp:cNvSpPr/>
+      </dsp:nvSpPr>
+      <dsp:spPr>
+        <a:xfrm>
+          <a:off x="4662581" y="1317944"/>
+          <a:ext cx="905284" cy="645015"/>
+        </a:xfrm>
+        <a:prstGeom prst="roundRect">
+          <a:avLst>
+            <a:gd name="adj" fmla="val 10000"/>
+          </a:avLst>
+        </a:prstGeom>
+        <a:gradFill rotWithShape="1">
+          <a:gsLst>
+            <a:gs pos="0">
+              <a:schemeClr val="accent1">
+                <a:tint val="85000"/>
+                <a:shade val="98000"/>
+                <a:satMod val="110000"/>
+                <a:lumMod val="103000"/>
+              </a:schemeClr>
+            </a:gs>
+            <a:gs pos="50000">
+              <a:schemeClr val="accent1">
+                <a:shade val="85000"/>
+                <a:satMod val="105000"/>
+                <a:lumMod val="100000"/>
+              </a:schemeClr>
+            </a:gs>
+            <a:gs pos="100000">
+              <a:schemeClr val="accent1">
+                <a:shade val="60000"/>
+                <a:satMod val="120000"/>
+                <a:lumMod val="100000"/>
+              </a:schemeClr>
+            </a:gs>
+          </a:gsLst>
+          <a:lin ang="5400000" scaled="0"/>
+        </a:gradFill>
+        <a:ln>
+          <a:noFill/>
+        </a:ln>
+        <a:effectLst>
+          <a:outerShdw blurRad="88900" dist="27940" dir="5400000" algn="ctr" rotWithShape="0">
+            <a:srgbClr val="000000">
+              <a:alpha val="63000"/>
+            </a:srgbClr>
+          </a:outerShdw>
+        </a:effectLst>
+      </dsp:spPr>
+      <dsp:style>
+        <a:lnRef idx="0">
+          <a:schemeClr val="accent1"/>
+        </a:lnRef>
+        <a:fillRef idx="3">
+          <a:schemeClr val="accent1"/>
+        </a:fillRef>
+        <a:effectRef idx="3">
+          <a:schemeClr val="accent1"/>
+        </a:effectRef>
+        <a:fontRef idx="minor">
+          <a:schemeClr val="lt1"/>
+        </a:fontRef>
+      </dsp:style>
+      <dsp:txBody>
+        <a:bodyPr spcFirstLastPara="0" vert="horz" wrap="square" lIns="45720" tIns="45720" rIns="45720" bIns="45720" numCol="1" spcCol="1270" anchor="ctr" anchorCtr="0">
+          <a:noAutofit/>
+        </a:bodyPr>
+        <a:lstStyle/>
+        <a:p>
+          <a:pPr lvl="0" algn="ctr" defTabSz="533400">
+            <a:lnSpc>
+              <a:spcPct val="90000"/>
+            </a:lnSpc>
+            <a:spcBef>
+              <a:spcPct val="0"/>
+            </a:spcBef>
+            <a:spcAft>
+              <a:spcPct val="35000"/>
+            </a:spcAft>
+          </a:pPr>
+          <a:r>
+            <a:rPr lang="en-US" sz="1200" kern="1200" dirty="0" smtClean="0"/>
+            <a:t>Controller Factory</a:t>
+          </a:r>
+          <a:endParaRPr lang="en-GB" sz="1200" kern="1200" dirty="0"/>
+        </a:p>
+      </dsp:txBody>
+      <dsp:txXfrm>
+        <a:off x="4681473" y="1336836"/>
+        <a:ext cx="867500" cy="607231"/>
+      </dsp:txXfrm>
+    </dsp:sp>
+    <dsp:sp modelId="{40761719-92EB-45BF-8276-E0AF49836817}">
+      <dsp:nvSpPr>
+        <dsp:cNvPr id="0" name=""/>
+        <dsp:cNvSpPr/>
+      </dsp:nvSpPr>
+      <dsp:spPr>
+        <a:xfrm>
+          <a:off x="5658395" y="1528196"/>
+          <a:ext cx="191920" cy="224510"/>
+        </a:xfrm>
+        <a:prstGeom prst="rightArrow">
+          <a:avLst>
+            <a:gd name="adj1" fmla="val 60000"/>
+            <a:gd name="adj2" fmla="val 50000"/>
+          </a:avLst>
+        </a:prstGeom>
+        <a:gradFill rotWithShape="1">
+          <a:gsLst>
+            <a:gs pos="0">
+              <a:schemeClr val="accent5">
+                <a:tint val="85000"/>
+                <a:shade val="98000"/>
+                <a:satMod val="110000"/>
+                <a:lumMod val="103000"/>
+              </a:schemeClr>
+            </a:gs>
+            <a:gs pos="50000">
+              <a:schemeClr val="accent5">
+                <a:shade val="85000"/>
+                <a:satMod val="105000"/>
+                <a:lumMod val="100000"/>
+              </a:schemeClr>
+            </a:gs>
+            <a:gs pos="100000">
+              <a:schemeClr val="accent5">
+                <a:shade val="60000"/>
+                <a:satMod val="120000"/>
+                <a:lumMod val="100000"/>
+              </a:schemeClr>
+            </a:gs>
+          </a:gsLst>
+          <a:lin ang="5400000" scaled="0"/>
+        </a:gradFill>
+        <a:ln>
+          <a:noFill/>
+        </a:ln>
+        <a:effectLst>
+          <a:outerShdw blurRad="88900" dist="27940" dir="5400000" algn="ctr" rotWithShape="0">
+            <a:srgbClr val="000000">
+              <a:alpha val="63000"/>
+            </a:srgbClr>
+          </a:outerShdw>
+        </a:effectLst>
+      </dsp:spPr>
+      <dsp:style>
+        <a:lnRef idx="0">
+          <a:schemeClr val="accent5"/>
+        </a:lnRef>
+        <a:fillRef idx="3">
+          <a:schemeClr val="accent5"/>
+        </a:fillRef>
+        <a:effectRef idx="3">
+          <a:schemeClr val="accent5"/>
+        </a:effectRef>
+        <a:fontRef idx="minor">
+          <a:schemeClr val="lt1"/>
+        </a:fontRef>
+      </dsp:style>
+      <dsp:txBody>
+        <a:bodyPr spcFirstLastPara="0" vert="horz" wrap="square" lIns="0" tIns="0" rIns="0" bIns="0" numCol="1" spcCol="1270" anchor="ctr" anchorCtr="0">
+          <a:noAutofit/>
+        </a:bodyPr>
+        <a:lstStyle/>
+        <a:p>
+          <a:pPr lvl="0" algn="ctr" defTabSz="400050">
+            <a:lnSpc>
+              <a:spcPct val="90000"/>
+            </a:lnSpc>
+            <a:spcBef>
+              <a:spcPct val="0"/>
+            </a:spcBef>
+            <a:spcAft>
+              <a:spcPct val="35000"/>
+            </a:spcAft>
+          </a:pPr>
+          <a:endParaRPr lang="en-GB" sz="900" kern="1200"/>
+        </a:p>
+      </dsp:txBody>
+      <dsp:txXfrm>
+        <a:off x="5658395" y="1573098"/>
+        <a:ext cx="134344" cy="134706"/>
+      </dsp:txXfrm>
+    </dsp:sp>
+    <dsp:sp modelId="{1EFB8979-CEDC-40B1-A6D1-15531EDF1E10}">
+      <dsp:nvSpPr>
+        <dsp:cNvPr id="0" name=""/>
+        <dsp:cNvSpPr/>
+      </dsp:nvSpPr>
+      <dsp:spPr>
+        <a:xfrm>
+          <a:off x="5929980" y="1317944"/>
+          <a:ext cx="905284" cy="645015"/>
+        </a:xfrm>
+        <a:prstGeom prst="roundRect">
+          <a:avLst>
+            <a:gd name="adj" fmla="val 10000"/>
+          </a:avLst>
+        </a:prstGeom>
+        <a:gradFill rotWithShape="1">
+          <a:gsLst>
+            <a:gs pos="0">
+              <a:schemeClr val="accent1">
+                <a:tint val="85000"/>
+                <a:shade val="98000"/>
+                <a:satMod val="110000"/>
+                <a:lumMod val="103000"/>
+              </a:schemeClr>
+            </a:gs>
+            <a:gs pos="50000">
+              <a:schemeClr val="accent1">
+                <a:shade val="85000"/>
+                <a:satMod val="105000"/>
+                <a:lumMod val="100000"/>
+              </a:schemeClr>
+            </a:gs>
+            <a:gs pos="100000">
+              <a:schemeClr val="accent1">
+                <a:shade val="60000"/>
+                <a:satMod val="120000"/>
+                <a:lumMod val="100000"/>
+              </a:schemeClr>
+            </a:gs>
+          </a:gsLst>
+          <a:lin ang="5400000" scaled="0"/>
+        </a:gradFill>
+        <a:ln>
+          <a:noFill/>
+        </a:ln>
+        <a:effectLst>
+          <a:outerShdw blurRad="88900" dist="27940" dir="5400000" algn="ctr" rotWithShape="0">
+            <a:srgbClr val="000000">
+              <a:alpha val="63000"/>
+            </a:srgbClr>
+          </a:outerShdw>
+        </a:effectLst>
+      </dsp:spPr>
+      <dsp:style>
+        <a:lnRef idx="0">
+          <a:schemeClr val="accent1"/>
+        </a:lnRef>
+        <a:fillRef idx="3">
+          <a:schemeClr val="accent1"/>
+        </a:fillRef>
+        <a:effectRef idx="3">
+          <a:schemeClr val="accent1"/>
+        </a:effectRef>
+        <a:fontRef idx="minor">
+          <a:schemeClr val="lt1"/>
+        </a:fontRef>
+      </dsp:style>
+      <dsp:txBody>
+        <a:bodyPr spcFirstLastPara="0" vert="horz" wrap="square" lIns="45720" tIns="45720" rIns="45720" bIns="45720" numCol="1" spcCol="1270" anchor="ctr" anchorCtr="0">
+          <a:noAutofit/>
+        </a:bodyPr>
+        <a:lstStyle/>
+        <a:p>
+          <a:pPr lvl="0" algn="ctr" defTabSz="533400">
+            <a:lnSpc>
+              <a:spcPct val="90000"/>
+            </a:lnSpc>
+            <a:spcBef>
+              <a:spcPct val="0"/>
+            </a:spcBef>
+            <a:spcAft>
+              <a:spcPct val="35000"/>
+            </a:spcAft>
+          </a:pPr>
+          <a:r>
+            <a:rPr lang="en-US" sz="1200" kern="1200" dirty="0" smtClean="0"/>
+            <a:t>Controller Action Invoker</a:t>
+          </a:r>
+          <a:endParaRPr lang="en-GB" sz="1200" kern="1200" dirty="0"/>
+        </a:p>
+      </dsp:txBody>
+      <dsp:txXfrm>
+        <a:off x="5948872" y="1336836"/>
+        <a:ext cx="867500" cy="607231"/>
+      </dsp:txXfrm>
+    </dsp:sp>
+    <dsp:sp modelId="{A6EBFDB1-4B32-4940-8A3B-20818AC0F4A5}">
+      <dsp:nvSpPr>
+        <dsp:cNvPr id="0" name=""/>
+        <dsp:cNvSpPr/>
+      </dsp:nvSpPr>
+      <dsp:spPr>
+        <a:xfrm rot="5294044">
+          <a:off x="6319652" y="2001359"/>
+          <a:ext cx="155116" cy="224510"/>
+        </a:xfrm>
+        <a:prstGeom prst="rightArrow">
+          <a:avLst>
+            <a:gd name="adj1" fmla="val 60000"/>
+            <a:gd name="adj2" fmla="val 50000"/>
+          </a:avLst>
+        </a:prstGeom>
+        <a:gradFill rotWithShape="1">
+          <a:gsLst>
+            <a:gs pos="0">
+              <a:schemeClr val="accent5">
+                <a:tint val="85000"/>
+                <a:shade val="98000"/>
+                <a:satMod val="110000"/>
+                <a:lumMod val="103000"/>
+              </a:schemeClr>
+            </a:gs>
+            <a:gs pos="50000">
+              <a:schemeClr val="accent5">
+                <a:shade val="85000"/>
+                <a:satMod val="105000"/>
+                <a:lumMod val="100000"/>
+              </a:schemeClr>
+            </a:gs>
+            <a:gs pos="100000">
+              <a:schemeClr val="accent5">
+                <a:shade val="60000"/>
+                <a:satMod val="120000"/>
+                <a:lumMod val="100000"/>
+              </a:schemeClr>
+            </a:gs>
+          </a:gsLst>
+          <a:lin ang="5400000" scaled="0"/>
+        </a:gradFill>
+        <a:ln>
+          <a:noFill/>
+        </a:ln>
+        <a:effectLst>
+          <a:outerShdw blurRad="88900" dist="27940" dir="5400000" algn="ctr" rotWithShape="0">
+            <a:srgbClr val="000000">
+              <a:alpha val="63000"/>
+            </a:srgbClr>
+          </a:outerShdw>
+        </a:effectLst>
+      </dsp:spPr>
+      <dsp:style>
+        <a:lnRef idx="0">
+          <a:schemeClr val="accent5"/>
+        </a:lnRef>
+        <a:fillRef idx="3">
+          <a:schemeClr val="accent5"/>
+        </a:fillRef>
+        <a:effectRef idx="3">
+          <a:schemeClr val="accent5"/>
+        </a:effectRef>
+        <a:fontRef idx="minor">
+          <a:schemeClr val="lt1"/>
+        </a:fontRef>
+      </dsp:style>
+      <dsp:txBody>
+        <a:bodyPr spcFirstLastPara="0" vert="horz" wrap="square" lIns="0" tIns="0" rIns="0" bIns="0" numCol="1" spcCol="1270" anchor="ctr" anchorCtr="0">
+          <a:noAutofit/>
+        </a:bodyPr>
+        <a:lstStyle/>
+        <a:p>
+          <a:pPr lvl="0" algn="ctr" defTabSz="400050">
+            <a:lnSpc>
+              <a:spcPct val="90000"/>
+            </a:lnSpc>
+            <a:spcBef>
+              <a:spcPct val="0"/>
+            </a:spcBef>
+            <a:spcAft>
+              <a:spcPct val="35000"/>
+            </a:spcAft>
+          </a:pPr>
+          <a:endParaRPr lang="en-GB" sz="900" kern="1200"/>
+        </a:p>
+      </dsp:txBody>
+      <dsp:txXfrm>
+        <a:off x="6342202" y="2023005"/>
+        <a:ext cx="108581" cy="134706"/>
+      </dsp:txXfrm>
+    </dsp:sp>
+    <dsp:sp modelId="{123CFA72-13AB-4378-A500-9788AF12239E}">
+      <dsp:nvSpPr>
+        <dsp:cNvPr id="0" name=""/>
+        <dsp:cNvSpPr/>
+      </dsp:nvSpPr>
+      <dsp:spPr>
+        <a:xfrm>
+          <a:off x="5958886" y="2255493"/>
+          <a:ext cx="905284" cy="645015"/>
+        </a:xfrm>
+        <a:prstGeom prst="roundRect">
+          <a:avLst>
+            <a:gd name="adj" fmla="val 10000"/>
+          </a:avLst>
+        </a:prstGeom>
+        <a:gradFill rotWithShape="1">
+          <a:gsLst>
+            <a:gs pos="0">
+              <a:schemeClr val="accent1">
+                <a:tint val="85000"/>
+                <a:shade val="98000"/>
+                <a:satMod val="110000"/>
+                <a:lumMod val="103000"/>
+              </a:schemeClr>
+            </a:gs>
+            <a:gs pos="50000">
+              <a:schemeClr val="accent1">
+                <a:shade val="85000"/>
+                <a:satMod val="105000"/>
+                <a:lumMod val="100000"/>
+              </a:schemeClr>
+            </a:gs>
+            <a:gs pos="100000">
+              <a:schemeClr val="accent1">
+                <a:shade val="60000"/>
+                <a:satMod val="120000"/>
+                <a:lumMod val="100000"/>
+              </a:schemeClr>
+            </a:gs>
+          </a:gsLst>
+          <a:lin ang="5400000" scaled="0"/>
+        </a:gradFill>
+        <a:ln>
+          <a:noFill/>
+        </a:ln>
+        <a:effectLst>
+          <a:outerShdw blurRad="88900" dist="27940" dir="5400000" algn="ctr" rotWithShape="0">
+            <a:srgbClr val="000000">
+              <a:alpha val="63000"/>
+            </a:srgbClr>
+          </a:outerShdw>
+        </a:effectLst>
+      </dsp:spPr>
+      <dsp:style>
+        <a:lnRef idx="0">
+          <a:schemeClr val="accent1"/>
+        </a:lnRef>
+        <a:fillRef idx="3">
+          <a:schemeClr val="accent1"/>
+        </a:fillRef>
+        <a:effectRef idx="3">
+          <a:schemeClr val="accent1"/>
+        </a:effectRef>
+        <a:fontRef idx="minor">
+          <a:schemeClr val="lt1"/>
+        </a:fontRef>
+      </dsp:style>
+      <dsp:txBody>
+        <a:bodyPr spcFirstLastPara="0" vert="horz" wrap="square" lIns="45720" tIns="45720" rIns="45720" bIns="45720" numCol="1" spcCol="1270" anchor="ctr" anchorCtr="0">
+          <a:noAutofit/>
+        </a:bodyPr>
+        <a:lstStyle/>
+        <a:p>
+          <a:pPr lvl="0" algn="ctr" defTabSz="533400">
+            <a:lnSpc>
+              <a:spcPct val="90000"/>
+            </a:lnSpc>
+            <a:spcBef>
+              <a:spcPct val="0"/>
+            </a:spcBef>
+            <a:spcAft>
+              <a:spcPct val="35000"/>
+            </a:spcAft>
+          </a:pPr>
+          <a:r>
+            <a:rPr lang="en-US" sz="1200" kern="1200" dirty="0" smtClean="0"/>
+            <a:t>Action Result</a:t>
+          </a:r>
+          <a:endParaRPr lang="en-GB" sz="1200" kern="1200" dirty="0"/>
+        </a:p>
+      </dsp:txBody>
+      <dsp:txXfrm>
+        <a:off x="5977778" y="2274385"/>
+        <a:ext cx="867500" cy="607231"/>
+      </dsp:txXfrm>
+    </dsp:sp>
+    <dsp:sp modelId="{5324E3CB-4947-48C7-9448-EDC903F0867C}">
+      <dsp:nvSpPr>
+        <dsp:cNvPr id="0" name=""/>
+        <dsp:cNvSpPr/>
+      </dsp:nvSpPr>
+      <dsp:spPr>
+        <a:xfrm rot="10737786">
+          <a:off x="5667347" y="2477422"/>
+          <a:ext cx="198118" cy="224510"/>
+        </a:xfrm>
+        <a:prstGeom prst="rightArrow">
+          <a:avLst>
+            <a:gd name="adj1" fmla="val 60000"/>
+            <a:gd name="adj2" fmla="val 50000"/>
+          </a:avLst>
+        </a:prstGeom>
+        <a:gradFill rotWithShape="1">
+          <a:gsLst>
+            <a:gs pos="0">
+              <a:schemeClr val="accent5">
+                <a:tint val="85000"/>
+                <a:shade val="98000"/>
+                <a:satMod val="110000"/>
+                <a:lumMod val="103000"/>
+              </a:schemeClr>
+            </a:gs>
+            <a:gs pos="50000">
+              <a:schemeClr val="accent5">
+                <a:shade val="85000"/>
+                <a:satMod val="105000"/>
+                <a:lumMod val="100000"/>
+              </a:schemeClr>
+            </a:gs>
+            <a:gs pos="100000">
+              <a:schemeClr val="accent5">
+                <a:shade val="60000"/>
+                <a:satMod val="120000"/>
+                <a:lumMod val="100000"/>
+              </a:schemeClr>
+            </a:gs>
+          </a:gsLst>
+          <a:lin ang="5400000" scaled="0"/>
+        </a:gradFill>
+        <a:ln>
+          <a:noFill/>
+        </a:ln>
+        <a:effectLst>
+          <a:outerShdw blurRad="88900" dist="27940" dir="5400000" algn="ctr" rotWithShape="0">
+            <a:srgbClr val="000000">
+              <a:alpha val="63000"/>
+            </a:srgbClr>
+          </a:outerShdw>
+        </a:effectLst>
+      </dsp:spPr>
+      <dsp:style>
+        <a:lnRef idx="0">
+          <a:schemeClr val="accent5"/>
+        </a:lnRef>
+        <a:fillRef idx="3">
+          <a:schemeClr val="accent5"/>
+        </a:fillRef>
+        <a:effectRef idx="3">
+          <a:schemeClr val="accent5"/>
+        </a:effectRef>
+        <a:fontRef idx="minor">
+          <a:schemeClr val="lt1"/>
+        </a:fontRef>
+      </dsp:style>
+      <dsp:txBody>
+        <a:bodyPr spcFirstLastPara="0" vert="horz" wrap="square" lIns="0" tIns="0" rIns="0" bIns="0" numCol="1" spcCol="1270" anchor="ctr" anchorCtr="0">
+          <a:noAutofit/>
+        </a:bodyPr>
+        <a:lstStyle/>
+        <a:p>
+          <a:pPr lvl="0" algn="ctr" defTabSz="400050">
+            <a:lnSpc>
+              <a:spcPct val="90000"/>
+            </a:lnSpc>
+            <a:spcBef>
+              <a:spcPct val="0"/>
+            </a:spcBef>
+            <a:spcAft>
+              <a:spcPct val="35000"/>
+            </a:spcAft>
+          </a:pPr>
+          <a:endParaRPr lang="en-GB" sz="900" kern="1200"/>
+        </a:p>
+      </dsp:txBody>
+      <dsp:txXfrm rot="10800000">
+        <a:off x="5726777" y="2521786"/>
+        <a:ext cx="138683" cy="134706"/>
+      </dsp:txXfrm>
+    </dsp:sp>
+    <dsp:sp modelId="{6F975970-5D49-4274-A96F-32B42483DD3D}">
+      <dsp:nvSpPr>
+        <dsp:cNvPr id="0" name=""/>
+        <dsp:cNvSpPr/>
+      </dsp:nvSpPr>
+      <dsp:spPr>
+        <a:xfrm>
+          <a:off x="4679854" y="2278643"/>
+          <a:ext cx="905284" cy="645015"/>
+        </a:xfrm>
+        <a:prstGeom prst="roundRect">
+          <a:avLst>
+            <a:gd name="adj" fmla="val 10000"/>
+          </a:avLst>
+        </a:prstGeom>
+        <a:gradFill rotWithShape="1">
+          <a:gsLst>
+            <a:gs pos="0">
+              <a:schemeClr val="accent1">
+                <a:tint val="85000"/>
+                <a:shade val="98000"/>
+                <a:satMod val="110000"/>
+                <a:lumMod val="103000"/>
+              </a:schemeClr>
+            </a:gs>
+            <a:gs pos="50000">
+              <a:schemeClr val="accent1">
+                <a:shade val="85000"/>
+                <a:satMod val="105000"/>
+                <a:lumMod val="100000"/>
+              </a:schemeClr>
+            </a:gs>
+            <a:gs pos="100000">
+              <a:schemeClr val="accent1">
+                <a:shade val="60000"/>
+                <a:satMod val="120000"/>
+                <a:lumMod val="100000"/>
+              </a:schemeClr>
+            </a:gs>
+          </a:gsLst>
+          <a:lin ang="5400000" scaled="0"/>
+        </a:gradFill>
+        <a:ln>
+          <a:noFill/>
+        </a:ln>
+        <a:effectLst>
+          <a:outerShdw blurRad="88900" dist="27940" dir="5400000" algn="ctr" rotWithShape="0">
+            <a:srgbClr val="000000">
+              <a:alpha val="63000"/>
+            </a:srgbClr>
+          </a:outerShdw>
+        </a:effectLst>
+      </dsp:spPr>
+      <dsp:style>
+        <a:lnRef idx="0">
+          <a:schemeClr val="accent1"/>
+        </a:lnRef>
+        <a:fillRef idx="3">
+          <a:schemeClr val="accent1"/>
+        </a:fillRef>
+        <a:effectRef idx="3">
+          <a:schemeClr val="accent1"/>
+        </a:effectRef>
+        <a:fontRef idx="minor">
+          <a:schemeClr val="lt1"/>
+        </a:fontRef>
+      </dsp:style>
+      <dsp:txBody>
+        <a:bodyPr spcFirstLastPara="0" vert="horz" wrap="square" lIns="45720" tIns="45720" rIns="45720" bIns="45720" numCol="1" spcCol="1270" anchor="ctr" anchorCtr="0">
+          <a:noAutofit/>
+        </a:bodyPr>
+        <a:lstStyle/>
+        <a:p>
+          <a:pPr lvl="0" algn="ctr" defTabSz="533400">
+            <a:lnSpc>
+              <a:spcPct val="90000"/>
+            </a:lnSpc>
+            <a:spcBef>
+              <a:spcPct val="0"/>
+            </a:spcBef>
+            <a:spcAft>
+              <a:spcPct val="35000"/>
+            </a:spcAft>
+          </a:pPr>
+          <a:r>
+            <a:rPr lang="en-US" sz="1200" kern="1200" dirty="0" smtClean="0"/>
+            <a:t>View Engine</a:t>
+          </a:r>
+          <a:endParaRPr lang="en-GB" sz="1200" kern="1200" dirty="0"/>
+        </a:p>
+      </dsp:txBody>
+      <dsp:txXfrm>
+        <a:off x="4698746" y="2297535"/>
+        <a:ext cx="867500" cy="607231"/>
+      </dsp:txXfrm>
+    </dsp:sp>
+    <dsp:sp modelId="{D892B3A8-C072-4930-9EEB-58D47D4E8943}">
+      <dsp:nvSpPr>
+        <dsp:cNvPr id="0" name=""/>
+        <dsp:cNvSpPr/>
+      </dsp:nvSpPr>
+      <dsp:spPr>
+        <a:xfrm rot="10769435">
+          <a:off x="4370272" y="2494737"/>
+          <a:ext cx="210362" cy="224510"/>
+        </a:xfrm>
+        <a:prstGeom prst="rightArrow">
+          <a:avLst>
+            <a:gd name="adj1" fmla="val 60000"/>
+            <a:gd name="adj2" fmla="val 50000"/>
+          </a:avLst>
+        </a:prstGeom>
+        <a:gradFill rotWithShape="1">
+          <a:gsLst>
+            <a:gs pos="0">
+              <a:schemeClr val="accent5">
+                <a:tint val="85000"/>
+                <a:shade val="98000"/>
+                <a:satMod val="110000"/>
+                <a:lumMod val="103000"/>
+              </a:schemeClr>
+            </a:gs>
+            <a:gs pos="50000">
+              <a:schemeClr val="accent5">
+                <a:shade val="85000"/>
+                <a:satMod val="105000"/>
+                <a:lumMod val="100000"/>
+              </a:schemeClr>
+            </a:gs>
+            <a:gs pos="100000">
+              <a:schemeClr val="accent5">
+                <a:shade val="60000"/>
+                <a:satMod val="120000"/>
+                <a:lumMod val="100000"/>
+              </a:schemeClr>
+            </a:gs>
+          </a:gsLst>
+          <a:lin ang="5400000" scaled="0"/>
+        </a:gradFill>
+        <a:ln>
+          <a:noFill/>
+        </a:ln>
+        <a:effectLst>
+          <a:outerShdw blurRad="88900" dist="27940" dir="5400000" algn="ctr" rotWithShape="0">
+            <a:srgbClr val="000000">
+              <a:alpha val="63000"/>
+            </a:srgbClr>
+          </a:outerShdw>
+        </a:effectLst>
+      </dsp:spPr>
+      <dsp:style>
+        <a:lnRef idx="0">
+          <a:schemeClr val="accent5"/>
+        </a:lnRef>
+        <a:fillRef idx="3">
+          <a:schemeClr val="accent5"/>
+        </a:fillRef>
+        <a:effectRef idx="3">
+          <a:schemeClr val="accent5"/>
+        </a:effectRef>
+        <a:fontRef idx="minor">
+          <a:schemeClr val="lt1"/>
+        </a:fontRef>
+      </dsp:style>
+      <dsp:txBody>
+        <a:bodyPr spcFirstLastPara="0" vert="horz" wrap="square" lIns="0" tIns="0" rIns="0" bIns="0" numCol="1" spcCol="1270" anchor="ctr" anchorCtr="0">
+          <a:noAutofit/>
+        </a:bodyPr>
+        <a:lstStyle/>
+        <a:p>
+          <a:pPr lvl="0" algn="ctr" defTabSz="400050">
+            <a:lnSpc>
+              <a:spcPct val="90000"/>
+            </a:lnSpc>
+            <a:spcBef>
+              <a:spcPct val="0"/>
+            </a:spcBef>
+            <a:spcAft>
+              <a:spcPct val="35000"/>
+            </a:spcAft>
+          </a:pPr>
+          <a:endParaRPr lang="en-GB" sz="900" kern="1200"/>
+        </a:p>
+      </dsp:txBody>
+      <dsp:txXfrm rot="10800000">
+        <a:off x="4433380" y="2539358"/>
+        <a:ext cx="147253" cy="134706"/>
+      </dsp:txXfrm>
+    </dsp:sp>
+    <dsp:sp modelId="{DD678B2C-6F52-476E-BB5B-B0223FFEEA8F}">
+      <dsp:nvSpPr>
+        <dsp:cNvPr id="0" name=""/>
+        <dsp:cNvSpPr/>
+      </dsp:nvSpPr>
+      <dsp:spPr>
+        <a:xfrm>
+          <a:off x="3377675" y="2290221"/>
+          <a:ext cx="905284" cy="645015"/>
+        </a:xfrm>
+        <a:prstGeom prst="roundRect">
+          <a:avLst>
+            <a:gd name="adj" fmla="val 10000"/>
+          </a:avLst>
+        </a:prstGeom>
+        <a:gradFill rotWithShape="1">
+          <a:gsLst>
+            <a:gs pos="0">
+              <a:schemeClr val="accent1">
+                <a:tint val="85000"/>
+                <a:shade val="98000"/>
+                <a:satMod val="110000"/>
+                <a:lumMod val="103000"/>
+              </a:schemeClr>
+            </a:gs>
+            <a:gs pos="50000">
+              <a:schemeClr val="accent1">
+                <a:shade val="85000"/>
+                <a:satMod val="105000"/>
+                <a:lumMod val="100000"/>
+              </a:schemeClr>
+            </a:gs>
+            <a:gs pos="100000">
+              <a:schemeClr val="accent1">
+                <a:shade val="60000"/>
+                <a:satMod val="120000"/>
+                <a:lumMod val="100000"/>
+              </a:schemeClr>
+            </a:gs>
+          </a:gsLst>
+          <a:lin ang="5400000" scaled="0"/>
+        </a:gradFill>
+        <a:ln>
+          <a:noFill/>
+        </a:ln>
+        <a:effectLst>
+          <a:outerShdw blurRad="88900" dist="27940" dir="5400000" algn="ctr" rotWithShape="0">
+            <a:srgbClr val="000000">
+              <a:alpha val="63000"/>
+            </a:srgbClr>
+          </a:outerShdw>
+        </a:effectLst>
+      </dsp:spPr>
+      <dsp:style>
+        <a:lnRef idx="0">
+          <a:schemeClr val="accent1"/>
+        </a:lnRef>
+        <a:fillRef idx="3">
+          <a:schemeClr val="accent1"/>
+        </a:fillRef>
+        <a:effectRef idx="3">
+          <a:schemeClr val="accent1"/>
+        </a:effectRef>
+        <a:fontRef idx="minor">
+          <a:schemeClr val="lt1"/>
+        </a:fontRef>
+      </dsp:style>
+      <dsp:txBody>
+        <a:bodyPr spcFirstLastPara="0" vert="horz" wrap="square" lIns="45720" tIns="45720" rIns="45720" bIns="45720" numCol="1" spcCol="1270" anchor="ctr" anchorCtr="0">
+          <a:noAutofit/>
+        </a:bodyPr>
+        <a:lstStyle/>
+        <a:p>
+          <a:pPr lvl="0" algn="ctr" defTabSz="533400">
+            <a:lnSpc>
+              <a:spcPct val="90000"/>
+            </a:lnSpc>
+            <a:spcBef>
+              <a:spcPct val="0"/>
+            </a:spcBef>
+            <a:spcAft>
+              <a:spcPct val="35000"/>
+            </a:spcAft>
+          </a:pPr>
+          <a:r>
+            <a:rPr lang="en-US" sz="1200" kern="1200" dirty="0" smtClean="0"/>
+            <a:t>View</a:t>
+          </a:r>
+          <a:endParaRPr lang="en-GB" sz="1200" kern="1200" dirty="0"/>
+        </a:p>
+      </dsp:txBody>
+      <dsp:txXfrm>
+        <a:off x="3396567" y="2309113"/>
+        <a:ext cx="867500" cy="607231"/>
+      </dsp:txXfrm>
+    </dsp:sp>
+  </dsp:spTree>
+</dsp:drawing>
+</file>
+
 <file path=ppt/diagrams/layout1.xml><?xml version="1.0" encoding="utf-8"?>
 <dgm:layoutDef xmlns:dgm="http://schemas.openxmlformats.org/drawingml/2006/diagram" xmlns:a="http://schemas.openxmlformats.org/drawingml/2006/main" uniqueId="urn:microsoft.com/office/officeart/2005/8/layout/cycle5">
   <dgm:title val=""/>
@@ -2012,7 +4942,1187 @@
 </dgm:layoutDef>
 </file>
 
+<file path=ppt/diagrams/layout2.xml><?xml version="1.0" encoding="utf-8"?>
+<dgm:layoutDef xmlns:dgm="http://schemas.openxmlformats.org/drawingml/2006/diagram" xmlns:a="http://schemas.openxmlformats.org/drawingml/2006/main" uniqueId="urn:microsoft.com/office/officeart/2005/8/layout/process1">
+  <dgm:title val=""/>
+  <dgm:desc val=""/>
+  <dgm:catLst>
+    <dgm:cat type="process" pri="1000"/>
+    <dgm:cat type="convert" pri="15000"/>
+  </dgm:catLst>
+  <dgm:sampData useDef="1">
+    <dgm:dataModel>
+      <dgm:ptLst/>
+      <dgm:bg/>
+      <dgm:whole/>
+    </dgm:dataModel>
+  </dgm:sampData>
+  <dgm:styleData>
+    <dgm:dataModel>
+      <dgm:ptLst>
+        <dgm:pt modelId="0" type="doc"/>
+        <dgm:pt modelId="1"/>
+        <dgm:pt modelId="2"/>
+      </dgm:ptLst>
+      <dgm:cxnLst>
+        <dgm:cxn modelId="3" srcId="0" destId="1" srcOrd="0" destOrd="0"/>
+        <dgm:cxn modelId="4" srcId="0" destId="2" srcOrd="1" destOrd="0"/>
+      </dgm:cxnLst>
+      <dgm:bg/>
+      <dgm:whole/>
+    </dgm:dataModel>
+  </dgm:styleData>
+  <dgm:clrData>
+    <dgm:dataModel>
+      <dgm:ptLst>
+        <dgm:pt modelId="0" type="doc"/>
+        <dgm:pt modelId="1"/>
+        <dgm:pt modelId="2"/>
+        <dgm:pt modelId="3"/>
+        <dgm:pt modelId="4"/>
+      </dgm:ptLst>
+      <dgm:cxnLst>
+        <dgm:cxn modelId="5" srcId="0" destId="1" srcOrd="0" destOrd="0"/>
+        <dgm:cxn modelId="6" srcId="0" destId="2" srcOrd="1" destOrd="0"/>
+        <dgm:cxn modelId="7" srcId="0" destId="3" srcOrd="2" destOrd="0"/>
+        <dgm:cxn modelId="8" srcId="0" destId="4" srcOrd="3" destOrd="0"/>
+      </dgm:cxnLst>
+      <dgm:bg/>
+      <dgm:whole/>
+    </dgm:dataModel>
+  </dgm:clrData>
+  <dgm:layoutNode name="Name0">
+    <dgm:varLst>
+      <dgm:dir/>
+      <dgm:resizeHandles val="exact"/>
+    </dgm:varLst>
+    <dgm:choose name="Name1">
+      <dgm:if name="Name2" func="var" arg="dir" op="equ" val="norm">
+        <dgm:alg type="lin"/>
+      </dgm:if>
+      <dgm:else name="Name3">
+        <dgm:alg type="lin">
+          <dgm:param type="linDir" val="fromR"/>
+        </dgm:alg>
+      </dgm:else>
+    </dgm:choose>
+    <dgm:shape xmlns:r="http://schemas.openxmlformats.org/officeDocument/2006/relationships" r:blip="">
+      <dgm:adjLst/>
+    </dgm:shape>
+    <dgm:presOf/>
+    <dgm:constrLst>
+      <dgm:constr type="w" for="ch" ptType="node" refType="w"/>
+      <dgm:constr type="h" for="ch" ptType="node" op="equ"/>
+      <dgm:constr type="primFontSz" for="ch" ptType="node" op="equ" val="65"/>
+      <dgm:constr type="w" for="ch" ptType="sibTrans" refType="w" refFor="ch" refPtType="node" op="equ" fact="0.4"/>
+      <dgm:constr type="h" for="ch" ptType="sibTrans" op="equ"/>
+      <dgm:constr type="primFontSz" for="des" forName="connectorText" op="equ" val="55"/>
+      <dgm:constr type="primFontSz" for="des" forName="connectorText" refType="primFontSz" refFor="ch" refPtType="node" op="lte" fact="0.8"/>
+    </dgm:constrLst>
+    <dgm:ruleLst/>
+    <dgm:forEach name="nodesForEach" axis="ch" ptType="node">
+      <dgm:layoutNode name="node">
+        <dgm:varLst>
+          <dgm:bulletEnabled val="1"/>
+        </dgm:varLst>
+        <dgm:alg type="tx"/>
+        <dgm:shape xmlns:r="http://schemas.openxmlformats.org/officeDocument/2006/relationships" type="roundRect" r:blip="">
+          <dgm:adjLst>
+            <dgm:adj idx="1" val="0.1"/>
+          </dgm:adjLst>
+        </dgm:shape>
+        <dgm:presOf axis="desOrSelf" ptType="node"/>
+        <dgm:constrLst>
+          <dgm:constr type="h" refType="w" fact="0.6"/>
+          <dgm:constr type="tMarg" refType="primFontSz" fact="0.3"/>
+          <dgm:constr type="bMarg" refType="primFontSz" fact="0.3"/>
+          <dgm:constr type="lMarg" refType="primFontSz" fact="0.3"/>
+          <dgm:constr type="rMarg" refType="primFontSz" fact="0.3"/>
+        </dgm:constrLst>
+        <dgm:ruleLst>
+          <dgm:rule type="primFontSz" val="18" fact="NaN" max="NaN"/>
+          <dgm:rule type="h" val="NaN" fact="1.5" max="NaN"/>
+          <dgm:rule type="primFontSz" val="5" fact="NaN" max="NaN"/>
+          <dgm:rule type="h" val="INF" fact="NaN" max="NaN"/>
+        </dgm:ruleLst>
+      </dgm:layoutNode>
+      <dgm:forEach name="sibTransForEach" axis="followSib" ptType="sibTrans" cnt="1">
+        <dgm:layoutNode name="sibTrans">
+          <dgm:alg type="conn">
+            <dgm:param type="begPts" val="auto"/>
+            <dgm:param type="endPts" val="auto"/>
+          </dgm:alg>
+          <dgm:shape xmlns:r="http://schemas.openxmlformats.org/officeDocument/2006/relationships" type="conn" r:blip="">
+            <dgm:adjLst/>
+          </dgm:shape>
+          <dgm:presOf axis="self"/>
+          <dgm:constrLst>
+            <dgm:constr type="h" refType="w" fact="0.62"/>
+            <dgm:constr type="connDist"/>
+            <dgm:constr type="begPad" refType="connDist" fact="0.25"/>
+            <dgm:constr type="endPad" refType="connDist" fact="0.22"/>
+          </dgm:constrLst>
+          <dgm:ruleLst/>
+          <dgm:layoutNode name="connectorText">
+            <dgm:alg type="tx">
+              <dgm:param type="autoTxRot" val="grav"/>
+            </dgm:alg>
+            <dgm:shape xmlns:r="http://schemas.openxmlformats.org/officeDocument/2006/relationships" type="conn" r:blip="" hideGeom="1">
+              <dgm:adjLst/>
+            </dgm:shape>
+            <dgm:presOf axis="self"/>
+            <dgm:constrLst>
+              <dgm:constr type="lMarg"/>
+              <dgm:constr type="rMarg"/>
+              <dgm:constr type="tMarg"/>
+              <dgm:constr type="bMarg"/>
+            </dgm:constrLst>
+            <dgm:ruleLst>
+              <dgm:rule type="primFontSz" val="5" fact="NaN" max="NaN"/>
+            </dgm:ruleLst>
+          </dgm:layoutNode>
+        </dgm:layoutNode>
+      </dgm:forEach>
+    </dgm:forEach>
+  </dgm:layoutNode>
+</dgm:layoutDef>
+</file>
+
 <file path=ppt/diagrams/quickStyle1.xml><?xml version="1.0" encoding="utf-8"?>
+<dgm:styleDef xmlns:dgm="http://schemas.openxmlformats.org/drawingml/2006/diagram" xmlns:a="http://schemas.openxmlformats.org/drawingml/2006/main" uniqueId="urn:microsoft.com/office/officeart/2005/8/quickstyle/simple1">
+  <dgm:title val=""/>
+  <dgm:desc val=""/>
+  <dgm:catLst>
+    <dgm:cat type="simple" pri="10100"/>
+  </dgm:catLst>
+  <dgm:scene3d>
+    <a:camera prst="orthographicFront"/>
+    <a:lightRig rig="threePt" dir="t"/>
+  </dgm:scene3d>
+  <dgm:styleLbl name="node0">
+    <dgm:scene3d>
+      <a:camera prst="orthographicFront"/>
+      <a:lightRig rig="threePt" dir="t"/>
+    </dgm:scene3d>
+    <dgm:sp3d/>
+    <dgm:txPr/>
+    <dgm:style>
+      <a:lnRef idx="2">
+        <a:scrgbClr r="0" g="0" b="0"/>
+      </a:lnRef>
+      <a:fillRef idx="1">
+        <a:scrgbClr r="0" g="0" b="0"/>
+      </a:fillRef>
+      <a:effectRef idx="0">
+        <a:scrgbClr r="0" g="0" b="0"/>
+      </a:effectRef>
+      <a:fontRef idx="minor">
+        <a:schemeClr val="lt1"/>
+      </a:fontRef>
+    </dgm:style>
+  </dgm:styleLbl>
+  <dgm:styleLbl name="lnNode1">
+    <dgm:scene3d>
+      <a:camera prst="orthographicFront"/>
+      <a:lightRig rig="threePt" dir="t"/>
+    </dgm:scene3d>
+    <dgm:sp3d/>
+    <dgm:txPr/>
+    <dgm:style>
+      <a:lnRef idx="2">
+        <a:scrgbClr r="0" g="0" b="0"/>
+      </a:lnRef>
+      <a:fillRef idx="1">
+        <a:scrgbClr r="0" g="0" b="0"/>
+      </a:fillRef>
+      <a:effectRef idx="0">
+        <a:scrgbClr r="0" g="0" b="0"/>
+      </a:effectRef>
+      <a:fontRef idx="minor">
+        <a:schemeClr val="lt1"/>
+      </a:fontRef>
+    </dgm:style>
+  </dgm:styleLbl>
+  <dgm:styleLbl name="vennNode1">
+    <dgm:scene3d>
+      <a:camera prst="orthographicFront"/>
+      <a:lightRig rig="threePt" dir="t"/>
+    </dgm:scene3d>
+    <dgm:sp3d/>
+    <dgm:txPr/>
+    <dgm:style>
+      <a:lnRef idx="2">
+        <a:scrgbClr r="0" g="0" b="0"/>
+      </a:lnRef>
+      <a:fillRef idx="1">
+        <a:scrgbClr r="0" g="0" b="0"/>
+      </a:fillRef>
+      <a:effectRef idx="0">
+        <a:scrgbClr r="0" g="0" b="0"/>
+      </a:effectRef>
+      <a:fontRef idx="minor">
+        <a:schemeClr val="tx1"/>
+      </a:fontRef>
+    </dgm:style>
+  </dgm:styleLbl>
+  <dgm:styleLbl name="alignNode1">
+    <dgm:scene3d>
+      <a:camera prst="orthographicFront"/>
+      <a:lightRig rig="threePt" dir="t"/>
+    </dgm:scene3d>
+    <dgm:sp3d/>
+    <dgm:txPr/>
+    <dgm:style>
+      <a:lnRef idx="2">
+        <a:scrgbClr r="0" g="0" b="0"/>
+      </a:lnRef>
+      <a:fillRef idx="1">
+        <a:scrgbClr r="0" g="0" b="0"/>
+      </a:fillRef>
+      <a:effectRef idx="0">
+        <a:scrgbClr r="0" g="0" b="0"/>
+      </a:effectRef>
+      <a:fontRef idx="minor">
+        <a:schemeClr val="lt1"/>
+      </a:fontRef>
+    </dgm:style>
+  </dgm:styleLbl>
+  <dgm:styleLbl name="node1">
+    <dgm:scene3d>
+      <a:camera prst="orthographicFront"/>
+      <a:lightRig rig="threePt" dir="t"/>
+    </dgm:scene3d>
+    <dgm:sp3d/>
+    <dgm:txPr/>
+    <dgm:style>
+      <a:lnRef idx="2">
+        <a:scrgbClr r="0" g="0" b="0"/>
+      </a:lnRef>
+      <a:fillRef idx="1">
+        <a:scrgbClr r="0" g="0" b="0"/>
+      </a:fillRef>
+      <a:effectRef idx="0">
+        <a:scrgbClr r="0" g="0" b="0"/>
+      </a:effectRef>
+      <a:fontRef idx="minor">
+        <a:schemeClr val="lt1"/>
+      </a:fontRef>
+    </dgm:style>
+  </dgm:styleLbl>
+  <dgm:styleLbl name="node2">
+    <dgm:scene3d>
+      <a:camera prst="orthographicFront"/>
+      <a:lightRig rig="threePt" dir="t"/>
+    </dgm:scene3d>
+    <dgm:sp3d/>
+    <dgm:txPr/>
+    <dgm:style>
+      <a:lnRef idx="2">
+        <a:scrgbClr r="0" g="0" b="0"/>
+      </a:lnRef>
+      <a:fillRef idx="1">
+        <a:scrgbClr r="0" g="0" b="0"/>
+      </a:fillRef>
+      <a:effectRef idx="0">
+        <a:scrgbClr r="0" g="0" b="0"/>
+      </a:effectRef>
+      <a:fontRef idx="minor">
+        <a:schemeClr val="lt1"/>
+      </a:fontRef>
+    </dgm:style>
+  </dgm:styleLbl>
+  <dgm:styleLbl name="node3">
+    <dgm:scene3d>
+      <a:camera prst="orthographicFront"/>
+      <a:lightRig rig="threePt" dir="t"/>
+    </dgm:scene3d>
+    <dgm:sp3d/>
+    <dgm:txPr/>
+    <dgm:style>
+      <a:lnRef idx="2">
+        <a:scrgbClr r="0" g="0" b="0"/>
+      </a:lnRef>
+      <a:fillRef idx="1">
+        <a:scrgbClr r="0" g="0" b="0"/>
+      </a:fillRef>
+      <a:effectRef idx="0">
+        <a:scrgbClr r="0" g="0" b="0"/>
+      </a:effectRef>
+      <a:fontRef idx="minor">
+        <a:schemeClr val="lt1"/>
+      </a:fontRef>
+    </dgm:style>
+  </dgm:styleLbl>
+  <dgm:styleLbl name="node4">
+    <dgm:scene3d>
+      <a:camera prst="orthographicFront"/>
+      <a:lightRig rig="threePt" dir="t"/>
+    </dgm:scene3d>
+    <dgm:sp3d/>
+    <dgm:txPr/>
+    <dgm:style>
+      <a:lnRef idx="2">
+        <a:scrgbClr r="0" g="0" b="0"/>
+      </a:lnRef>
+      <a:fillRef idx="1">
+        <a:scrgbClr r="0" g="0" b="0"/>
+      </a:fillRef>
+      <a:effectRef idx="0">
+        <a:scrgbClr r="0" g="0" b="0"/>
+      </a:effectRef>
+      <a:fontRef idx="minor">
+        <a:schemeClr val="lt1"/>
+      </a:fontRef>
+    </dgm:style>
+  </dgm:styleLbl>
+  <dgm:styleLbl name="fgImgPlace1">
+    <dgm:scene3d>
+      <a:camera prst="orthographicFront"/>
+      <a:lightRig rig="threePt" dir="t"/>
+    </dgm:scene3d>
+    <dgm:sp3d/>
+    <dgm:txPr/>
+    <dgm:style>
+      <a:lnRef idx="2">
+        <a:scrgbClr r="0" g="0" b="0"/>
+      </a:lnRef>
+      <a:fillRef idx="1">
+        <a:scrgbClr r="0" g="0" b="0"/>
+      </a:fillRef>
+      <a:effectRef idx="0">
+        <a:scrgbClr r="0" g="0" b="0"/>
+      </a:effectRef>
+      <a:fontRef idx="minor"/>
+    </dgm:style>
+  </dgm:styleLbl>
+  <dgm:styleLbl name="alignImgPlace1">
+    <dgm:scene3d>
+      <a:camera prst="orthographicFront"/>
+      <a:lightRig rig="threePt" dir="t"/>
+    </dgm:scene3d>
+    <dgm:sp3d/>
+    <dgm:txPr/>
+    <dgm:style>
+      <a:lnRef idx="2">
+        <a:scrgbClr r="0" g="0" b="0"/>
+      </a:lnRef>
+      <a:fillRef idx="1">
+        <a:scrgbClr r="0" g="0" b="0"/>
+      </a:fillRef>
+      <a:effectRef idx="0">
+        <a:scrgbClr r="0" g="0" b="0"/>
+      </a:effectRef>
+      <a:fontRef idx="minor"/>
+    </dgm:style>
+  </dgm:styleLbl>
+  <dgm:styleLbl name="bgImgPlace1">
+    <dgm:scene3d>
+      <a:camera prst="orthographicFront"/>
+      <a:lightRig rig="threePt" dir="t"/>
+    </dgm:scene3d>
+    <dgm:sp3d/>
+    <dgm:txPr/>
+    <dgm:style>
+      <a:lnRef idx="2">
+        <a:scrgbClr r="0" g="0" b="0"/>
+      </a:lnRef>
+      <a:fillRef idx="1">
+        <a:scrgbClr r="0" g="0" b="0"/>
+      </a:fillRef>
+      <a:effectRef idx="0">
+        <a:scrgbClr r="0" g="0" b="0"/>
+      </a:effectRef>
+      <a:fontRef idx="minor"/>
+    </dgm:style>
+  </dgm:styleLbl>
+  <dgm:styleLbl name="sibTrans2D1">
+    <dgm:scene3d>
+      <a:camera prst="orthographicFront"/>
+      <a:lightRig rig="threePt" dir="t"/>
+    </dgm:scene3d>
+    <dgm:sp3d/>
+    <dgm:txPr/>
+    <dgm:style>
+      <a:lnRef idx="0">
+        <a:scrgbClr r="0" g="0" b="0"/>
+      </a:lnRef>
+      <a:fillRef idx="1">
+        <a:scrgbClr r="0" g="0" b="0"/>
+      </a:fillRef>
+      <a:effectRef idx="0">
+        <a:scrgbClr r="0" g="0" b="0"/>
+      </a:effectRef>
+      <a:fontRef idx="minor">
+        <a:schemeClr val="lt1"/>
+      </a:fontRef>
+    </dgm:style>
+  </dgm:styleLbl>
+  <dgm:styleLbl name="fgSibTrans2D1">
+    <dgm:scene3d>
+      <a:camera prst="orthographicFront"/>
+      <a:lightRig rig="threePt" dir="t"/>
+    </dgm:scene3d>
+    <dgm:sp3d/>
+    <dgm:txPr/>
+    <dgm:style>
+      <a:lnRef idx="0">
+        <a:scrgbClr r="0" g="0" b="0"/>
+      </a:lnRef>
+      <a:fillRef idx="1">
+        <a:scrgbClr r="0" g="0" b="0"/>
+      </a:fillRef>
+      <a:effectRef idx="0">
+        <a:scrgbClr r="0" g="0" b="0"/>
+      </a:effectRef>
+      <a:fontRef idx="minor">
+        <a:schemeClr val="lt1"/>
+      </a:fontRef>
+    </dgm:style>
+  </dgm:styleLbl>
+  <dgm:styleLbl name="bgSibTrans2D1">
+    <dgm:scene3d>
+      <a:camera prst="orthographicFront"/>
+      <a:lightRig rig="threePt" dir="t"/>
+    </dgm:scene3d>
+    <dgm:sp3d/>
+    <dgm:txPr/>
+    <dgm:style>
+      <a:lnRef idx="0">
+        <a:scrgbClr r="0" g="0" b="0"/>
+      </a:lnRef>
+      <a:fillRef idx="1">
+        <a:scrgbClr r="0" g="0" b="0"/>
+      </a:fillRef>
+      <a:effectRef idx="0">
+        <a:scrgbClr r="0" g="0" b="0"/>
+      </a:effectRef>
+      <a:fontRef idx="minor">
+        <a:schemeClr val="lt1"/>
+      </a:fontRef>
+    </dgm:style>
+  </dgm:styleLbl>
+  <dgm:styleLbl name="sibTrans1D1">
+    <dgm:scene3d>
+      <a:camera prst="orthographicFront"/>
+      <a:lightRig rig="threePt" dir="t"/>
+    </dgm:scene3d>
+    <dgm:sp3d/>
+    <dgm:txPr/>
+    <dgm:style>
+      <a:lnRef idx="1">
+        <a:scrgbClr r="0" g="0" b="0"/>
+      </a:lnRef>
+      <a:fillRef idx="0">
+        <a:scrgbClr r="0" g="0" b="0"/>
+      </a:fillRef>
+      <a:effectRef idx="0">
+        <a:scrgbClr r="0" g="0" b="0"/>
+      </a:effectRef>
+      <a:fontRef idx="minor"/>
+    </dgm:style>
+  </dgm:styleLbl>
+  <dgm:styleLbl name="callout">
+    <dgm:scene3d>
+      <a:camera prst="orthographicFront"/>
+      <a:lightRig rig="threePt" dir="t"/>
+    </dgm:scene3d>
+    <dgm:sp3d/>
+    <dgm:txPr/>
+    <dgm:style>
+      <a:lnRef idx="2">
+        <a:scrgbClr r="0" g="0" b="0"/>
+      </a:lnRef>
+      <a:fillRef idx="1">
+        <a:scrgbClr r="0" g="0" b="0"/>
+      </a:fillRef>
+      <a:effectRef idx="0">
+        <a:scrgbClr r="0" g="0" b="0"/>
+      </a:effectRef>
+      <a:fontRef idx="minor"/>
+    </dgm:style>
+  </dgm:styleLbl>
+  <dgm:styleLbl name="asst0">
+    <dgm:scene3d>
+      <a:camera prst="orthographicFront"/>
+      <a:lightRig rig="threePt" dir="t"/>
+    </dgm:scene3d>
+    <dgm:sp3d/>
+    <dgm:txPr/>
+    <dgm:style>
+      <a:lnRef idx="2">
+        <a:scrgbClr r="0" g="0" b="0"/>
+      </a:lnRef>
+      <a:fillRef idx="1">
+        <a:scrgbClr r="0" g="0" b="0"/>
+      </a:fillRef>
+      <a:effectRef idx="0">
+        <a:scrgbClr r="0" g="0" b="0"/>
+      </a:effectRef>
+      <a:fontRef idx="minor">
+        <a:schemeClr val="lt1"/>
+      </a:fontRef>
+    </dgm:style>
+  </dgm:styleLbl>
+  <dgm:styleLbl name="asst1">
+    <dgm:scene3d>
+      <a:camera prst="orthographicFront"/>
+      <a:lightRig rig="threePt" dir="t"/>
+    </dgm:scene3d>
+    <dgm:sp3d/>
+    <dgm:txPr/>
+    <dgm:style>
+      <a:lnRef idx="2">
+        <a:scrgbClr r="0" g="0" b="0"/>
+      </a:lnRef>
+      <a:fillRef idx="1">
+        <a:scrgbClr r="0" g="0" b="0"/>
+      </a:fillRef>
+      <a:effectRef idx="0">
+        <a:scrgbClr r="0" g="0" b="0"/>
+      </a:effectRef>
+      <a:fontRef idx="minor">
+        <a:schemeClr val="lt1"/>
+      </a:fontRef>
+    </dgm:style>
+  </dgm:styleLbl>
+  <dgm:styleLbl name="asst2">
+    <dgm:scene3d>
+      <a:camera prst="orthographicFront"/>
+      <a:lightRig rig="threePt" dir="t"/>
+    </dgm:scene3d>
+    <dgm:sp3d/>
+    <dgm:txPr/>
+    <dgm:style>
+      <a:lnRef idx="2">
+        <a:scrgbClr r="0" g="0" b="0"/>
+      </a:lnRef>
+      <a:fillRef idx="1">
+        <a:scrgbClr r="0" g="0" b="0"/>
+      </a:fillRef>
+      <a:effectRef idx="0">
+        <a:scrgbClr r="0" g="0" b="0"/>
+      </a:effectRef>
+      <a:fontRef idx="minor">
+        <a:schemeClr val="lt1"/>
+      </a:fontRef>
+    </dgm:style>
+  </dgm:styleLbl>
+  <dgm:styleLbl name="asst3">
+    <dgm:scene3d>
+      <a:camera prst="orthographicFront"/>
+      <a:lightRig rig="threePt" dir="t"/>
+    </dgm:scene3d>
+    <dgm:sp3d/>
+    <dgm:txPr/>
+    <dgm:style>
+      <a:lnRef idx="2">
+        <a:scrgbClr r="0" g="0" b="0"/>
+      </a:lnRef>
+      <a:fillRef idx="1">
+        <a:scrgbClr r="0" g="0" b="0"/>
+      </a:fillRef>
+      <a:effectRef idx="0">
+        <a:scrgbClr r="0" g="0" b="0"/>
+      </a:effectRef>
+      <a:fontRef idx="minor">
+        <a:schemeClr val="lt1"/>
+      </a:fontRef>
+    </dgm:style>
+  </dgm:styleLbl>
+  <dgm:styleLbl name="asst4">
+    <dgm:scene3d>
+      <a:camera prst="orthographicFront"/>
+      <a:lightRig rig="threePt" dir="t"/>
+    </dgm:scene3d>
+    <dgm:sp3d/>
+    <dgm:txPr/>
+    <dgm:style>
+      <a:lnRef idx="2">
+        <a:scrgbClr r="0" g="0" b="0"/>
+      </a:lnRef>
+      <a:fillRef idx="1">
+        <a:scrgbClr r="0" g="0" b="0"/>
+      </a:fillRef>
+      <a:effectRef idx="0">
+        <a:scrgbClr r="0" g="0" b="0"/>
+      </a:effectRef>
+      <a:fontRef idx="minor">
+        <a:schemeClr val="lt1"/>
+      </a:fontRef>
+    </dgm:style>
+  </dgm:styleLbl>
+  <dgm:styleLbl name="parChTrans2D1">
+    <dgm:scene3d>
+      <a:camera prst="orthographicFront"/>
+      <a:lightRig rig="threePt" dir="t"/>
+    </dgm:scene3d>
+    <dgm:sp3d/>
+    <dgm:txPr/>
+    <dgm:style>
+      <a:lnRef idx="2">
+        <a:scrgbClr r="0" g="0" b="0"/>
+      </a:lnRef>
+      <a:fillRef idx="1">
+        <a:scrgbClr r="0" g="0" b="0"/>
+      </a:fillRef>
+      <a:effectRef idx="0">
+        <a:scrgbClr r="0" g="0" b="0"/>
+      </a:effectRef>
+      <a:fontRef idx="minor">
+        <a:schemeClr val="lt1"/>
+      </a:fontRef>
+    </dgm:style>
+  </dgm:styleLbl>
+  <dgm:styleLbl name="parChTrans2D2">
+    <dgm:scene3d>
+      <a:camera prst="orthographicFront"/>
+      <a:lightRig rig="threePt" dir="t"/>
+    </dgm:scene3d>
+    <dgm:sp3d/>
+    <dgm:txPr/>
+    <dgm:style>
+      <a:lnRef idx="2">
+        <a:scrgbClr r="0" g="0" b="0"/>
+      </a:lnRef>
+      <a:fillRef idx="1">
+        <a:scrgbClr r="0" g="0" b="0"/>
+      </a:fillRef>
+      <a:effectRef idx="0">
+        <a:scrgbClr r="0" g="0" b="0"/>
+      </a:effectRef>
+      <a:fontRef idx="minor">
+        <a:schemeClr val="lt1"/>
+      </a:fontRef>
+    </dgm:style>
+  </dgm:styleLbl>
+  <dgm:styleLbl name="parChTrans2D3">
+    <dgm:scene3d>
+      <a:camera prst="orthographicFront"/>
+      <a:lightRig rig="threePt" dir="t"/>
+    </dgm:scene3d>
+    <dgm:sp3d/>
+    <dgm:txPr/>
+    <dgm:style>
+      <a:lnRef idx="2">
+        <a:scrgbClr r="0" g="0" b="0"/>
+      </a:lnRef>
+      <a:fillRef idx="1">
+        <a:scrgbClr r="0" g="0" b="0"/>
+      </a:fillRef>
+      <a:effectRef idx="0">
+        <a:scrgbClr r="0" g="0" b="0"/>
+      </a:effectRef>
+      <a:fontRef idx="minor">
+        <a:schemeClr val="lt1"/>
+      </a:fontRef>
+    </dgm:style>
+  </dgm:styleLbl>
+  <dgm:styleLbl name="parChTrans2D4">
+    <dgm:scene3d>
+      <a:camera prst="orthographicFront"/>
+      <a:lightRig rig="threePt" dir="t"/>
+    </dgm:scene3d>
+    <dgm:sp3d/>
+    <dgm:txPr/>
+    <dgm:style>
+      <a:lnRef idx="2">
+        <a:scrgbClr r="0" g="0" b="0"/>
+      </a:lnRef>
+      <a:fillRef idx="1">
+        <a:scrgbClr r="0" g="0" b="0"/>
+      </a:fillRef>
+      <a:effectRef idx="0">
+        <a:scrgbClr r="0" g="0" b="0"/>
+      </a:effectRef>
+      <a:fontRef idx="minor">
+        <a:schemeClr val="lt1"/>
+      </a:fontRef>
+    </dgm:style>
+  </dgm:styleLbl>
+  <dgm:styleLbl name="parChTrans1D1">
+    <dgm:scene3d>
+      <a:camera prst="orthographicFront"/>
+      <a:lightRig rig="threePt" dir="t"/>
+    </dgm:scene3d>
+    <dgm:sp3d/>
+    <dgm:txPr/>
+    <dgm:style>
+      <a:lnRef idx="2">
+        <a:scrgbClr r="0" g="0" b="0"/>
+      </a:lnRef>
+      <a:fillRef idx="0">
+        <a:scrgbClr r="0" g="0" b="0"/>
+      </a:fillRef>
+      <a:effectRef idx="0">
+        <a:scrgbClr r="0" g="0" b="0"/>
+      </a:effectRef>
+      <a:fontRef idx="minor"/>
+    </dgm:style>
+  </dgm:styleLbl>
+  <dgm:styleLbl name="parChTrans1D2">
+    <dgm:scene3d>
+      <a:camera prst="orthographicFront"/>
+      <a:lightRig rig="threePt" dir="t"/>
+    </dgm:scene3d>
+    <dgm:sp3d/>
+    <dgm:txPr/>
+    <dgm:style>
+      <a:lnRef idx="2">
+        <a:scrgbClr r="0" g="0" b="0"/>
+      </a:lnRef>
+      <a:fillRef idx="0">
+        <a:scrgbClr r="0" g="0" b="0"/>
+      </a:fillRef>
+      <a:effectRef idx="0">
+        <a:scrgbClr r="0" g="0" b="0"/>
+      </a:effectRef>
+      <a:fontRef idx="minor"/>
+    </dgm:style>
+  </dgm:styleLbl>
+  <dgm:styleLbl name="parChTrans1D3">
+    <dgm:scene3d>
+      <a:camera prst="orthographicFront"/>
+      <a:lightRig rig="threePt" dir="t"/>
+    </dgm:scene3d>
+    <dgm:sp3d/>
+    <dgm:txPr/>
+    <dgm:style>
+      <a:lnRef idx="2">
+        <a:scrgbClr r="0" g="0" b="0"/>
+      </a:lnRef>
+      <a:fillRef idx="0">
+        <a:scrgbClr r="0" g="0" b="0"/>
+      </a:fillRef>
+      <a:effectRef idx="0">
+        <a:scrgbClr r="0" g="0" b="0"/>
+      </a:effectRef>
+      <a:fontRef idx="minor"/>
+    </dgm:style>
+  </dgm:styleLbl>
+  <dgm:styleLbl name="parChTrans1D4">
+    <dgm:scene3d>
+      <a:camera prst="orthographicFront"/>
+      <a:lightRig rig="threePt" dir="t"/>
+    </dgm:scene3d>
+    <dgm:sp3d/>
+    <dgm:txPr/>
+    <dgm:style>
+      <a:lnRef idx="2">
+        <a:scrgbClr r="0" g="0" b="0"/>
+      </a:lnRef>
+      <a:fillRef idx="0">
+        <a:scrgbClr r="0" g="0" b="0"/>
+      </a:fillRef>
+      <a:effectRef idx="0">
+        <a:scrgbClr r="0" g="0" b="0"/>
+      </a:effectRef>
+      <a:fontRef idx="minor"/>
+    </dgm:style>
+  </dgm:styleLbl>
+  <dgm:styleLbl name="fgAcc1">
+    <dgm:scene3d>
+      <a:camera prst="orthographicFront"/>
+      <a:lightRig rig="threePt" dir="t"/>
+    </dgm:scene3d>
+    <dgm:sp3d/>
+    <dgm:txPr/>
+    <dgm:style>
+      <a:lnRef idx="2">
+        <a:scrgbClr r="0" g="0" b="0"/>
+      </a:lnRef>
+      <a:fillRef idx="1">
+        <a:scrgbClr r="0" g="0" b="0"/>
+      </a:fillRef>
+      <a:effectRef idx="0">
+        <a:scrgbClr r="0" g="0" b="0"/>
+      </a:effectRef>
+      <a:fontRef idx="minor"/>
+    </dgm:style>
+  </dgm:styleLbl>
+  <dgm:styleLbl name="conFgAcc1">
+    <dgm:scene3d>
+      <a:camera prst="orthographicFront"/>
+      <a:lightRig rig="threePt" dir="t"/>
+    </dgm:scene3d>
+    <dgm:sp3d/>
+    <dgm:txPr/>
+    <dgm:style>
+      <a:lnRef idx="2">
+        <a:scrgbClr r="0" g="0" b="0"/>
+      </a:lnRef>
+      <a:fillRef idx="1">
+        <a:scrgbClr r="0" g="0" b="0"/>
+      </a:fillRef>
+      <a:effectRef idx="0">
+        <a:scrgbClr r="0" g="0" b="0"/>
+      </a:effectRef>
+      <a:fontRef idx="minor"/>
+    </dgm:style>
+  </dgm:styleLbl>
+  <dgm:styleLbl name="alignAcc1">
+    <dgm:scene3d>
+      <a:camera prst="orthographicFront"/>
+      <a:lightRig rig="threePt" dir="t"/>
+    </dgm:scene3d>
+    <dgm:sp3d/>
+    <dgm:txPr/>
+    <dgm:style>
+      <a:lnRef idx="2">
+        <a:scrgbClr r="0" g="0" b="0"/>
+      </a:lnRef>
+      <a:fillRef idx="1">
+        <a:scrgbClr r="0" g="0" b="0"/>
+      </a:fillRef>
+      <a:effectRef idx="0">
+        <a:scrgbClr r="0" g="0" b="0"/>
+      </a:effectRef>
+      <a:fontRef idx="minor"/>
+    </dgm:style>
+  </dgm:styleLbl>
+  <dgm:styleLbl name="trAlignAcc1">
+    <dgm:scene3d>
+      <a:camera prst="orthographicFront"/>
+      <a:lightRig rig="threePt" dir="t"/>
+    </dgm:scene3d>
+    <dgm:sp3d/>
+    <dgm:txPr/>
+    <dgm:style>
+      <a:lnRef idx="1">
+        <a:scrgbClr r="0" g="0" b="0"/>
+      </a:lnRef>
+      <a:fillRef idx="1">
+        <a:scrgbClr r="0" g="0" b="0"/>
+      </a:fillRef>
+      <a:effectRef idx="0">
+        <a:scrgbClr r="0" g="0" b="0"/>
+      </a:effectRef>
+      <a:fontRef idx="minor"/>
+    </dgm:style>
+  </dgm:styleLbl>
+  <dgm:styleLbl name="bgAcc1">
+    <dgm:scene3d>
+      <a:camera prst="orthographicFront"/>
+      <a:lightRig rig="threePt" dir="t"/>
+    </dgm:scene3d>
+    <dgm:sp3d/>
+    <dgm:txPr/>
+    <dgm:style>
+      <a:lnRef idx="2">
+        <a:scrgbClr r="0" g="0" b="0"/>
+      </a:lnRef>
+      <a:fillRef idx="1">
+        <a:scrgbClr r="0" g="0" b="0"/>
+      </a:fillRef>
+      <a:effectRef idx="0">
+        <a:scrgbClr r="0" g="0" b="0"/>
+      </a:effectRef>
+      <a:fontRef idx="minor"/>
+    </dgm:style>
+  </dgm:styleLbl>
+  <dgm:styleLbl name="solidFgAcc1">
+    <dgm:scene3d>
+      <a:camera prst="orthographicFront"/>
+      <a:lightRig rig="threePt" dir="t"/>
+    </dgm:scene3d>
+    <dgm:sp3d/>
+    <dgm:txPr/>
+    <dgm:style>
+      <a:lnRef idx="2">
+        <a:scrgbClr r="0" g="0" b="0"/>
+      </a:lnRef>
+      <a:fillRef idx="1">
+        <a:scrgbClr r="0" g="0" b="0"/>
+      </a:fillRef>
+      <a:effectRef idx="0">
+        <a:scrgbClr r="0" g="0" b="0"/>
+      </a:effectRef>
+      <a:fontRef idx="minor"/>
+    </dgm:style>
+  </dgm:styleLbl>
+  <dgm:styleLbl name="solidAlignAcc1">
+    <dgm:scene3d>
+      <a:camera prst="orthographicFront"/>
+      <a:lightRig rig="threePt" dir="t"/>
+    </dgm:scene3d>
+    <dgm:sp3d/>
+    <dgm:txPr/>
+    <dgm:style>
+      <a:lnRef idx="2">
+        <a:scrgbClr r="0" g="0" b="0"/>
+      </a:lnRef>
+      <a:fillRef idx="1">
+        <a:scrgbClr r="0" g="0" b="0"/>
+      </a:fillRef>
+      <a:effectRef idx="0">
+        <a:scrgbClr r="0" g="0" b="0"/>
+      </a:effectRef>
+      <a:fontRef idx="minor"/>
+    </dgm:style>
+  </dgm:styleLbl>
+  <dgm:styleLbl name="solidBgAcc1">
+    <dgm:scene3d>
+      <a:camera prst="orthographicFront"/>
+      <a:lightRig rig="threePt" dir="t"/>
+    </dgm:scene3d>
+    <dgm:sp3d/>
+    <dgm:txPr/>
+    <dgm:style>
+      <a:lnRef idx="2">
+        <a:scrgbClr r="0" g="0" b="0"/>
+      </a:lnRef>
+      <a:fillRef idx="1">
+        <a:scrgbClr r="0" g="0" b="0"/>
+      </a:fillRef>
+      <a:effectRef idx="0">
+        <a:scrgbClr r="0" g="0" b="0"/>
+      </a:effectRef>
+      <a:fontRef idx="minor"/>
+    </dgm:style>
+  </dgm:styleLbl>
+  <dgm:styleLbl name="fgAccFollowNode1">
+    <dgm:scene3d>
+      <a:camera prst="orthographicFront"/>
+      <a:lightRig rig="threePt" dir="t"/>
+    </dgm:scene3d>
+    <dgm:sp3d/>
+    <dgm:txPr/>
+    <dgm:style>
+      <a:lnRef idx="2">
+        <a:scrgbClr r="0" g="0" b="0"/>
+      </a:lnRef>
+      <a:fillRef idx="1">
+        <a:scrgbClr r="0" g="0" b="0"/>
+      </a:fillRef>
+      <a:effectRef idx="0">
+        <a:scrgbClr r="0" g="0" b="0"/>
+      </a:effectRef>
+      <a:fontRef idx="minor"/>
+    </dgm:style>
+  </dgm:styleLbl>
+  <dgm:styleLbl name="alignAccFollowNode1">
+    <dgm:scene3d>
+      <a:camera prst="orthographicFront"/>
+      <a:lightRig rig="threePt" dir="t"/>
+    </dgm:scene3d>
+    <dgm:sp3d/>
+    <dgm:txPr/>
+    <dgm:style>
+      <a:lnRef idx="2">
+        <a:scrgbClr r="0" g="0" b="0"/>
+      </a:lnRef>
+      <a:fillRef idx="1">
+        <a:scrgbClr r="0" g="0" b="0"/>
+      </a:fillRef>
+      <a:effectRef idx="0">
+        <a:scrgbClr r="0" g="0" b="0"/>
+      </a:effectRef>
+      <a:fontRef idx="minor"/>
+    </dgm:style>
+  </dgm:styleLbl>
+  <dgm:styleLbl name="bgAccFollowNode1">
+    <dgm:scene3d>
+      <a:camera prst="orthographicFront"/>
+      <a:lightRig rig="threePt" dir="t"/>
+    </dgm:scene3d>
+    <dgm:sp3d/>
+    <dgm:txPr/>
+    <dgm:style>
+      <a:lnRef idx="2">
+        <a:scrgbClr r="0" g="0" b="0"/>
+      </a:lnRef>
+      <a:fillRef idx="1">
+        <a:scrgbClr r="0" g="0" b="0"/>
+      </a:fillRef>
+      <a:effectRef idx="0">
+        <a:scrgbClr r="0" g="0" b="0"/>
+      </a:effectRef>
+      <a:fontRef idx="minor"/>
+    </dgm:style>
+  </dgm:styleLbl>
+  <dgm:styleLbl name="fgAcc0">
+    <dgm:scene3d>
+      <a:camera prst="orthographicFront"/>
+      <a:lightRig rig="threePt" dir="t"/>
+    </dgm:scene3d>
+    <dgm:sp3d/>
+    <dgm:txPr/>
+    <dgm:style>
+      <a:lnRef idx="2">
+        <a:scrgbClr r="0" g="0" b="0"/>
+      </a:lnRef>
+      <a:fillRef idx="1">
+        <a:scrgbClr r="0" g="0" b="0"/>
+      </a:fillRef>
+      <a:effectRef idx="0">
+        <a:scrgbClr r="0" g="0" b="0"/>
+      </a:effectRef>
+      <a:fontRef idx="minor"/>
+    </dgm:style>
+  </dgm:styleLbl>
+  <dgm:styleLbl name="fgAcc2">
+    <dgm:scene3d>
+      <a:camera prst="orthographicFront"/>
+      <a:lightRig rig="threePt" dir="t"/>
+    </dgm:scene3d>
+    <dgm:sp3d/>
+    <dgm:txPr/>
+    <dgm:style>
+      <a:lnRef idx="2">
+        <a:scrgbClr r="0" g="0" b="0"/>
+      </a:lnRef>
+      <a:fillRef idx="1">
+        <a:scrgbClr r="0" g="0" b="0"/>
+      </a:fillRef>
+      <a:effectRef idx="0">
+        <a:scrgbClr r="0" g="0" b="0"/>
+      </a:effectRef>
+      <a:fontRef idx="minor"/>
+    </dgm:style>
+  </dgm:styleLbl>
+  <dgm:styleLbl name="fgAcc3">
+    <dgm:scene3d>
+      <a:camera prst="orthographicFront"/>
+      <a:lightRig rig="threePt" dir="t"/>
+    </dgm:scene3d>
+    <dgm:sp3d/>
+    <dgm:txPr/>
+    <dgm:style>
+      <a:lnRef idx="2">
+        <a:scrgbClr r="0" g="0" b="0"/>
+      </a:lnRef>
+      <a:fillRef idx="1">
+        <a:scrgbClr r="0" g="0" b="0"/>
+      </a:fillRef>
+      <a:effectRef idx="0">
+        <a:scrgbClr r="0" g="0" b="0"/>
+      </a:effectRef>
+      <a:fontRef idx="minor"/>
+    </dgm:style>
+  </dgm:styleLbl>
+  <dgm:styleLbl name="fgAcc4">
+    <dgm:scene3d>
+      <a:camera prst="orthographicFront"/>
+      <a:lightRig rig="threePt" dir="t"/>
+    </dgm:scene3d>
+    <dgm:sp3d/>
+    <dgm:txPr/>
+    <dgm:style>
+      <a:lnRef idx="2">
+        <a:scrgbClr r="0" g="0" b="0"/>
+      </a:lnRef>
+      <a:fillRef idx="1">
+        <a:scrgbClr r="0" g="0" b="0"/>
+      </a:fillRef>
+      <a:effectRef idx="0">
+        <a:scrgbClr r="0" g="0" b="0"/>
+      </a:effectRef>
+      <a:fontRef idx="minor"/>
+    </dgm:style>
+  </dgm:styleLbl>
+  <dgm:styleLbl name="bgShp">
+    <dgm:scene3d>
+      <a:camera prst="orthographicFront"/>
+      <a:lightRig rig="threePt" dir="t"/>
+    </dgm:scene3d>
+    <dgm:sp3d/>
+    <dgm:txPr/>
+    <dgm:style>
+      <a:lnRef idx="0">
+        <a:scrgbClr r="0" g="0" b="0"/>
+      </a:lnRef>
+      <a:fillRef idx="1">
+        <a:scrgbClr r="0" g="0" b="0"/>
+      </a:fillRef>
+      <a:effectRef idx="0">
+        <a:scrgbClr r="0" g="0" b="0"/>
+      </a:effectRef>
+      <a:fontRef idx="minor"/>
+    </dgm:style>
+  </dgm:styleLbl>
+  <dgm:styleLbl name="dkBgShp">
+    <dgm:scene3d>
+      <a:camera prst="orthographicFront"/>
+      <a:lightRig rig="threePt" dir="t"/>
+    </dgm:scene3d>
+    <dgm:sp3d/>
+    <dgm:txPr/>
+    <dgm:style>
+      <a:lnRef idx="0">
+        <a:scrgbClr r="0" g="0" b="0"/>
+      </a:lnRef>
+      <a:fillRef idx="1">
+        <a:scrgbClr r="0" g="0" b="0"/>
+      </a:fillRef>
+      <a:effectRef idx="0">
+        <a:scrgbClr r="0" g="0" b="0"/>
+      </a:effectRef>
+      <a:fontRef idx="minor"/>
+    </dgm:style>
+  </dgm:styleLbl>
+  <dgm:styleLbl name="trBgShp">
+    <dgm:scene3d>
+      <a:camera prst="orthographicFront"/>
+      <a:lightRig rig="threePt" dir="t"/>
+    </dgm:scene3d>
+    <dgm:sp3d/>
+    <dgm:txPr/>
+    <dgm:style>
+      <a:lnRef idx="0">
+        <a:scrgbClr r="0" g="0" b="0"/>
+      </a:lnRef>
+      <a:fillRef idx="1">
+        <a:scrgbClr r="0" g="0" b="0"/>
+      </a:fillRef>
+      <a:effectRef idx="0">
+        <a:scrgbClr r="0" g="0" b="0"/>
+      </a:effectRef>
+      <a:fontRef idx="minor"/>
+    </dgm:style>
+  </dgm:styleLbl>
+  <dgm:styleLbl name="fgShp">
+    <dgm:scene3d>
+      <a:camera prst="orthographicFront"/>
+      <a:lightRig rig="threePt" dir="t"/>
+    </dgm:scene3d>
+    <dgm:sp3d/>
+    <dgm:txPr/>
+    <dgm:style>
+      <a:lnRef idx="2">
+        <a:scrgbClr r="0" g="0" b="0"/>
+      </a:lnRef>
+      <a:fillRef idx="1">
+        <a:scrgbClr r="0" g="0" b="0"/>
+      </a:fillRef>
+      <a:effectRef idx="0">
+        <a:scrgbClr r="0" g="0" b="0"/>
+      </a:effectRef>
+      <a:fontRef idx="minor"/>
+    </dgm:style>
+  </dgm:styleLbl>
+  <dgm:styleLbl name="revTx">
+    <dgm:scene3d>
+      <a:camera prst="orthographicFront"/>
+      <a:lightRig rig="threePt" dir="t"/>
+    </dgm:scene3d>
+    <dgm:sp3d/>
+    <dgm:txPr/>
+    <dgm:style>
+      <a:lnRef idx="0">
+        <a:scrgbClr r="0" g="0" b="0"/>
+      </a:lnRef>
+      <a:fillRef idx="0">
+        <a:scrgbClr r="0" g="0" b="0"/>
+      </a:fillRef>
+      <a:effectRef idx="0">
+        <a:scrgbClr r="0" g="0" b="0"/>
+      </a:effectRef>
+      <a:fontRef idx="minor"/>
+    </dgm:style>
+  </dgm:styleLbl>
+</dgm:styleDef>
+</file>
+
+<file path=ppt/diagrams/quickStyle2.xml><?xml version="1.0" encoding="utf-8"?>
 <dgm:styleDef xmlns:dgm="http://schemas.openxmlformats.org/drawingml/2006/diagram" xmlns:a="http://schemas.openxmlformats.org/drawingml/2006/main" uniqueId="urn:microsoft.com/office/officeart/2005/8/quickstyle/simple1">
   <dgm:title val=""/>
   <dgm:desc val=""/>
@@ -3128,7 +7238,7 @@
           <a:p>
             <a:fld id="{FBAF0B1C-0F93-442B-B1C4-E1C550DA5460}" type="datetimeFigureOut">
               <a:rPr lang="en-GB" smtClean="0"/>
-              <a:t>25/04/2015</a:t>
+              <a:t>26/04/2015</a:t>
             </a:fld>
             <a:endParaRPr lang="en-GB"/>
           </a:p>
@@ -3811,6 +7921,279 @@
 </p:notes>
 </file>
 
+<file path=ppt/notesSlides/notesSlide3.xml><?xml version="1.0" encoding="utf-8"?>
+<p:notes xmlns:a="http://schemas.openxmlformats.org/drawingml/2006/main" xmlns:r="http://schemas.openxmlformats.org/officeDocument/2006/relationships" xmlns:p="http://schemas.openxmlformats.org/presentationml/2006/main">
+  <p:cSld>
+    <p:spTree>
+      <p:nvGrpSpPr>
+        <p:cNvPr id="1" name=""/>
+        <p:cNvGrpSpPr/>
+        <p:nvPr/>
+      </p:nvGrpSpPr>
+      <p:grpSpPr>
+        <a:xfrm>
+          <a:off x="0" y="0"/>
+          <a:ext cx="0" cy="0"/>
+          <a:chOff x="0" y="0"/>
+          <a:chExt cx="0" cy="0"/>
+        </a:xfrm>
+      </p:grpSpPr>
+      <p:sp>
+        <p:nvSpPr>
+          <p:cNvPr id="2" name="Slide Image Placeholder 1"/>
+          <p:cNvSpPr>
+            <a:spLocks noGrp="1" noRot="1" noChangeAspect="1"/>
+          </p:cNvSpPr>
+          <p:nvPr>
+            <p:ph type="sldImg"/>
+          </p:nvPr>
+        </p:nvSpPr>
+        <p:spPr/>
+      </p:sp>
+      <p:sp>
+        <p:nvSpPr>
+          <p:cNvPr id="3" name="Notes Placeholder 2"/>
+          <p:cNvSpPr>
+            <a:spLocks noGrp="1"/>
+          </p:cNvSpPr>
+          <p:nvPr>
+            <p:ph type="body" idx="1"/>
+          </p:nvPr>
+        </p:nvSpPr>
+        <p:spPr/>
+        <p:txBody>
+          <a:bodyPr/>
+          <a:lstStyle/>
+          <a:p>
+            <a:pPr marL="228600" indent="-228600">
+              <a:buAutoNum type="arabicPeriod"/>
+            </a:pPr>
+            <a:r>
+              <a:rPr lang="en-US" dirty="0" smtClean="0"/>
+              <a:t>IIS</a:t>
+            </a:r>
+            <a:r>
+              <a:rPr lang="en-US" baseline="0" dirty="0" smtClean="0"/>
+              <a:t> determines that request needs to be processed by ASP.NET</a:t>
+            </a:r>
+          </a:p>
+          <a:p>
+            <a:pPr marL="228600" indent="-228600">
+              <a:buAutoNum type="arabicPeriod"/>
+            </a:pPr>
+            <a:r>
+              <a:rPr lang="en-US" baseline="0" dirty="0" smtClean="0"/>
+              <a:t>URL Routing module process the request as any standard http module, looks for the route table defined in the project and dissects the request. </a:t>
+            </a:r>
+          </a:p>
+          <a:p>
+            <a:pPr marL="0" indent="0">
+              <a:buNone/>
+            </a:pPr>
+            <a:r>
+              <a:rPr lang="en-US" baseline="0" dirty="0" smtClean="0"/>
+              <a:t>If it founds the pattern matching then it invokes </a:t>
+            </a:r>
+            <a:r>
+              <a:rPr lang="en-US" baseline="0" dirty="0" err="1" smtClean="0"/>
+              <a:t>IHttpHandler</a:t>
+            </a:r>
+            <a:r>
+              <a:rPr lang="en-US" baseline="0" dirty="0" smtClean="0"/>
+              <a:t> using the </a:t>
+            </a:r>
+            <a:r>
+              <a:rPr lang="en-US" baseline="0" dirty="0" err="1" smtClean="0"/>
+              <a:t>GetHttpHandler</a:t>
+            </a:r>
+            <a:r>
+              <a:rPr lang="en-US" baseline="0" dirty="0" smtClean="0"/>
+              <a:t>. For MVC the default route handler is the </a:t>
+            </a:r>
+            <a:r>
+              <a:rPr lang="en-US" baseline="0" dirty="0" err="1" smtClean="0"/>
+              <a:t>MVCRouteHandler</a:t>
+            </a:r>
+            <a:r>
+              <a:rPr lang="en-US" baseline="0" dirty="0" smtClean="0"/>
+              <a:t>.</a:t>
+            </a:r>
+          </a:p>
+          <a:p>
+            <a:pPr marL="0" indent="0">
+              <a:buNone/>
+            </a:pPr>
+            <a:r>
+              <a:rPr lang="en-US" baseline="0" dirty="0" smtClean="0"/>
+              <a:t>3. </a:t>
+            </a:r>
+            <a:r>
+              <a:rPr lang="en-US" baseline="0" dirty="0" err="1" smtClean="0"/>
+              <a:t>GetHttpHandler</a:t>
+            </a:r>
+            <a:r>
+              <a:rPr lang="en-US" baseline="0" dirty="0" smtClean="0"/>
+              <a:t> returns MVC Handler which is responsible for actual processing of the </a:t>
+            </a:r>
+            <a:r>
+              <a:rPr lang="en-US" baseline="0" dirty="0" err="1" smtClean="0"/>
+              <a:t>requet</a:t>
+            </a:r>
+            <a:r>
+              <a:rPr lang="en-US" baseline="0" dirty="0" smtClean="0"/>
+              <a:t> and generating the response.</a:t>
+            </a:r>
+          </a:p>
+          <a:p>
+            <a:pPr marL="0" indent="0">
+              <a:buNone/>
+            </a:pPr>
+            <a:r>
+              <a:rPr lang="en-US" baseline="0" dirty="0" smtClean="0"/>
+              <a:t>4. MVC Handlers uses </a:t>
+            </a:r>
+            <a:r>
+              <a:rPr lang="en-US" baseline="0" dirty="0" err="1" smtClean="0"/>
+              <a:t>IControllerFactory</a:t>
+            </a:r>
+            <a:r>
+              <a:rPr lang="en-US" baseline="0" dirty="0" smtClean="0"/>
+              <a:t> instance to the get the </a:t>
+            </a:r>
+            <a:r>
+              <a:rPr lang="en-US" baseline="0" dirty="0" err="1" smtClean="0"/>
+              <a:t>IController</a:t>
+            </a:r>
+            <a:r>
+              <a:rPr lang="en-US" baseline="0" dirty="0" smtClean="0"/>
+              <a:t> object, it has an execute method which executes our action method. All our controllers should inherit </a:t>
+            </a:r>
+            <a:r>
+              <a:rPr lang="en-US" baseline="0" dirty="0" err="1" smtClean="0"/>
+              <a:t>IController</a:t>
+            </a:r>
+            <a:endParaRPr lang="en-US" baseline="0" dirty="0" smtClean="0"/>
+          </a:p>
+          <a:p>
+            <a:pPr marL="0" indent="0">
+              <a:buNone/>
+            </a:pPr>
+            <a:r>
+              <a:rPr lang="en-US" baseline="0" dirty="0" smtClean="0"/>
+              <a:t>5. Once the controller is instantiated, </a:t>
+            </a:r>
+            <a:r>
+              <a:rPr lang="en-US" baseline="0" dirty="0" err="1" smtClean="0"/>
+              <a:t>ActionInvoker</a:t>
+            </a:r>
+            <a:r>
+              <a:rPr lang="en-US" baseline="0" dirty="0" smtClean="0"/>
+              <a:t> determines which action needs to be executed, while executing the action method it will looks for any filters that needs to executed before and after action execution and will look for any custom model binders being specified</a:t>
+            </a:r>
+          </a:p>
+          <a:p>
+            <a:pPr marL="0" indent="0">
+              <a:buNone/>
+            </a:pPr>
+            <a:r>
+              <a:rPr lang="en-US" baseline="0" dirty="0" smtClean="0"/>
+              <a:t>6. The output of the Action method is the Action result object. An action method always returns  Action Result type. Action result can be </a:t>
+            </a:r>
+            <a:r>
+              <a:rPr lang="en-US" baseline="0" dirty="0" err="1" smtClean="0"/>
+              <a:t>ViewResult</a:t>
+            </a:r>
+            <a:r>
+              <a:rPr lang="en-US" baseline="0" dirty="0" smtClean="0"/>
+              <a:t>, </a:t>
+            </a:r>
+            <a:r>
+              <a:rPr lang="en-US" baseline="0" dirty="0" err="1" smtClean="0"/>
+              <a:t>JsonResult</a:t>
+            </a:r>
+            <a:r>
+              <a:rPr lang="en-US" baseline="0" dirty="0" smtClean="0"/>
+              <a:t>, </a:t>
+            </a:r>
+            <a:r>
+              <a:rPr lang="en-US" baseline="0" dirty="0" err="1" smtClean="0"/>
+              <a:t>HttpResult</a:t>
+            </a:r>
+            <a:r>
+              <a:rPr lang="en-US" baseline="0" dirty="0" smtClean="0"/>
+              <a:t> </a:t>
+            </a:r>
+            <a:r>
+              <a:rPr lang="en-US" baseline="0" dirty="0" err="1" smtClean="0"/>
+              <a:t>etc</a:t>
+            </a:r>
+            <a:endParaRPr lang="en-US" baseline="0" dirty="0" smtClean="0"/>
+          </a:p>
+          <a:p>
+            <a:pPr marL="0" indent="0">
+              <a:buNone/>
+            </a:pPr>
+            <a:r>
+              <a:rPr lang="en-US" baseline="0" dirty="0" smtClean="0"/>
+              <a:t>7. The action result is then passed to the View engine to render the result, View Engines provided by framework are razor and web forms</a:t>
+            </a:r>
+          </a:p>
+          <a:p>
+            <a:pPr marL="0" indent="0">
+              <a:buNone/>
+            </a:pPr>
+            <a:r>
+              <a:rPr lang="en-US" baseline="0" dirty="0" smtClean="0"/>
+              <a:t>8. The view engine these emits the html by parsing the </a:t>
+            </a:r>
+            <a:r>
+              <a:rPr lang="en-US" baseline="0" dirty="0" err="1" smtClean="0"/>
+              <a:t>ActionResult</a:t>
+            </a:r>
+            <a:r>
+              <a:rPr lang="en-US" baseline="0" dirty="0" smtClean="0"/>
+              <a:t> and sends the response back to the browser</a:t>
+            </a:r>
+            <a:endParaRPr lang="en-GB" dirty="0"/>
+          </a:p>
+        </p:txBody>
+      </p:sp>
+      <p:sp>
+        <p:nvSpPr>
+          <p:cNvPr id="4" name="Slide Number Placeholder 3"/>
+          <p:cNvSpPr>
+            <a:spLocks noGrp="1"/>
+          </p:cNvSpPr>
+          <p:nvPr>
+            <p:ph type="sldNum" sz="quarter" idx="10"/>
+          </p:nvPr>
+        </p:nvSpPr>
+        <p:spPr/>
+        <p:txBody>
+          <a:bodyPr/>
+          <a:lstStyle/>
+          <a:p>
+            <a:fld id="{2F501DB9-A105-4A8D-BF77-F79BCAF36C32}" type="slidenum">
+              <a:rPr lang="en-GB" smtClean="0"/>
+              <a:t>7</a:t>
+            </a:fld>
+            <a:endParaRPr lang="en-GB"/>
+          </a:p>
+        </p:txBody>
+      </p:sp>
+    </p:spTree>
+    <p:extLst>
+      <p:ext uri="{BB962C8B-B14F-4D97-AF65-F5344CB8AC3E}">
+        <p14:creationId xmlns:p14="http://schemas.microsoft.com/office/powerpoint/2010/main" val="2273095161"/>
+      </p:ext>
+    </p:extLst>
+  </p:cSld>
+  <p:clrMapOvr>
+    <a:masterClrMapping/>
+  </p:clrMapOvr>
+</p:notes>
+</file>
+
 <file path=ppt/slideLayouts/slideLayout1.xml><?xml version="1.0" encoding="utf-8"?>
 <p:sldLayout xmlns:a="http://schemas.openxmlformats.org/drawingml/2006/main" xmlns:r="http://schemas.openxmlformats.org/officeDocument/2006/relationships" xmlns:p="http://schemas.openxmlformats.org/presentationml/2006/main" showMasterSp="0" type="title" preserve="1">
   <p:cSld name="Title Slide">
@@ -3987,7 +8370,7 @@
           <a:p>
             <a:fld id="{96DFF08F-DC6B-4601-B491-B0F83F6DD2DA}" type="datetimeFigureOut">
               <a:rPr lang="en-US" dirty="0"/>
-              <a:t>4/25/2015</a:t>
+              <a:t>4/26/2015</a:t>
             </a:fld>
             <a:endParaRPr lang="en-US" dirty="0"/>
           </a:p>
@@ -4152,7 +8535,7 @@
           <a:p>
             <a:fld id="{96DFF08F-DC6B-4601-B491-B0F83F6DD2DA}" type="datetimeFigureOut">
               <a:rPr lang="en-US" dirty="0"/>
-              <a:t>4/25/2015</a:t>
+              <a:t>4/26/2015</a:t>
             </a:fld>
             <a:endParaRPr lang="en-US" dirty="0"/>
           </a:p>
@@ -4370,7 +8753,7 @@
           <a:p>
             <a:fld id="{96DFF08F-DC6B-4601-B491-B0F83F6DD2DA}" type="datetimeFigureOut">
               <a:rPr lang="en-US" dirty="0"/>
-              <a:t>4/25/2015</a:t>
+              <a:t>4/26/2015</a:t>
             </a:fld>
             <a:endParaRPr lang="en-US" dirty="0"/>
           </a:p>
@@ -4545,7 +8928,7 @@
           <a:p>
             <a:fld id="{96DFF08F-DC6B-4601-B491-B0F83F6DD2DA}" type="datetimeFigureOut">
               <a:rPr lang="en-US" dirty="0"/>
-              <a:t>4/25/2015</a:t>
+              <a:t>4/26/2015</a:t>
             </a:fld>
             <a:endParaRPr lang="en-US" dirty="0"/>
           </a:p>
@@ -4851,7 +9234,7 @@
             <a:fld id="{96DFF08F-DC6B-4601-B491-B0F83F6DD2DA}" type="datetimeFigureOut">
               <a:rPr lang="en-US" dirty="0"/>
               <a:pPr/>
-              <a:t>4/25/2015</a:t>
+              <a:t>4/26/2015</a:t>
             </a:fld>
             <a:endParaRPr lang="en-US" dirty="0"/>
           </a:p>
@@ -5151,7 +9534,7 @@
           <a:p>
             <a:fld id="{96DFF08F-DC6B-4601-B491-B0F83F6DD2DA}" type="datetimeFigureOut">
               <a:rPr lang="en-US" dirty="0"/>
-              <a:t>4/25/2015</a:t>
+              <a:t>4/26/2015</a:t>
             </a:fld>
             <a:endParaRPr lang="en-US" dirty="0"/>
           </a:p>
@@ -5568,7 +9951,7 @@
           <a:p>
             <a:fld id="{96DFF08F-DC6B-4601-B491-B0F83F6DD2DA}" type="datetimeFigureOut">
               <a:rPr lang="en-US" dirty="0"/>
-              <a:t>4/25/2015</a:t>
+              <a:t>4/26/2015</a:t>
             </a:fld>
             <a:endParaRPr lang="en-US" dirty="0"/>
           </a:p>
@@ -5681,7 +10064,7 @@
           <a:p>
             <a:fld id="{96DFF08F-DC6B-4601-B491-B0F83F6DD2DA}" type="datetimeFigureOut">
               <a:rPr lang="en-US" dirty="0"/>
-              <a:t>4/25/2015</a:t>
+              <a:t>4/26/2015</a:t>
             </a:fld>
             <a:endParaRPr lang="en-US" dirty="0"/>
           </a:p>
@@ -5771,7 +10154,7 @@
           <a:p>
             <a:fld id="{96DFF08F-DC6B-4601-B491-B0F83F6DD2DA}" type="datetimeFigureOut">
               <a:rPr lang="en-US" dirty="0"/>
-              <a:t>4/25/2015</a:t>
+              <a:t>4/26/2015</a:t>
             </a:fld>
             <a:endParaRPr lang="en-US" dirty="0"/>
           </a:p>
@@ -6039,7 +10422,7 @@
           <a:p>
             <a:fld id="{96DFF08F-DC6B-4601-B491-B0F83F6DD2DA}" type="datetimeFigureOut">
               <a:rPr lang="en-US" dirty="0"/>
-              <a:t>4/25/2015</a:t>
+              <a:t>4/26/2015</a:t>
             </a:fld>
             <a:endParaRPr lang="en-US" dirty="0"/>
           </a:p>
@@ -6299,7 +10682,7 @@
           <a:p>
             <a:fld id="{96DFF08F-DC6B-4601-B491-B0F83F6DD2DA}" type="datetimeFigureOut">
               <a:rPr lang="en-US" dirty="0"/>
-              <a:t>4/25/2015</a:t>
+              <a:t>4/26/2015</a:t>
             </a:fld>
             <a:endParaRPr lang="en-US" dirty="0"/>
           </a:p>
@@ -6549,7 +10932,7 @@
             <a:fld id="{96DFF08F-DC6B-4601-B491-B0F83F6DD2DA}" type="datetimeFigureOut">
               <a:rPr lang="en-US" dirty="0"/>
               <a:pPr/>
-              <a:t>4/25/2015</a:t>
+              <a:t>4/26/2015</a:t>
             </a:fld>
             <a:endParaRPr lang="en-US" dirty="0"/>
           </a:p>
@@ -7671,15 +12054,7 @@
             </a:pPr>
             <a:r>
               <a:rPr lang="en-US" sz="1300" dirty="0"/>
-              <a:t>.NET 3.5, Visual Studio 2008, </a:t>
-            </a:r>
-            <a:r>
-              <a:rPr lang="en-US" sz="1300" dirty="0"/>
-              <a:t>MVC </a:t>
-            </a:r>
-            <a:r>
-              <a:rPr lang="en-US" sz="1300" dirty="0"/>
-              <a:t>pattern architecture with Web Forms as view engine</a:t>
+              <a:t>.NET 3.5, Visual Studio 2008, MVC pattern architecture with Web Forms as view engine</a:t>
             </a:r>
           </a:p>
           <a:p>
@@ -7705,17 +12080,8 @@
             </a:pPr>
             <a:r>
               <a:rPr lang="en-US" sz="1900" dirty="0"/>
-              <a:t>ASP.NET </a:t>
-            </a:r>
-            <a:r>
-              <a:rPr lang="en-US" sz="1900" dirty="0"/>
-              <a:t>MVC 2.0 – March, </a:t>
-            </a:r>
-            <a:r>
-              <a:rPr lang="en-US" sz="1900" dirty="0"/>
-              <a:t>2010</a:t>
-            </a:r>
-            <a:endParaRPr lang="en-US" sz="1900" dirty="0"/>
+              <a:t>ASP.NET MVC 2.0 – March, 2010</a:t>
+            </a:r>
           </a:p>
           <a:p>
             <a:pPr lvl="2">
@@ -7727,15 +12093,7 @@
             </a:pPr>
             <a:r>
               <a:rPr lang="en-US" sz="1300" dirty="0"/>
-              <a:t>.NET 3.5, 4.0, Visual Studio 2008, 2010, </a:t>
-            </a:r>
-            <a:r>
-              <a:rPr lang="en-US" sz="1300" dirty="0"/>
-              <a:t>Client </a:t>
-            </a:r>
-            <a:r>
-              <a:rPr lang="en-US" sz="1300" dirty="0"/>
-              <a:t>Side Validation, Data Annotations, Areas</a:t>
+              <a:t>.NET 3.5, 4.0, Visual Studio 2008, 2010, Client Side Validation, Data Annotations, Areas</a:t>
             </a:r>
           </a:p>
           <a:p>
@@ -7930,15 +12288,7 @@
             </a:pPr>
             <a:r>
               <a:rPr lang="en-US" sz="1400" dirty="0"/>
-              <a:t>.NET 4.0, 4.5, Visual Studio 2010 SP1, 2012, </a:t>
-            </a:r>
-            <a:r>
-              <a:rPr lang="en-US" sz="1400" dirty="0"/>
-              <a:t>ASP.NET </a:t>
-            </a:r>
-            <a:r>
-              <a:rPr lang="en-US" sz="1400" dirty="0"/>
-              <a:t>Web API, Mobile Project Template</a:t>
+              <a:t>.NET 4.0, 4.5, Visual Studio 2010 SP1, 2012, ASP.NET Web API, Mobile Project Template</a:t>
             </a:r>
           </a:p>
           <a:p>
@@ -7959,11 +12309,7 @@
             </a:r>
             <a:r>
               <a:rPr lang="en-US" sz="1400" dirty="0"/>
-              <a:t>, Support for Azure SD</a:t>
-            </a:r>
-            <a:r>
-              <a:rPr lang="en-US" sz="1400" dirty="0"/>
-              <a:t>K</a:t>
+              <a:t>, Support for Azure SDK</a:t>
             </a:r>
           </a:p>
           <a:p>
@@ -7989,15 +12335,7 @@
             </a:pPr>
             <a:r>
               <a:rPr lang="en-US" sz="1400" dirty="0"/>
-              <a:t>.NET 4.5, 4.5.1 Visual Studio 2013, </a:t>
-            </a:r>
-            <a:r>
-              <a:rPr lang="en-US" sz="1400" dirty="0"/>
-              <a:t>One </a:t>
-            </a:r>
-            <a:r>
-              <a:rPr lang="en-US" sz="1400" dirty="0"/>
-              <a:t>ASP.NET, ASP.NET Web API 2</a:t>
+              <a:t>.NET 4.5, 4.5.1 Visual Studio 2013, One ASP.NET, ASP.NET Web API 2</a:t>
             </a:r>
           </a:p>
           <a:p>
@@ -10313,6 +14651,293 @@
       </p:grpSpPr>
       <p:sp>
         <p:nvSpPr>
+          <p:cNvPr id="2" name="Title 1"/>
+          <p:cNvSpPr>
+            <a:spLocks noGrp="1"/>
+          </p:cNvSpPr>
+          <p:nvPr>
+            <p:ph type="title"/>
+          </p:nvPr>
+        </p:nvSpPr>
+        <p:spPr/>
+        <p:txBody>
+          <a:bodyPr/>
+          <a:lstStyle/>
+          <a:p>
+            <a:r>
+              <a:rPr lang="en-US" dirty="0" smtClean="0"/>
+              <a:t>What happens inside ?</a:t>
+            </a:r>
+            <a:endParaRPr lang="en-GB" dirty="0"/>
+          </a:p>
+        </p:txBody>
+      </p:sp>
+      <p:graphicFrame>
+        <p:nvGraphicFramePr>
+          <p:cNvPr id="4" name="Content Placeholder 3"/>
+          <p:cNvGraphicFramePr>
+            <a:graphicFrameLocks noGrp="1"/>
+          </p:cNvGraphicFramePr>
+          <p:nvPr>
+            <p:ph idx="1"/>
+            <p:extLst>
+              <p:ext uri="{D42A27DB-BD31-4B8C-83A1-F6EECF244321}">
+                <p14:modId xmlns:p14="http://schemas.microsoft.com/office/powerpoint/2010/main" val="2861732343"/>
+              </p:ext>
+            </p:extLst>
+          </p:nvPr>
+        </p:nvGraphicFramePr>
+        <p:xfrm>
+          <a:off x="1717262" y="1930340"/>
+          <a:ext cx="9783763" cy="4206875"/>
+        </p:xfrm>
+        <a:graphic>
+          <a:graphicData uri="http://schemas.openxmlformats.org/drawingml/2006/diagram">
+            <dgm:relIds xmlns:dgm="http://schemas.openxmlformats.org/drawingml/2006/diagram" xmlns:r="http://schemas.openxmlformats.org/officeDocument/2006/relationships" r:dm="rId3" r:lo="rId4" r:qs="rId5" r:cs="rId6"/>
+          </a:graphicData>
+        </a:graphic>
+      </p:graphicFrame>
+      <p:sp>
+        <p:nvSpPr>
+          <p:cNvPr id="7" name="Rounded Rectangle 6"/>
+          <p:cNvSpPr/>
+          <p:nvPr/>
+        </p:nvSpPr>
+        <p:spPr>
+          <a:xfrm>
+            <a:off x="7153169" y="2314936"/>
+            <a:ext cx="902825" cy="648182"/>
+          </a:xfrm>
+          <a:prstGeom prst="roundRect">
+            <a:avLst/>
+          </a:prstGeom>
+        </p:spPr>
+        <p:style>
+          <a:lnRef idx="0">
+            <a:schemeClr val="accent1"/>
+          </a:lnRef>
+          <a:fillRef idx="3">
+            <a:schemeClr val="accent1"/>
+          </a:fillRef>
+          <a:effectRef idx="3">
+            <a:schemeClr val="accent1"/>
+          </a:effectRef>
+          <a:fontRef idx="minor">
+            <a:schemeClr val="lt1"/>
+          </a:fontRef>
+        </p:style>
+        <p:txBody>
+          <a:bodyPr rtlCol="0" anchor="ctr"/>
+          <a:lstStyle/>
+          <a:p>
+            <a:pPr algn="ctr"/>
+            <a:r>
+              <a:rPr lang="en-US" sz="1200" dirty="0" smtClean="0"/>
+              <a:t>Action Filters</a:t>
+            </a:r>
+            <a:endParaRPr lang="en-GB" sz="1200" dirty="0"/>
+          </a:p>
+        </p:txBody>
+      </p:sp>
+      <p:sp>
+        <p:nvSpPr>
+          <p:cNvPr id="8" name="Rounded Rectangle 7"/>
+          <p:cNvSpPr/>
+          <p:nvPr/>
+        </p:nvSpPr>
+        <p:spPr>
+          <a:xfrm>
+            <a:off x="8171741" y="2314936"/>
+            <a:ext cx="902825" cy="648182"/>
+          </a:xfrm>
+          <a:prstGeom prst="roundRect">
+            <a:avLst/>
+          </a:prstGeom>
+        </p:spPr>
+        <p:style>
+          <a:lnRef idx="0">
+            <a:schemeClr val="accent1"/>
+          </a:lnRef>
+          <a:fillRef idx="3">
+            <a:schemeClr val="accent1"/>
+          </a:fillRef>
+          <a:effectRef idx="3">
+            <a:schemeClr val="accent1"/>
+          </a:effectRef>
+          <a:fontRef idx="minor">
+            <a:schemeClr val="lt1"/>
+          </a:fontRef>
+        </p:style>
+        <p:txBody>
+          <a:bodyPr rtlCol="0" anchor="ctr"/>
+          <a:lstStyle/>
+          <a:p>
+            <a:pPr algn="ctr"/>
+            <a:r>
+              <a:rPr lang="en-US" sz="1200" dirty="0" smtClean="0"/>
+              <a:t>Model Binders</a:t>
+            </a:r>
+            <a:endParaRPr lang="en-GB" sz="1200" dirty="0"/>
+          </a:p>
+        </p:txBody>
+      </p:sp>
+      <p:sp>
+        <p:nvSpPr>
+          <p:cNvPr id="10" name="Up Arrow 9"/>
+          <p:cNvSpPr/>
+          <p:nvPr/>
+        </p:nvSpPr>
+        <p:spPr>
+          <a:xfrm>
+            <a:off x="8009677" y="2986241"/>
+            <a:ext cx="231494" cy="185194"/>
+          </a:xfrm>
+          <a:prstGeom prst="upArrow">
+            <a:avLst/>
+          </a:prstGeom>
+        </p:spPr>
+        <p:style>
+          <a:lnRef idx="0">
+            <a:schemeClr val="accent5"/>
+          </a:lnRef>
+          <a:fillRef idx="3">
+            <a:schemeClr val="accent5"/>
+          </a:fillRef>
+          <a:effectRef idx="3">
+            <a:schemeClr val="accent5"/>
+          </a:effectRef>
+          <a:fontRef idx="minor">
+            <a:schemeClr val="lt1"/>
+          </a:fontRef>
+        </p:style>
+        <p:txBody>
+          <a:bodyPr rtlCol="0" anchor="ctr"/>
+          <a:lstStyle/>
+          <a:p>
+            <a:pPr algn="ctr"/>
+            <a:endParaRPr lang="en-GB"/>
+          </a:p>
+        </p:txBody>
+      </p:sp>
+      <p:sp>
+        <p:nvSpPr>
+          <p:cNvPr id="11" name="Rounded Rectangle 10"/>
+          <p:cNvSpPr/>
+          <p:nvPr/>
+        </p:nvSpPr>
+        <p:spPr>
+          <a:xfrm>
+            <a:off x="3854384" y="4224758"/>
+            <a:ext cx="907200" cy="648182"/>
+          </a:xfrm>
+          <a:prstGeom prst="roundRect">
+            <a:avLst/>
+          </a:prstGeom>
+        </p:spPr>
+        <p:style>
+          <a:lnRef idx="0">
+            <a:schemeClr val="accent1"/>
+          </a:lnRef>
+          <a:fillRef idx="3">
+            <a:schemeClr val="accent1"/>
+          </a:fillRef>
+          <a:effectRef idx="3">
+            <a:schemeClr val="accent1"/>
+          </a:effectRef>
+          <a:fontRef idx="minor">
+            <a:schemeClr val="lt1"/>
+          </a:fontRef>
+        </p:style>
+        <p:txBody>
+          <a:bodyPr rtlCol="0" anchor="ctr"/>
+          <a:lstStyle/>
+          <a:p>
+            <a:pPr algn="ctr"/>
+            <a:r>
+              <a:rPr lang="en-US" sz="1100" dirty="0" smtClean="0"/>
+              <a:t>Response</a:t>
+            </a:r>
+            <a:endParaRPr lang="en-GB" sz="1100" dirty="0"/>
+          </a:p>
+        </p:txBody>
+      </p:sp>
+      <p:sp>
+        <p:nvSpPr>
+          <p:cNvPr id="12" name="Up Arrow 11"/>
+          <p:cNvSpPr/>
+          <p:nvPr/>
+        </p:nvSpPr>
+        <p:spPr>
+          <a:xfrm rot="-5400000">
+            <a:off x="4803488" y="4456252"/>
+            <a:ext cx="231494" cy="185194"/>
+          </a:xfrm>
+          <a:prstGeom prst="upArrow">
+            <a:avLst/>
+          </a:prstGeom>
+        </p:spPr>
+        <p:style>
+          <a:lnRef idx="0">
+            <a:schemeClr val="accent5"/>
+          </a:lnRef>
+          <a:fillRef idx="3">
+            <a:schemeClr val="accent5"/>
+          </a:fillRef>
+          <a:effectRef idx="3">
+            <a:schemeClr val="accent5"/>
+          </a:effectRef>
+          <a:fontRef idx="minor">
+            <a:schemeClr val="lt1"/>
+          </a:fontRef>
+        </p:style>
+        <p:txBody>
+          <a:bodyPr rtlCol="0" anchor="ctr"/>
+          <a:lstStyle/>
+          <a:p>
+            <a:pPr algn="ctr"/>
+            <a:endParaRPr lang="en-GB"/>
+          </a:p>
+        </p:txBody>
+      </p:sp>
+    </p:spTree>
+    <p:extLst>
+      <p:ext uri="{BB962C8B-B14F-4D97-AF65-F5344CB8AC3E}">
+        <p14:creationId xmlns:p14="http://schemas.microsoft.com/office/powerpoint/2010/main" val="4197487338"/>
+      </p:ext>
+    </p:extLst>
+  </p:cSld>
+  <p:clrMapOvr>
+    <a:masterClrMapping/>
+  </p:clrMapOvr>
+  <p:timing>
+    <p:tnLst>
+      <p:par>
+        <p:cTn id="1" dur="indefinite" restart="never" nodeType="tmRoot"/>
+      </p:par>
+    </p:tnLst>
+  </p:timing>
+</p:sld>
+</file>
+
+<file path=ppt/slides/slide8.xml><?xml version="1.0" encoding="utf-8"?>
+<p:sld xmlns:a="http://schemas.openxmlformats.org/drawingml/2006/main" xmlns:r="http://schemas.openxmlformats.org/officeDocument/2006/relationships" xmlns:p="http://schemas.openxmlformats.org/presentationml/2006/main">
+  <p:cSld>
+    <p:spTree>
+      <p:nvGrpSpPr>
+        <p:cNvPr id="1" name=""/>
+        <p:cNvGrpSpPr/>
+        <p:nvPr/>
+      </p:nvGrpSpPr>
+      <p:grpSpPr>
+        <a:xfrm>
+          <a:off x="0" y="0"/>
+          <a:ext cx="0" cy="0"/>
+          <a:chOff x="0" y="0"/>
+          <a:chExt cx="0" cy="0"/>
+        </a:xfrm>
+      </p:grpSpPr>
+      <p:sp>
+        <p:nvSpPr>
           <p:cNvPr id="4" name="Title 3"/>
           <p:cNvSpPr>
             <a:spLocks noGrp="1"/>
@@ -10373,7 +14998,7 @@
 </p:sld>
 </file>
 
-<file path=ppt/slides/slide8.xml><?xml version="1.0" encoding="utf-8"?>
+<file path=ppt/slides/slide9.xml><?xml version="1.0" encoding="utf-8"?>
 <p:sld xmlns:a="http://schemas.openxmlformats.org/drawingml/2006/main" xmlns:r="http://schemas.openxmlformats.org/officeDocument/2006/relationships" xmlns:p="http://schemas.openxmlformats.org/presentationml/2006/main">
   <p:cSld>
     <p:spTree>
@@ -10712,7 +15337,7 @@
   <a:extraClrSchemeLst/>
   <a:extLst>
     <a:ext uri="{05A4C25C-085E-4340-85A3-A5531E510DB2}">
-      <thm15:themeFamily xmlns="" xmlns:thm15="http://schemas.microsoft.com/office/thememl/2012/main" name="Banded" id="{98DFF888-2449-4D28-977C-6306C017633E}" vid="{9792607F-9579-4224-82FF-9C88C3E1E53D}"/>
+      <thm15:themeFamily xmlns:thm15="http://schemas.microsoft.com/office/thememl/2012/main" xmlns="" name="Banded" id="{98DFF888-2449-4D28-977C-6306C017633E}" vid="{9792607F-9579-4224-82FF-9C88C3E1E53D}"/>
     </a:ext>
   </a:extLst>
 </a:theme>

</xml_diff>

<commit_message>
added more slides for day 1
</commit_message>
<xml_diff>
--- a/Presentations/Day 1.pptx
+++ b/Presentations/Day 1.pptx
@@ -5,7 +5,7 @@
     <p:sldMasterId id="2147483648" r:id="rId1"/>
   </p:sldMasterIdLst>
   <p:notesMasterIdLst>
-    <p:notesMasterId r:id="rId11"/>
+    <p:notesMasterId r:id="rId15"/>
   </p:notesMasterIdLst>
   <p:sldIdLst>
     <p:sldId id="256" r:id="rId2"/>
@@ -13,10 +13,14 @@
     <p:sldId id="258" r:id="rId4"/>
     <p:sldId id="259" r:id="rId5"/>
     <p:sldId id="260" r:id="rId6"/>
-    <p:sldId id="263" r:id="rId7"/>
-    <p:sldId id="264" r:id="rId8"/>
-    <p:sldId id="261" r:id="rId9"/>
-    <p:sldId id="262" r:id="rId10"/>
+    <p:sldId id="265" r:id="rId7"/>
+    <p:sldId id="263" r:id="rId8"/>
+    <p:sldId id="264" r:id="rId9"/>
+    <p:sldId id="266" r:id="rId10"/>
+    <p:sldId id="267" r:id="rId11"/>
+    <p:sldId id="268" r:id="rId12"/>
+    <p:sldId id="261" r:id="rId13"/>
+    <p:sldId id="262" r:id="rId14"/>
   </p:sldIdLst>
   <p:sldSz cx="12192000" cy="6858000"/>
   <p:notesSz cx="6858000" cy="9144000"/>
@@ -2571,6 +2575,13 @@
         </dgm:presLayoutVars>
       </dgm:prSet>
       <dgm:spPr/>
+      <dgm:t>
+        <a:bodyPr/>
+        <a:lstStyle/>
+        <a:p>
+          <a:endParaRPr lang="en-GB"/>
+        </a:p>
+      </dgm:t>
     </dgm:pt>
     <dgm:pt modelId="{40FA7AC9-749D-4BC7-B685-6BB5AE1C9139}" type="pres">
       <dgm:prSet presAssocID="{91444C4B-D9F3-4036-9C53-29E661821093}" presName="node" presStyleLbl="node1" presStyleIdx="0" presStyleCnt="8" custLinFactX="54671" custLinFactNeighborX="100000" custLinFactNeighborY="-71779">
@@ -2590,10 +2601,24 @@
     <dgm:pt modelId="{809C56AC-D77C-4C45-8C47-265979E2361B}" type="pres">
       <dgm:prSet presAssocID="{963ED4E1-14CB-434A-B1D1-A755D048D3B6}" presName="sibTrans" presStyleLbl="sibTrans2D1" presStyleIdx="0" presStyleCnt="7"/>
       <dgm:spPr/>
+      <dgm:t>
+        <a:bodyPr/>
+        <a:lstStyle/>
+        <a:p>
+          <a:endParaRPr lang="en-GB"/>
+        </a:p>
+      </dgm:t>
     </dgm:pt>
     <dgm:pt modelId="{21A2A613-7A1B-4148-A239-25DB39D736FB}" type="pres">
       <dgm:prSet presAssocID="{963ED4E1-14CB-434A-B1D1-A755D048D3B6}" presName="connectorText" presStyleLbl="sibTrans2D1" presStyleIdx="0" presStyleCnt="7"/>
       <dgm:spPr/>
+      <dgm:t>
+        <a:bodyPr/>
+        <a:lstStyle/>
+        <a:p>
+          <a:endParaRPr lang="en-GB"/>
+        </a:p>
+      </dgm:t>
     </dgm:pt>
     <dgm:pt modelId="{E025BFF6-B5ED-4111-A424-117C92BC8FA3}" type="pres">
       <dgm:prSet presAssocID="{B06C7D9D-40D3-4441-82DB-296714CE91D6}" presName="node" presStyleLbl="node1" presStyleIdx="1" presStyleCnt="8" custLinFactX="54671" custLinFactNeighborX="100000" custLinFactNeighborY="-71779">
@@ -2613,10 +2638,24 @@
     <dgm:pt modelId="{EC48F8E3-7DCB-4035-852C-116E59A3B8B8}" type="pres">
       <dgm:prSet presAssocID="{42E9DDAB-9777-41DD-9A13-24C1A490D842}" presName="sibTrans" presStyleLbl="sibTrans2D1" presStyleIdx="1" presStyleCnt="7"/>
       <dgm:spPr/>
+      <dgm:t>
+        <a:bodyPr/>
+        <a:lstStyle/>
+        <a:p>
+          <a:endParaRPr lang="en-GB"/>
+        </a:p>
+      </dgm:t>
     </dgm:pt>
     <dgm:pt modelId="{78F59ED9-ECFD-463E-8C1D-F304DF1F9BAF}" type="pres">
       <dgm:prSet presAssocID="{42E9DDAB-9777-41DD-9A13-24C1A490D842}" presName="connectorText" presStyleLbl="sibTrans2D1" presStyleIdx="1" presStyleCnt="7"/>
       <dgm:spPr/>
+      <dgm:t>
+        <a:bodyPr/>
+        <a:lstStyle/>
+        <a:p>
+          <a:endParaRPr lang="en-GB"/>
+        </a:p>
+      </dgm:t>
     </dgm:pt>
     <dgm:pt modelId="{444A1B2E-3E6F-4558-A6DD-0B28C76448BB}" type="pres">
       <dgm:prSet presAssocID="{F1560D04-A30A-4AC1-8B84-26282D9FC351}" presName="node" presStyleLbl="node1" presStyleIdx="2" presStyleCnt="8" custLinFactX="54671" custLinFactNeighborX="100000" custLinFactNeighborY="-71779">
@@ -2625,14 +2664,35 @@
         </dgm:presLayoutVars>
       </dgm:prSet>
       <dgm:spPr/>
+      <dgm:t>
+        <a:bodyPr/>
+        <a:lstStyle/>
+        <a:p>
+          <a:endParaRPr lang="en-GB"/>
+        </a:p>
+      </dgm:t>
     </dgm:pt>
     <dgm:pt modelId="{99FDB18D-7266-4F24-9021-F06EE2A9A8BA}" type="pres">
       <dgm:prSet presAssocID="{A98B8A33-6B13-40A3-A9A7-D2317D0FC2A1}" presName="sibTrans" presStyleLbl="sibTrans2D1" presStyleIdx="2" presStyleCnt="7"/>
       <dgm:spPr/>
+      <dgm:t>
+        <a:bodyPr/>
+        <a:lstStyle/>
+        <a:p>
+          <a:endParaRPr lang="en-GB"/>
+        </a:p>
+      </dgm:t>
     </dgm:pt>
     <dgm:pt modelId="{518FC971-4957-408D-9581-C6E150F88DB8}" type="pres">
       <dgm:prSet presAssocID="{A98B8A33-6B13-40A3-A9A7-D2317D0FC2A1}" presName="connectorText" presStyleLbl="sibTrans2D1" presStyleIdx="2" presStyleCnt="7"/>
       <dgm:spPr/>
+      <dgm:t>
+        <a:bodyPr/>
+        <a:lstStyle/>
+        <a:p>
+          <a:endParaRPr lang="en-GB"/>
+        </a:p>
+      </dgm:t>
     </dgm:pt>
     <dgm:pt modelId="{2341B51D-F38F-4A68-A4CA-E60773E2899C}" type="pres">
       <dgm:prSet presAssocID="{01DA2CB0-7A77-4576-B6D3-DC65DC76FCB3}" presName="node" presStyleLbl="node1" presStyleIdx="3" presStyleCnt="8" custLinFactX="54671" custLinFactNeighborX="100000" custLinFactNeighborY="-71779">
@@ -2641,14 +2701,35 @@
         </dgm:presLayoutVars>
       </dgm:prSet>
       <dgm:spPr/>
+      <dgm:t>
+        <a:bodyPr/>
+        <a:lstStyle/>
+        <a:p>
+          <a:endParaRPr lang="en-GB"/>
+        </a:p>
+      </dgm:t>
     </dgm:pt>
     <dgm:pt modelId="{40761719-92EB-45BF-8276-E0AF49836817}" type="pres">
       <dgm:prSet presAssocID="{AC9B9CAB-31A6-4B5C-996E-69E367C1CDE4}" presName="sibTrans" presStyleLbl="sibTrans2D1" presStyleIdx="3" presStyleCnt="7"/>
       <dgm:spPr/>
+      <dgm:t>
+        <a:bodyPr/>
+        <a:lstStyle/>
+        <a:p>
+          <a:endParaRPr lang="en-GB"/>
+        </a:p>
+      </dgm:t>
     </dgm:pt>
     <dgm:pt modelId="{3577B2C6-B1A4-4078-8FBD-C39A83B67F79}" type="pres">
       <dgm:prSet presAssocID="{AC9B9CAB-31A6-4B5C-996E-69E367C1CDE4}" presName="connectorText" presStyleLbl="sibTrans2D1" presStyleIdx="3" presStyleCnt="7"/>
       <dgm:spPr/>
+      <dgm:t>
+        <a:bodyPr/>
+        <a:lstStyle/>
+        <a:p>
+          <a:endParaRPr lang="en-GB"/>
+        </a:p>
+      </dgm:t>
     </dgm:pt>
     <dgm:pt modelId="{1EFB8979-CEDC-40B1-A6D1-15531EDF1E10}" type="pres">
       <dgm:prSet presAssocID="{B43C1950-F91F-4917-9B1F-C342868209AF}" presName="node" presStyleLbl="node1" presStyleIdx="4" presStyleCnt="8" custLinFactX="54671" custLinFactNeighborX="100000" custLinFactNeighborY="-71779">
@@ -2657,14 +2738,35 @@
         </dgm:presLayoutVars>
       </dgm:prSet>
       <dgm:spPr/>
+      <dgm:t>
+        <a:bodyPr/>
+        <a:lstStyle/>
+        <a:p>
+          <a:endParaRPr lang="en-GB"/>
+        </a:p>
+      </dgm:t>
     </dgm:pt>
     <dgm:pt modelId="{A6EBFDB1-4B32-4940-8A3B-20818AC0F4A5}" type="pres">
       <dgm:prSet presAssocID="{AF637F04-EEA1-415B-B6AA-9564A0BCEEF5}" presName="sibTrans" presStyleLbl="sibTrans2D1" presStyleIdx="4" presStyleCnt="7"/>
       <dgm:spPr/>
+      <dgm:t>
+        <a:bodyPr/>
+        <a:lstStyle/>
+        <a:p>
+          <a:endParaRPr lang="en-GB"/>
+        </a:p>
+      </dgm:t>
     </dgm:pt>
     <dgm:pt modelId="{9FFAA13C-5E48-428B-A98A-7094404CC0B6}" type="pres">
       <dgm:prSet presAssocID="{AF637F04-EEA1-415B-B6AA-9564A0BCEEF5}" presName="connectorText" presStyleLbl="sibTrans2D1" presStyleIdx="4" presStyleCnt="7"/>
       <dgm:spPr/>
+      <dgm:t>
+        <a:bodyPr/>
+        <a:lstStyle/>
+        <a:p>
+          <a:endParaRPr lang="en-GB"/>
+        </a:p>
+      </dgm:t>
     </dgm:pt>
     <dgm:pt modelId="{123CFA72-13AB-4378-A500-9788AF12239E}" type="pres">
       <dgm:prSet presAssocID="{7A6CDD7C-6F78-474A-9000-135BFEB9D06C}" presName="node" presStyleLbl="node1" presStyleIdx="5" presStyleCnt="8" custLinFactX="-2136" custLinFactNeighborX="-100000" custLinFactNeighborY="73574">
@@ -2673,14 +2775,35 @@
         </dgm:presLayoutVars>
       </dgm:prSet>
       <dgm:spPr/>
+      <dgm:t>
+        <a:bodyPr/>
+        <a:lstStyle/>
+        <a:p>
+          <a:endParaRPr lang="en-GB"/>
+        </a:p>
+      </dgm:t>
     </dgm:pt>
     <dgm:pt modelId="{5324E3CB-4947-48C7-9448-EDC903F0867C}" type="pres">
       <dgm:prSet presAssocID="{547443E2-0F03-469A-A437-9E2747B02374}" presName="sibTrans" presStyleLbl="sibTrans2D1" presStyleIdx="5" presStyleCnt="7"/>
       <dgm:spPr/>
+      <dgm:t>
+        <a:bodyPr/>
+        <a:lstStyle/>
+        <a:p>
+          <a:endParaRPr lang="en-GB"/>
+        </a:p>
+      </dgm:t>
     </dgm:pt>
     <dgm:pt modelId="{9DB798A0-73F4-4F06-9990-861FF4F4441E}" type="pres">
       <dgm:prSet presAssocID="{547443E2-0F03-469A-A437-9E2747B02374}" presName="connectorText" presStyleLbl="sibTrans2D1" presStyleIdx="5" presStyleCnt="7"/>
       <dgm:spPr/>
+      <dgm:t>
+        <a:bodyPr/>
+        <a:lstStyle/>
+        <a:p>
+          <a:endParaRPr lang="en-GB"/>
+        </a:p>
+      </dgm:t>
     </dgm:pt>
     <dgm:pt modelId="{6F975970-5D49-4274-A96F-32B42483DD3D}" type="pres">
       <dgm:prSet presAssocID="{8BC5456B-F7D8-438A-AE80-C1EF55162446}" presName="node" presStyleLbl="node1" presStyleIdx="6" presStyleCnt="8" custLinFactX="-203421" custLinFactNeighborX="-300000" custLinFactNeighborY="77163">
@@ -2700,10 +2823,24 @@
     <dgm:pt modelId="{D892B3A8-C072-4930-9EEB-58D47D4E8943}" type="pres">
       <dgm:prSet presAssocID="{C94BB955-669E-466F-BC7C-24FD692B1F2F}" presName="sibTrans" presStyleLbl="sibTrans2D1" presStyleIdx="6" presStyleCnt="7"/>
       <dgm:spPr/>
+      <dgm:t>
+        <a:bodyPr/>
+        <a:lstStyle/>
+        <a:p>
+          <a:endParaRPr lang="en-GB"/>
+        </a:p>
+      </dgm:t>
     </dgm:pt>
     <dgm:pt modelId="{BEDD0B67-9C46-4A13-9443-62346533CAA1}" type="pres">
       <dgm:prSet presAssocID="{C94BB955-669E-466F-BC7C-24FD692B1F2F}" presName="connectorText" presStyleLbl="sibTrans2D1" presStyleIdx="6" presStyleCnt="7"/>
       <dgm:spPr/>
+      <dgm:t>
+        <a:bodyPr/>
+        <a:lstStyle/>
+        <a:p>
+          <a:endParaRPr lang="en-GB"/>
+        </a:p>
+      </dgm:t>
     </dgm:pt>
     <dgm:pt modelId="{DD678B2C-6F52-476E-BB5B-B0223FFEEA8F}" type="pres">
       <dgm:prSet presAssocID="{EF9B84EE-86AC-49E8-9A54-7647D02AF1AA}" presName="node" presStyleLbl="node1" presStyleIdx="7" presStyleCnt="8" custLinFactX="-407263" custLinFactNeighborX="-500000" custLinFactNeighborY="78958">
@@ -2712,6 +2849,13 @@
         </dgm:presLayoutVars>
       </dgm:prSet>
       <dgm:spPr/>
+      <dgm:t>
+        <a:bodyPr/>
+        <a:lstStyle/>
+        <a:p>
+          <a:endParaRPr lang="en-GB"/>
+        </a:p>
+      </dgm:t>
     </dgm:pt>
   </dgm:ptLst>
   <dgm:cxnLst>
@@ -7238,7 +7382,7 @@
           <a:p>
             <a:fld id="{FBAF0B1C-0F93-442B-B1C4-E1C550DA5460}" type="datetimeFigureOut">
               <a:rPr lang="en-GB" smtClean="0"/>
-              <a:t>26/04/2015</a:t>
+              <a:t>27/04/2015</a:t>
             </a:fld>
             <a:endParaRPr lang="en-GB"/>
           </a:p>
@@ -7970,20 +8114,19 @@
             </a:pPr>
             <a:r>
               <a:rPr lang="en-US" dirty="0" smtClean="0"/>
-              <a:t>IIS</a:t>
+              <a:t>Every page has</a:t>
             </a:r>
             <a:r>
               <a:rPr lang="en-US" baseline="0" dirty="0" smtClean="0"/>
-              <a:t> determines that request needs to be processed by ASP.NET</a:t>
-            </a:r>
-          </a:p>
-          <a:p>
-            <a:pPr marL="228600" indent="-228600">
-              <a:buAutoNum type="arabicPeriod"/>
-            </a:pPr>
+              <a:t> its own controller, </a:t>
+            </a:r>
+            <a:r>
+              <a:rPr lang="en-US" baseline="0" dirty="0" err="1" smtClean="0"/>
+              <a:t>ie</a:t>
+            </a:r>
             <a:r>
               <a:rPr lang="en-US" baseline="0" dirty="0" smtClean="0"/>
-              <a:t>URL Routing module process the request as any standard http module, looks for the route table defined in the project and dissects the request. </a:t>
+              <a:t> code behind</a:t>
             </a:r>
           </a:p>
           <a:p>
@@ -7992,57 +8135,22 @@
             </a:pPr>
             <a:r>
               <a:rPr lang="en-US" baseline="0" dirty="0" smtClean="0"/>
-              <a:t>If it founds the pattern matching then it invokes </a:t>
+              <a:t>     Common controller for all pages </a:t>
             </a:r>
             <a:r>
               <a:rPr lang="en-US" baseline="0" dirty="0" err="1" smtClean="0"/>
-              <a:t>IHttpHandler</a:t>
+              <a:t>tp</a:t>
             </a:r>
             <a:r>
               <a:rPr lang="en-US" baseline="0" dirty="0" smtClean="0"/>
-              <a:t> using the </a:t>
-            </a:r>
-            <a:r>
-              <a:rPr lang="en-US" baseline="0" dirty="0" err="1" smtClean="0"/>
-              <a:t>GetHttpHandler</a:t>
-            </a:r>
-            <a:r>
-              <a:rPr lang="en-US" baseline="0" dirty="0" smtClean="0"/>
-              <a:t>. For MVC the default route handler is the </a:t>
-            </a:r>
-            <a:r>
-              <a:rPr lang="en-US" baseline="0" dirty="0" err="1" smtClean="0"/>
-              <a:t>MVCRouteHandler</a:t>
-            </a:r>
-            <a:r>
-              <a:rPr lang="en-US" baseline="0" dirty="0" smtClean="0"/>
-              <a:t>.</a:t>
+              <a:t> process the requests</a:t>
             </a:r>
           </a:p>
           <a:p>
             <a:pPr marL="0" indent="0">
               <a:buNone/>
             </a:pPr>
-            <a:r>
-              <a:rPr lang="en-US" baseline="0" dirty="0" smtClean="0"/>
-              <a:t>3. </a:t>
-            </a:r>
-            <a:r>
-              <a:rPr lang="en-US" baseline="0" dirty="0" err="1" smtClean="0"/>
-              <a:t>GetHttpHandler</a:t>
-            </a:r>
-            <a:r>
-              <a:rPr lang="en-US" baseline="0" dirty="0" smtClean="0"/>
-              <a:t> returns MVC Handler which is responsible for actual processing of the </a:t>
-            </a:r>
-            <a:r>
-              <a:rPr lang="en-US" baseline="0" dirty="0" err="1" smtClean="0"/>
-              <a:t>requet</a:t>
-            </a:r>
-            <a:r>
-              <a:rPr lang="en-US" baseline="0" dirty="0" smtClean="0"/>
-              <a:t> and generating the response.</a:t>
-            </a:r>
+            <a:endParaRPr lang="en-US" baseline="0" dirty="0" smtClean="0"/>
           </a:p>
           <a:p>
             <a:pPr marL="0" indent="0">
@@ -8050,46 +8158,38 @@
             </a:pPr>
             <a:r>
               <a:rPr lang="en-US" baseline="0" dirty="0" smtClean="0"/>
-              <a:t>4. MVC Handlers uses </a:t>
+              <a:t>2. No separation of concerns, tightly coupled with </a:t>
             </a:r>
             <a:r>
               <a:rPr lang="en-US" baseline="0" dirty="0" err="1" smtClean="0"/>
-              <a:t>IControllerFactory</a:t>
+              <a:t>aspx</a:t>
             </a:r>
             <a:r>
               <a:rPr lang="en-US" baseline="0" dirty="0" smtClean="0"/>
-              <a:t> instance to the get the </a:t>
+              <a:t> and </a:t>
             </a:r>
             <a:r>
               <a:rPr lang="en-US" baseline="0" dirty="0" err="1" smtClean="0"/>
-              <a:t>IController</a:t>
+              <a:t>cs</a:t>
             </a:r>
             <a:r>
               <a:rPr lang="en-US" baseline="0" dirty="0" smtClean="0"/>
-              <a:t> object, it has an execute method which executes our action method. All our controllers should inherit </a:t>
+              <a:t> files, Clean </a:t>
             </a:r>
             <a:r>
               <a:rPr lang="en-US" baseline="0" dirty="0" err="1" smtClean="0"/>
-              <a:t>IController</a:t>
-            </a:r>
-            <a:endParaRPr lang="en-US" baseline="0" dirty="0" smtClean="0"/>
+              <a:t>seperation</a:t>
+            </a:r>
+            <a:r>
+              <a:rPr lang="en-US" baseline="0" dirty="0" smtClean="0"/>
+              <a:t>, View and Controller are loosely coupled and can be reused independently</a:t>
+            </a:r>
           </a:p>
           <a:p>
             <a:pPr marL="0" indent="0">
               <a:buNone/>
             </a:pPr>
-            <a:r>
-              <a:rPr lang="en-US" baseline="0" dirty="0" smtClean="0"/>
-              <a:t>5. Once the controller is instantiated, </a:t>
-            </a:r>
-            <a:r>
-              <a:rPr lang="en-US" baseline="0" dirty="0" err="1" smtClean="0"/>
-              <a:t>ActionInvoker</a:t>
-            </a:r>
-            <a:r>
-              <a:rPr lang="en-US" baseline="0" dirty="0" smtClean="0"/>
-              <a:t> determines which action needs to be executed, while executing the action method it will looks for any filters that needs to executed before and after action execution and will look for any custom model binders being specified</a:t>
-            </a:r>
+            <a:endParaRPr lang="en-US" baseline="0" dirty="0" smtClean="0"/>
           </a:p>
           <a:p>
             <a:pPr marL="0" indent="0">
@@ -8097,46 +8197,14 @@
             </a:pPr>
             <a:r>
               <a:rPr lang="en-US" baseline="0" dirty="0" smtClean="0"/>
-              <a:t>6. The output of the Action method is the Action result object. An action method always returns  Action Result type. Action result can be </a:t>
-            </a:r>
-            <a:r>
-              <a:rPr lang="en-US" baseline="0" dirty="0" err="1" smtClean="0"/>
-              <a:t>ViewResult</a:t>
-            </a:r>
-            <a:r>
-              <a:rPr lang="en-US" baseline="0" dirty="0" smtClean="0"/>
-              <a:t>, </a:t>
-            </a:r>
-            <a:r>
-              <a:rPr lang="en-US" baseline="0" dirty="0" err="1" smtClean="0"/>
-              <a:t>JsonResult</a:t>
-            </a:r>
-            <a:r>
-              <a:rPr lang="en-US" baseline="0" dirty="0" smtClean="0"/>
-              <a:t>, </a:t>
-            </a:r>
-            <a:r>
-              <a:rPr lang="en-US" baseline="0" dirty="0" err="1" smtClean="0"/>
-              <a:t>HttpResult</a:t>
-            </a:r>
-            <a:r>
-              <a:rPr lang="en-US" baseline="0" dirty="0" smtClean="0"/>
-              <a:t> </a:t>
-            </a:r>
-            <a:r>
-              <a:rPr lang="en-US" baseline="0" dirty="0" err="1" smtClean="0"/>
-              <a:t>etc</a:t>
-            </a:r>
-            <a:endParaRPr lang="en-US" baseline="0" dirty="0" smtClean="0"/>
+              <a:t>3. Due to tight coupling automated testing is very difficult where as with loose coupling we can create automated test for views and controller very easily and TDD is very simple</a:t>
+            </a:r>
           </a:p>
           <a:p>
             <a:pPr marL="0" indent="0">
               <a:buNone/>
             </a:pPr>
-            <a:r>
-              <a:rPr lang="en-US" baseline="0" dirty="0" smtClean="0"/>
-              <a:t>7. The action result is then passed to the View engine to render the result, View Engines provided by framework are razor and web forms</a:t>
-            </a:r>
+            <a:endParaRPr lang="en-US" baseline="0" dirty="0" smtClean="0"/>
           </a:p>
           <a:p>
             <a:pPr marL="0" indent="0">
@@ -8144,16 +8212,54 @@
             </a:pPr>
             <a:r>
               <a:rPr lang="en-US" baseline="0" dirty="0" smtClean="0"/>
-              <a:t>8. The view engine these emits the html by parsing the </a:t>
+              <a:t>4. To simulate win forms like </a:t>
             </a:r>
             <a:r>
               <a:rPr lang="en-US" baseline="0" dirty="0" err="1" smtClean="0"/>
-              <a:t>ActionResult</a:t>
+              <a:t>behaviour</a:t>
             </a:r>
             <a:r>
               <a:rPr lang="en-US" baseline="0" dirty="0" smtClean="0"/>
-              <a:t> and sends the response back to the browser</a:t>
-            </a:r>
+              <a:t> </a:t>
+            </a:r>
+            <a:r>
+              <a:rPr lang="en-US" baseline="0" dirty="0" err="1" smtClean="0"/>
+              <a:t>ViewState</a:t>
+            </a:r>
+            <a:r>
+              <a:rPr lang="en-US" baseline="0" dirty="0" smtClean="0"/>
+              <a:t> was used to maintain state for stateless web. Has lot of problems like as controls in the page grows, </a:t>
+            </a:r>
+            <a:r>
+              <a:rPr lang="en-US" baseline="0" dirty="0" err="1" smtClean="0"/>
+              <a:t>viewstate</a:t>
+            </a:r>
+            <a:r>
+              <a:rPr lang="en-US" baseline="0" dirty="0" smtClean="0"/>
+              <a:t> also increases in size which affects the performance.    With MVC, the patterns follows the stateless web approach and hence no </a:t>
+            </a:r>
+            <a:r>
+              <a:rPr lang="en-US" baseline="0" dirty="0" err="1" smtClean="0"/>
+              <a:t>viewstate</a:t>
+            </a:r>
+            <a:r>
+              <a:rPr lang="en-US" baseline="0" dirty="0" smtClean="0"/>
+              <a:t> is needed</a:t>
+            </a:r>
+          </a:p>
+          <a:p>
+            <a:pPr marL="0" indent="0">
+              <a:buNone/>
+            </a:pPr>
+            <a:r>
+              <a:rPr lang="en-US" baseline="0" dirty="0" smtClean="0"/>
+              <a:t>5. </a:t>
+            </a:r>
+          </a:p>
+          <a:p>
+            <a:pPr marL="0" indent="0">
+              <a:buNone/>
+            </a:pPr>
             <a:endParaRPr lang="en-GB" dirty="0"/>
           </a:p>
         </p:txBody>
@@ -8175,7 +8281,280 @@
           <a:p>
             <a:fld id="{2F501DB9-A105-4A8D-BF77-F79BCAF36C32}" type="slidenum">
               <a:rPr lang="en-GB" smtClean="0"/>
-              <a:t>7</a:t>
+              <a:t>6</a:t>
+            </a:fld>
+            <a:endParaRPr lang="en-GB"/>
+          </a:p>
+        </p:txBody>
+      </p:sp>
+    </p:spTree>
+    <p:extLst>
+      <p:ext uri="{BB962C8B-B14F-4D97-AF65-F5344CB8AC3E}">
+        <p14:creationId xmlns:p14="http://schemas.microsoft.com/office/powerpoint/2010/main" val="3047370423"/>
+      </p:ext>
+    </p:extLst>
+  </p:cSld>
+  <p:clrMapOvr>
+    <a:masterClrMapping/>
+  </p:clrMapOvr>
+</p:notes>
+</file>
+
+<file path=ppt/notesSlides/notesSlide4.xml><?xml version="1.0" encoding="utf-8"?>
+<p:notes xmlns:a="http://schemas.openxmlformats.org/drawingml/2006/main" xmlns:r="http://schemas.openxmlformats.org/officeDocument/2006/relationships" xmlns:p="http://schemas.openxmlformats.org/presentationml/2006/main">
+  <p:cSld>
+    <p:spTree>
+      <p:nvGrpSpPr>
+        <p:cNvPr id="1" name=""/>
+        <p:cNvGrpSpPr/>
+        <p:nvPr/>
+      </p:nvGrpSpPr>
+      <p:grpSpPr>
+        <a:xfrm>
+          <a:off x="0" y="0"/>
+          <a:ext cx="0" cy="0"/>
+          <a:chOff x="0" y="0"/>
+          <a:chExt cx="0" cy="0"/>
+        </a:xfrm>
+      </p:grpSpPr>
+      <p:sp>
+        <p:nvSpPr>
+          <p:cNvPr id="2" name="Slide Image Placeholder 1"/>
+          <p:cNvSpPr>
+            <a:spLocks noGrp="1" noRot="1" noChangeAspect="1"/>
+          </p:cNvSpPr>
+          <p:nvPr>
+            <p:ph type="sldImg"/>
+          </p:nvPr>
+        </p:nvSpPr>
+        <p:spPr/>
+      </p:sp>
+      <p:sp>
+        <p:nvSpPr>
+          <p:cNvPr id="3" name="Notes Placeholder 2"/>
+          <p:cNvSpPr>
+            <a:spLocks noGrp="1"/>
+          </p:cNvSpPr>
+          <p:nvPr>
+            <p:ph type="body" idx="1"/>
+          </p:nvPr>
+        </p:nvSpPr>
+        <p:spPr/>
+        <p:txBody>
+          <a:bodyPr/>
+          <a:lstStyle/>
+          <a:p>
+            <a:pPr marL="228600" indent="-228600">
+              <a:buAutoNum type="arabicPeriod"/>
+            </a:pPr>
+            <a:r>
+              <a:rPr lang="en-US" dirty="0" smtClean="0"/>
+              <a:t>IIS</a:t>
+            </a:r>
+            <a:r>
+              <a:rPr lang="en-US" baseline="0" dirty="0" smtClean="0"/>
+              <a:t> determines that request needs to be processed by ASP.NET</a:t>
+            </a:r>
+          </a:p>
+          <a:p>
+            <a:pPr marL="228600" indent="-228600">
+              <a:buAutoNum type="arabicPeriod"/>
+            </a:pPr>
+            <a:r>
+              <a:rPr lang="en-US" baseline="0" dirty="0" smtClean="0"/>
+              <a:t>URL Routing module process the request as any standard http module, looks for the route table defined in the project and dissects the request. </a:t>
+            </a:r>
+          </a:p>
+          <a:p>
+            <a:pPr marL="0" indent="0">
+              <a:buNone/>
+            </a:pPr>
+            <a:r>
+              <a:rPr lang="en-US" baseline="0" dirty="0" smtClean="0"/>
+              <a:t>If it founds the pattern matching then it invokes </a:t>
+            </a:r>
+            <a:r>
+              <a:rPr lang="en-US" baseline="0" dirty="0" err="1" smtClean="0"/>
+              <a:t>IHttpHandler</a:t>
+            </a:r>
+            <a:r>
+              <a:rPr lang="en-US" baseline="0" dirty="0" smtClean="0"/>
+              <a:t> using the </a:t>
+            </a:r>
+            <a:r>
+              <a:rPr lang="en-US" baseline="0" dirty="0" err="1" smtClean="0"/>
+              <a:t>GetHttpHandler</a:t>
+            </a:r>
+            <a:r>
+              <a:rPr lang="en-US" baseline="0" dirty="0" smtClean="0"/>
+              <a:t>. For MVC the default route handler is the </a:t>
+            </a:r>
+            <a:r>
+              <a:rPr lang="en-US" baseline="0" dirty="0" err="1" smtClean="0"/>
+              <a:t>MVCRouteHandler</a:t>
+            </a:r>
+            <a:r>
+              <a:rPr lang="en-US" baseline="0" dirty="0" smtClean="0"/>
+              <a:t>.</a:t>
+            </a:r>
+          </a:p>
+          <a:p>
+            <a:pPr marL="0" indent="0">
+              <a:buNone/>
+            </a:pPr>
+            <a:r>
+              <a:rPr lang="en-US" baseline="0" dirty="0" smtClean="0"/>
+              <a:t>3. </a:t>
+            </a:r>
+            <a:r>
+              <a:rPr lang="en-US" baseline="0" dirty="0" err="1" smtClean="0"/>
+              <a:t>GetHttpHandler</a:t>
+            </a:r>
+            <a:r>
+              <a:rPr lang="en-US" baseline="0" dirty="0" smtClean="0"/>
+              <a:t> returns MVC Handler which is responsible for actual processing of the </a:t>
+            </a:r>
+            <a:r>
+              <a:rPr lang="en-US" baseline="0" dirty="0" err="1" smtClean="0"/>
+              <a:t>requet</a:t>
+            </a:r>
+            <a:r>
+              <a:rPr lang="en-US" baseline="0" dirty="0" smtClean="0"/>
+              <a:t> and generating the response.</a:t>
+            </a:r>
+          </a:p>
+          <a:p>
+            <a:pPr marL="0" indent="0">
+              <a:buNone/>
+            </a:pPr>
+            <a:r>
+              <a:rPr lang="en-US" baseline="0" dirty="0" smtClean="0"/>
+              <a:t>4. MVC Handlers uses </a:t>
+            </a:r>
+            <a:r>
+              <a:rPr lang="en-US" baseline="0" dirty="0" err="1" smtClean="0"/>
+              <a:t>IControllerFactory</a:t>
+            </a:r>
+            <a:r>
+              <a:rPr lang="en-US" baseline="0" dirty="0" smtClean="0"/>
+              <a:t> instance to the get the </a:t>
+            </a:r>
+            <a:r>
+              <a:rPr lang="en-US" baseline="0" dirty="0" err="1" smtClean="0"/>
+              <a:t>IController</a:t>
+            </a:r>
+            <a:r>
+              <a:rPr lang="en-US" baseline="0" dirty="0" smtClean="0"/>
+              <a:t> object, it has an execute method which executes our action method. All our controllers should inherit </a:t>
+            </a:r>
+            <a:r>
+              <a:rPr lang="en-US" baseline="0" dirty="0" err="1" smtClean="0"/>
+              <a:t>IController</a:t>
+            </a:r>
+            <a:endParaRPr lang="en-US" baseline="0" dirty="0" smtClean="0"/>
+          </a:p>
+          <a:p>
+            <a:pPr marL="0" indent="0">
+              <a:buNone/>
+            </a:pPr>
+            <a:r>
+              <a:rPr lang="en-US" baseline="0" dirty="0" smtClean="0"/>
+              <a:t>5. Once the controller is instantiated, </a:t>
+            </a:r>
+            <a:r>
+              <a:rPr lang="en-US" baseline="0" dirty="0" err="1" smtClean="0"/>
+              <a:t>ActionInvoker</a:t>
+            </a:r>
+            <a:r>
+              <a:rPr lang="en-US" baseline="0" dirty="0" smtClean="0"/>
+              <a:t> determines which action needs to be executed, while executing the action method it will looks for any filters that needs to executed before and after action execution and will look for any custom model binders being specified</a:t>
+            </a:r>
+          </a:p>
+          <a:p>
+            <a:pPr marL="0" indent="0">
+              <a:buNone/>
+            </a:pPr>
+            <a:r>
+              <a:rPr lang="en-US" baseline="0" dirty="0" smtClean="0"/>
+              <a:t>6. The output of the Action method is the Action result object. An action method always returns  Action Result type. Action result can be </a:t>
+            </a:r>
+            <a:r>
+              <a:rPr lang="en-US" baseline="0" dirty="0" err="1" smtClean="0"/>
+              <a:t>ViewResult</a:t>
+            </a:r>
+            <a:r>
+              <a:rPr lang="en-US" baseline="0" dirty="0" smtClean="0"/>
+              <a:t>, </a:t>
+            </a:r>
+            <a:r>
+              <a:rPr lang="en-US" baseline="0" dirty="0" err="1" smtClean="0"/>
+              <a:t>JsonResult</a:t>
+            </a:r>
+            <a:r>
+              <a:rPr lang="en-US" baseline="0" dirty="0" smtClean="0"/>
+              <a:t>, </a:t>
+            </a:r>
+            <a:r>
+              <a:rPr lang="en-US" baseline="0" dirty="0" err="1" smtClean="0"/>
+              <a:t>HttpResult</a:t>
+            </a:r>
+            <a:r>
+              <a:rPr lang="en-US" baseline="0" dirty="0" smtClean="0"/>
+              <a:t> </a:t>
+            </a:r>
+            <a:r>
+              <a:rPr lang="en-US" baseline="0" dirty="0" err="1" smtClean="0"/>
+              <a:t>etc</a:t>
+            </a:r>
+            <a:endParaRPr lang="en-US" baseline="0" dirty="0" smtClean="0"/>
+          </a:p>
+          <a:p>
+            <a:pPr marL="0" indent="0">
+              <a:buNone/>
+            </a:pPr>
+            <a:r>
+              <a:rPr lang="en-US" baseline="0" dirty="0" smtClean="0"/>
+              <a:t>7. The action result is then passed to the View engine to render the result, View Engines provided by framework are razor and web forms</a:t>
+            </a:r>
+          </a:p>
+          <a:p>
+            <a:pPr marL="0" indent="0">
+              <a:buNone/>
+            </a:pPr>
+            <a:r>
+              <a:rPr lang="en-US" baseline="0" dirty="0" smtClean="0"/>
+              <a:t>8. The view engine these emits the html by parsing the </a:t>
+            </a:r>
+            <a:r>
+              <a:rPr lang="en-US" baseline="0" dirty="0" err="1" smtClean="0"/>
+              <a:t>ActionResult</a:t>
+            </a:r>
+            <a:r>
+              <a:rPr lang="en-US" baseline="0" dirty="0" smtClean="0"/>
+              <a:t> and sends the response back to the browser</a:t>
+            </a:r>
+            <a:endParaRPr lang="en-GB" dirty="0"/>
+          </a:p>
+        </p:txBody>
+      </p:sp>
+      <p:sp>
+        <p:nvSpPr>
+          <p:cNvPr id="4" name="Slide Number Placeholder 3"/>
+          <p:cNvSpPr>
+            <a:spLocks noGrp="1"/>
+          </p:cNvSpPr>
+          <p:nvPr>
+            <p:ph type="sldNum" sz="quarter" idx="10"/>
+          </p:nvPr>
+        </p:nvSpPr>
+        <p:spPr/>
+        <p:txBody>
+          <a:bodyPr/>
+          <a:lstStyle/>
+          <a:p>
+            <a:fld id="{2F501DB9-A105-4A8D-BF77-F79BCAF36C32}" type="slidenum">
+              <a:rPr lang="en-GB" smtClean="0"/>
+              <a:t>8</a:t>
             </a:fld>
             <a:endParaRPr lang="en-GB"/>
           </a:p>
@@ -8370,7 +8749,7 @@
           <a:p>
             <a:fld id="{96DFF08F-DC6B-4601-B491-B0F83F6DD2DA}" type="datetimeFigureOut">
               <a:rPr lang="en-US" dirty="0"/>
-              <a:t>4/26/2015</a:t>
+              <a:t>4/27/2015</a:t>
             </a:fld>
             <a:endParaRPr lang="en-US" dirty="0"/>
           </a:p>
@@ -8535,7 +8914,7 @@
           <a:p>
             <a:fld id="{96DFF08F-DC6B-4601-B491-B0F83F6DD2DA}" type="datetimeFigureOut">
               <a:rPr lang="en-US" dirty="0"/>
-              <a:t>4/26/2015</a:t>
+              <a:t>4/27/2015</a:t>
             </a:fld>
             <a:endParaRPr lang="en-US" dirty="0"/>
           </a:p>
@@ -8753,7 +9132,7 @@
           <a:p>
             <a:fld id="{96DFF08F-DC6B-4601-B491-B0F83F6DD2DA}" type="datetimeFigureOut">
               <a:rPr lang="en-US" dirty="0"/>
-              <a:t>4/26/2015</a:t>
+              <a:t>4/27/2015</a:t>
             </a:fld>
             <a:endParaRPr lang="en-US" dirty="0"/>
           </a:p>
@@ -8928,7 +9307,7 @@
           <a:p>
             <a:fld id="{96DFF08F-DC6B-4601-B491-B0F83F6DD2DA}" type="datetimeFigureOut">
               <a:rPr lang="en-US" dirty="0"/>
-              <a:t>4/26/2015</a:t>
+              <a:t>4/27/2015</a:t>
             </a:fld>
             <a:endParaRPr lang="en-US" dirty="0"/>
           </a:p>
@@ -9234,7 +9613,7 @@
             <a:fld id="{96DFF08F-DC6B-4601-B491-B0F83F6DD2DA}" type="datetimeFigureOut">
               <a:rPr lang="en-US" dirty="0"/>
               <a:pPr/>
-              <a:t>4/26/2015</a:t>
+              <a:t>4/27/2015</a:t>
             </a:fld>
             <a:endParaRPr lang="en-US" dirty="0"/>
           </a:p>
@@ -9534,7 +9913,7 @@
           <a:p>
             <a:fld id="{96DFF08F-DC6B-4601-B491-B0F83F6DD2DA}" type="datetimeFigureOut">
               <a:rPr lang="en-US" dirty="0"/>
-              <a:t>4/26/2015</a:t>
+              <a:t>4/27/2015</a:t>
             </a:fld>
             <a:endParaRPr lang="en-US" dirty="0"/>
           </a:p>
@@ -9951,7 +10330,7 @@
           <a:p>
             <a:fld id="{96DFF08F-DC6B-4601-B491-B0F83F6DD2DA}" type="datetimeFigureOut">
               <a:rPr lang="en-US" dirty="0"/>
-              <a:t>4/26/2015</a:t>
+              <a:t>4/27/2015</a:t>
             </a:fld>
             <a:endParaRPr lang="en-US" dirty="0"/>
           </a:p>
@@ -10064,7 +10443,7 @@
           <a:p>
             <a:fld id="{96DFF08F-DC6B-4601-B491-B0F83F6DD2DA}" type="datetimeFigureOut">
               <a:rPr lang="en-US" dirty="0"/>
-              <a:t>4/26/2015</a:t>
+              <a:t>4/27/2015</a:t>
             </a:fld>
             <a:endParaRPr lang="en-US" dirty="0"/>
           </a:p>
@@ -10154,7 +10533,7 @@
           <a:p>
             <a:fld id="{96DFF08F-DC6B-4601-B491-B0F83F6DD2DA}" type="datetimeFigureOut">
               <a:rPr lang="en-US" dirty="0"/>
-              <a:t>4/26/2015</a:t>
+              <a:t>4/27/2015</a:t>
             </a:fld>
             <a:endParaRPr lang="en-US" dirty="0"/>
           </a:p>
@@ -10422,7 +10801,7 @@
           <a:p>
             <a:fld id="{96DFF08F-DC6B-4601-B491-B0F83F6DD2DA}" type="datetimeFigureOut">
               <a:rPr lang="en-US" dirty="0"/>
-              <a:t>4/26/2015</a:t>
+              <a:t>4/27/2015</a:t>
             </a:fld>
             <a:endParaRPr lang="en-US" dirty="0"/>
           </a:p>
@@ -10682,7 +11061,7 @@
           <a:p>
             <a:fld id="{96DFF08F-DC6B-4601-B491-B0F83F6DD2DA}" type="datetimeFigureOut">
               <a:rPr lang="en-US" dirty="0"/>
-              <a:t>4/26/2015</a:t>
+              <a:t>4/27/2015</a:t>
             </a:fld>
             <a:endParaRPr lang="en-US" dirty="0"/>
           </a:p>
@@ -10932,7 +11311,7 @@
             <a:fld id="{96DFF08F-DC6B-4601-B491-B0F83F6DD2DA}" type="datetimeFigureOut">
               <a:rPr lang="en-US" dirty="0"/>
               <a:pPr/>
-              <a:t>4/26/2015</a:t>
+              <a:t>4/27/2015</a:t>
             </a:fld>
             <a:endParaRPr lang="en-US" dirty="0"/>
           </a:p>
@@ -11455,6 +11834,347 @@
 </p:sld>
 </file>
 
+<file path=ppt/slides/slide10.xml><?xml version="1.0" encoding="utf-8"?>
+<p:sld xmlns:a="http://schemas.openxmlformats.org/drawingml/2006/main" xmlns:r="http://schemas.openxmlformats.org/officeDocument/2006/relationships" xmlns:p="http://schemas.openxmlformats.org/presentationml/2006/main">
+  <p:cSld>
+    <p:spTree>
+      <p:nvGrpSpPr>
+        <p:cNvPr id="1" name=""/>
+        <p:cNvGrpSpPr/>
+        <p:nvPr/>
+      </p:nvGrpSpPr>
+      <p:grpSpPr>
+        <a:xfrm>
+          <a:off x="0" y="0"/>
+          <a:ext cx="0" cy="0"/>
+          <a:chOff x="0" y="0"/>
+          <a:chExt cx="0" cy="0"/>
+        </a:xfrm>
+      </p:grpSpPr>
+      <p:sp>
+        <p:nvSpPr>
+          <p:cNvPr id="2" name="Title 1"/>
+          <p:cNvSpPr>
+            <a:spLocks noGrp="1"/>
+          </p:cNvSpPr>
+          <p:nvPr>
+            <p:ph type="title"/>
+          </p:nvPr>
+        </p:nvSpPr>
+        <p:spPr/>
+        <p:txBody>
+          <a:bodyPr/>
+          <a:lstStyle/>
+          <a:p>
+            <a:r>
+              <a:rPr lang="en-US" dirty="0" smtClean="0"/>
+              <a:t>One asp.net</a:t>
+            </a:r>
+            <a:endParaRPr lang="en-GB" dirty="0"/>
+          </a:p>
+        </p:txBody>
+      </p:sp>
+      <p:pic>
+        <p:nvPicPr>
+          <p:cNvPr id="1026" name="Picture 2"/>
+          <p:cNvPicPr>
+            <a:picLocks noGrp="1" noChangeAspect="1" noChangeArrowheads="1"/>
+          </p:cNvPicPr>
+          <p:nvPr>
+            <p:ph idx="1"/>
+          </p:nvPr>
+        </p:nvPicPr>
+        <p:blipFill rotWithShape="1">
+          <a:blip r:embed="rId2">
+            <a:extLst>
+              <a:ext uri="{28A0092B-C50C-407E-A947-70E740481C1C}">
+                <a14:useLocalDpi xmlns:a14="http://schemas.microsoft.com/office/drawing/2010/main" val="0"/>
+              </a:ext>
+            </a:extLst>
+          </a:blip>
+          <a:srcRect r="2336" b="3611"/>
+          <a:stretch/>
+        </p:blipFill>
+        <p:spPr bwMode="auto">
+          <a:xfrm>
+            <a:off x="2909095" y="2262188"/>
+            <a:ext cx="6223330" cy="3571453"/>
+          </a:xfrm>
+          <a:prstGeom prst="rect">
+            <a:avLst/>
+          </a:prstGeom>
+          <a:noFill/>
+          <a:ln>
+            <a:noFill/>
+          </a:ln>
+          <a:extLst>
+            <a:ext uri="{909E8E84-426E-40DD-AFC4-6F175D3DCCD1}">
+              <a14:hiddenFill xmlns:a14="http://schemas.microsoft.com/office/drawing/2010/main">
+                <a:solidFill>
+                  <a:schemeClr val="accent1"/>
+                </a:solidFill>
+              </a14:hiddenFill>
+            </a:ext>
+            <a:ext uri="{91240B29-F687-4F45-9708-019B960494DF}">
+              <a14:hiddenLine xmlns:a14="http://schemas.microsoft.com/office/drawing/2010/main" w="9525">
+                <a:solidFill>
+                  <a:schemeClr val="tx1"/>
+                </a:solidFill>
+                <a:miter lim="800000"/>
+                <a:headEnd/>
+                <a:tailEnd/>
+              </a14:hiddenLine>
+            </a:ext>
+          </a:extLst>
+        </p:spPr>
+      </p:pic>
+    </p:spTree>
+    <p:extLst>
+      <p:ext uri="{BB962C8B-B14F-4D97-AF65-F5344CB8AC3E}">
+        <p14:creationId xmlns:p14="http://schemas.microsoft.com/office/powerpoint/2010/main" val="2306339081"/>
+      </p:ext>
+    </p:extLst>
+  </p:cSld>
+  <p:clrMapOvr>
+    <a:masterClrMapping/>
+  </p:clrMapOvr>
+</p:sld>
+</file>
+
+<file path=ppt/slides/slide11.xml><?xml version="1.0" encoding="utf-8"?>
+<p:sld xmlns:a="http://schemas.openxmlformats.org/drawingml/2006/main" xmlns:r="http://schemas.openxmlformats.org/officeDocument/2006/relationships" xmlns:p="http://schemas.openxmlformats.org/presentationml/2006/main">
+  <p:cSld>
+    <p:spTree>
+      <p:nvGrpSpPr>
+        <p:cNvPr id="1" name=""/>
+        <p:cNvGrpSpPr/>
+        <p:nvPr/>
+      </p:nvGrpSpPr>
+      <p:grpSpPr>
+        <a:xfrm>
+          <a:off x="0" y="0"/>
+          <a:ext cx="0" cy="0"/>
+          <a:chOff x="0" y="0"/>
+          <a:chExt cx="0" cy="0"/>
+        </a:xfrm>
+      </p:grpSpPr>
+      <p:sp>
+        <p:nvSpPr>
+          <p:cNvPr id="2" name="Title 1"/>
+          <p:cNvSpPr>
+            <a:spLocks noGrp="1"/>
+          </p:cNvSpPr>
+          <p:nvPr>
+            <p:ph type="title"/>
+          </p:nvPr>
+        </p:nvSpPr>
+        <p:spPr/>
+        <p:txBody>
+          <a:bodyPr/>
+          <a:lstStyle/>
+          <a:p>
+            <a:r>
+              <a:rPr lang="en-US" dirty="0" smtClean="0"/>
+              <a:t>Hello MVC - DEMO</a:t>
+            </a:r>
+            <a:endParaRPr lang="en-GB" dirty="0"/>
+          </a:p>
+        </p:txBody>
+      </p:sp>
+      <p:sp>
+        <p:nvSpPr>
+          <p:cNvPr id="3" name="Text Placeholder 2"/>
+          <p:cNvSpPr>
+            <a:spLocks noGrp="1"/>
+          </p:cNvSpPr>
+          <p:nvPr>
+            <p:ph type="body" idx="1"/>
+          </p:nvPr>
+        </p:nvSpPr>
+        <p:spPr/>
+        <p:txBody>
+          <a:bodyPr/>
+          <a:lstStyle/>
+          <a:p>
+            <a:endParaRPr lang="en-GB"/>
+          </a:p>
+        </p:txBody>
+      </p:sp>
+    </p:spTree>
+    <p:extLst>
+      <p:ext uri="{BB962C8B-B14F-4D97-AF65-F5344CB8AC3E}">
+        <p14:creationId xmlns:p14="http://schemas.microsoft.com/office/powerpoint/2010/main" val="1146940743"/>
+      </p:ext>
+    </p:extLst>
+  </p:cSld>
+  <p:clrMapOvr>
+    <a:masterClrMapping/>
+  </p:clrMapOvr>
+</p:sld>
+</file>
+
+<file path=ppt/slides/slide12.xml><?xml version="1.0" encoding="utf-8"?>
+<p:sld xmlns:a="http://schemas.openxmlformats.org/drawingml/2006/main" xmlns:r="http://schemas.openxmlformats.org/officeDocument/2006/relationships" xmlns:p="http://schemas.openxmlformats.org/presentationml/2006/main">
+  <p:cSld>
+    <p:spTree>
+      <p:nvGrpSpPr>
+        <p:cNvPr id="1" name=""/>
+        <p:cNvGrpSpPr/>
+        <p:nvPr/>
+      </p:nvGrpSpPr>
+      <p:grpSpPr>
+        <a:xfrm>
+          <a:off x="0" y="0"/>
+          <a:ext cx="0" cy="0"/>
+          <a:chOff x="0" y="0"/>
+          <a:chExt cx="0" cy="0"/>
+        </a:xfrm>
+      </p:grpSpPr>
+      <p:sp>
+        <p:nvSpPr>
+          <p:cNvPr id="4" name="Title 3"/>
+          <p:cNvSpPr>
+            <a:spLocks noGrp="1"/>
+          </p:cNvSpPr>
+          <p:nvPr>
+            <p:ph type="title"/>
+          </p:nvPr>
+        </p:nvSpPr>
+        <p:spPr/>
+        <p:txBody>
+          <a:bodyPr/>
+          <a:lstStyle/>
+          <a:p>
+            <a:r>
+              <a:rPr lang="en-US" dirty="0" smtClean="0"/>
+              <a:t>QUESTIONS ???</a:t>
+            </a:r>
+            <a:endParaRPr lang="en-GB" dirty="0"/>
+          </a:p>
+        </p:txBody>
+      </p:sp>
+      <p:sp>
+        <p:nvSpPr>
+          <p:cNvPr id="5" name="Text Placeholder 4"/>
+          <p:cNvSpPr>
+            <a:spLocks noGrp="1"/>
+          </p:cNvSpPr>
+          <p:nvPr>
+            <p:ph type="body" idx="1"/>
+          </p:nvPr>
+        </p:nvSpPr>
+        <p:spPr/>
+        <p:txBody>
+          <a:bodyPr/>
+          <a:lstStyle/>
+          <a:p>
+            <a:endParaRPr lang="en-GB" dirty="0"/>
+          </a:p>
+        </p:txBody>
+      </p:sp>
+    </p:spTree>
+    <p:extLst>
+      <p:ext uri="{BB962C8B-B14F-4D97-AF65-F5344CB8AC3E}">
+        <p14:creationId xmlns:p14="http://schemas.microsoft.com/office/powerpoint/2010/main" val="1304889787"/>
+      </p:ext>
+    </p:extLst>
+  </p:cSld>
+  <p:clrMapOvr>
+    <a:masterClrMapping/>
+  </p:clrMapOvr>
+  <p:timing>
+    <p:tnLst>
+      <p:par>
+        <p:cTn id="1" dur="indefinite" restart="never" nodeType="tmRoot"/>
+      </p:par>
+    </p:tnLst>
+  </p:timing>
+</p:sld>
+</file>
+
+<file path=ppt/slides/slide13.xml><?xml version="1.0" encoding="utf-8"?>
+<p:sld xmlns:a="http://schemas.openxmlformats.org/drawingml/2006/main" xmlns:r="http://schemas.openxmlformats.org/officeDocument/2006/relationships" xmlns:p="http://schemas.openxmlformats.org/presentationml/2006/main">
+  <p:cSld>
+    <p:spTree>
+      <p:nvGrpSpPr>
+        <p:cNvPr id="1" name=""/>
+        <p:cNvGrpSpPr/>
+        <p:nvPr/>
+      </p:nvGrpSpPr>
+      <p:grpSpPr>
+        <a:xfrm>
+          <a:off x="0" y="0"/>
+          <a:ext cx="0" cy="0"/>
+          <a:chOff x="0" y="0"/>
+          <a:chExt cx="0" cy="0"/>
+        </a:xfrm>
+      </p:grpSpPr>
+      <p:sp>
+        <p:nvSpPr>
+          <p:cNvPr id="4" name="Title 3"/>
+          <p:cNvSpPr>
+            <a:spLocks noGrp="1"/>
+          </p:cNvSpPr>
+          <p:nvPr>
+            <p:ph type="title"/>
+          </p:nvPr>
+        </p:nvSpPr>
+        <p:spPr/>
+        <p:txBody>
+          <a:bodyPr/>
+          <a:lstStyle/>
+          <a:p>
+            <a:r>
+              <a:rPr lang="en-US" dirty="0" smtClean="0"/>
+              <a:t>THANK YOU</a:t>
+            </a:r>
+            <a:endParaRPr lang="en-GB" dirty="0"/>
+          </a:p>
+        </p:txBody>
+      </p:sp>
+      <p:sp>
+        <p:nvSpPr>
+          <p:cNvPr id="5" name="Text Placeholder 4"/>
+          <p:cNvSpPr>
+            <a:spLocks noGrp="1"/>
+          </p:cNvSpPr>
+          <p:nvPr>
+            <p:ph type="body" idx="1"/>
+          </p:nvPr>
+        </p:nvSpPr>
+        <p:spPr/>
+        <p:txBody>
+          <a:bodyPr/>
+          <a:lstStyle/>
+          <a:p>
+            <a:r>
+              <a:rPr lang="en-US" dirty="0" smtClean="0"/>
+              <a:t>AMAL DEV</a:t>
+            </a:r>
+            <a:endParaRPr lang="en-GB" dirty="0"/>
+          </a:p>
+        </p:txBody>
+      </p:sp>
+    </p:spTree>
+    <p:extLst>
+      <p:ext uri="{BB962C8B-B14F-4D97-AF65-F5344CB8AC3E}">
+        <p14:creationId xmlns:p14="http://schemas.microsoft.com/office/powerpoint/2010/main" val="3145290803"/>
+      </p:ext>
+    </p:extLst>
+  </p:cSld>
+  <p:clrMapOvr>
+    <a:masterClrMapping/>
+  </p:clrMapOvr>
+  <p:timing>
+    <p:tnLst>
+      <p:par>
+        <p:cTn id="1" dur="indefinite" restart="never" nodeType="tmRoot"/>
+      </p:par>
+    </p:tnLst>
+  </p:timing>
+</p:sld>
+</file>
+
 <file path=ppt/slides/slide2.xml><?xml version="1.0" encoding="utf-8"?>
 <p:sld xmlns:a="http://schemas.openxmlformats.org/drawingml/2006/main" xmlns:r="http://schemas.openxmlformats.org/officeDocument/2006/relationships" xmlns:p="http://schemas.openxmlformats.org/presentationml/2006/main">
   <p:cSld>
@@ -11507,7 +12227,9 @@
         </p:nvSpPr>
         <p:spPr/>
         <p:txBody>
-          <a:bodyPr/>
+          <a:bodyPr>
+            <a:normAutofit/>
+          </a:bodyPr>
           <a:lstStyle/>
           <a:p>
             <a:r>
@@ -11524,33 +12246,48 @@
           <a:p>
             <a:r>
               <a:rPr lang="en-US" dirty="0" smtClean="0"/>
-              <a:t>Why ASP.NET MVC &amp; Why Not ASP.NET Web Forms ?</a:t>
-            </a:r>
-          </a:p>
-          <a:p>
+              <a:t>Why ASP.NET MVC &amp; Why Not ASP.NET Web Forms </a:t>
+            </a:r>
             <a:r>
               <a:rPr lang="en-US" dirty="0" smtClean="0"/>
+              <a:t>?</a:t>
+            </a:r>
+          </a:p>
+          <a:p>
+            <a:r>
+              <a:rPr lang="en-US" dirty="0" smtClean="0"/>
+              <a:t>How it works ?</a:t>
+            </a:r>
+            <a:endParaRPr lang="en-US" dirty="0" smtClean="0"/>
+          </a:p>
+          <a:p>
+            <a:r>
+              <a:rPr lang="en-US" dirty="0" smtClean="0"/>
+              <a:t>Tooling </a:t>
+            </a:r>
+            <a:r>
+              <a:rPr lang="en-US" dirty="0"/>
+              <a:t>&amp; Setting Up </a:t>
+            </a:r>
+            <a:r>
+              <a:rPr lang="en-US" dirty="0" smtClean="0"/>
+              <a:t>Environment</a:t>
+            </a:r>
+          </a:p>
+          <a:p>
+            <a:r>
+              <a:rPr lang="en-US" dirty="0"/>
               <a:t>One ASP.NET</a:t>
             </a:r>
           </a:p>
           <a:p>
             <a:r>
+              <a:rPr lang="en-US" dirty="0" smtClean="0"/>
+              <a:t>Hello </a:t>
+            </a:r>
+            <a:r>
               <a:rPr lang="en-US" dirty="0"/>
-              <a:t>Tooling &amp; Setting Up Environment</a:t>
-            </a:r>
-            <a:endParaRPr lang="en-GB" dirty="0"/>
-          </a:p>
-          <a:p>
-            <a:r>
-              <a:rPr lang="en-US" dirty="0"/>
-              <a:t>Getting Started</a:t>
-            </a:r>
-            <a:endParaRPr lang="en-GB" dirty="0"/>
-          </a:p>
-          <a:p>
-            <a:r>
-              <a:rPr lang="en-US" dirty="0"/>
-              <a:t>Hello MVC - Demo</a:t>
+              <a:t>MVC - Demo</a:t>
             </a:r>
             <a:endParaRPr lang="en-GB" dirty="0"/>
           </a:p>
@@ -12391,6 +13128,221 @@
 </file>
 
 <file path=ppt/slides/slide6.xml><?xml version="1.0" encoding="utf-8"?>
+<p:sld xmlns:a="http://schemas.openxmlformats.org/drawingml/2006/main" xmlns:r="http://schemas.openxmlformats.org/officeDocument/2006/relationships" xmlns:p="http://schemas.openxmlformats.org/presentationml/2006/main">
+  <p:cSld>
+    <p:spTree>
+      <p:nvGrpSpPr>
+        <p:cNvPr id="1" name=""/>
+        <p:cNvGrpSpPr/>
+        <p:nvPr/>
+      </p:nvGrpSpPr>
+      <p:grpSpPr>
+        <a:xfrm>
+          <a:off x="0" y="0"/>
+          <a:ext cx="0" cy="0"/>
+          <a:chOff x="0" y="0"/>
+          <a:chExt cx="0" cy="0"/>
+        </a:xfrm>
+      </p:grpSpPr>
+      <p:sp>
+        <p:nvSpPr>
+          <p:cNvPr id="4" name="Title 3"/>
+          <p:cNvSpPr>
+            <a:spLocks noGrp="1"/>
+          </p:cNvSpPr>
+          <p:nvPr>
+            <p:ph type="title"/>
+          </p:nvPr>
+        </p:nvSpPr>
+        <p:spPr/>
+        <p:txBody>
+          <a:bodyPr/>
+          <a:lstStyle/>
+          <a:p>
+            <a:r>
+              <a:rPr lang="en-US" dirty="0"/>
+              <a:t>Why ASP.NET MVC &amp; Why Not ASP.NET Web Forms ?</a:t>
+            </a:r>
+          </a:p>
+        </p:txBody>
+      </p:sp>
+      <p:sp>
+        <p:nvSpPr>
+          <p:cNvPr id="5" name="Text Placeholder 4"/>
+          <p:cNvSpPr>
+            <a:spLocks noGrp="1"/>
+          </p:cNvSpPr>
+          <p:nvPr>
+            <p:ph type="body" idx="1"/>
+          </p:nvPr>
+        </p:nvSpPr>
+        <p:spPr/>
+        <p:txBody>
+          <a:bodyPr/>
+          <a:lstStyle/>
+          <a:p>
+            <a:r>
+              <a:rPr lang="en-US" dirty="0" smtClean="0"/>
+              <a:t>ASP.NET Web Forms</a:t>
+            </a:r>
+            <a:endParaRPr lang="en-GB" dirty="0"/>
+          </a:p>
+        </p:txBody>
+      </p:sp>
+      <p:sp>
+        <p:nvSpPr>
+          <p:cNvPr id="6" name="Content Placeholder 5"/>
+          <p:cNvSpPr>
+            <a:spLocks noGrp="1"/>
+          </p:cNvSpPr>
+          <p:nvPr>
+            <p:ph sz="half" idx="2"/>
+          </p:nvPr>
+        </p:nvSpPr>
+        <p:spPr/>
+        <p:txBody>
+          <a:bodyPr/>
+          <a:lstStyle/>
+          <a:p>
+            <a:r>
+              <a:rPr lang="en-US" dirty="0" smtClean="0"/>
+              <a:t>Page Controller Pattern</a:t>
+            </a:r>
+          </a:p>
+          <a:p>
+            <a:r>
+              <a:rPr lang="en-US" dirty="0" smtClean="0"/>
+              <a:t>Tightly Coupled</a:t>
+            </a:r>
+          </a:p>
+          <a:p>
+            <a:r>
+              <a:rPr lang="en-US" dirty="0" smtClean="0"/>
+              <a:t>Automated Testing is difficult</a:t>
+            </a:r>
+          </a:p>
+          <a:p>
+            <a:r>
+              <a:rPr lang="en-US" dirty="0" err="1" smtClean="0"/>
+              <a:t>ViewState</a:t>
+            </a:r>
+            <a:endParaRPr lang="en-US" dirty="0" smtClean="0"/>
+          </a:p>
+          <a:p>
+            <a:r>
+              <a:rPr lang="en-US" dirty="0" smtClean="0"/>
+              <a:t>Limited control over HTML/CSS/JS</a:t>
+            </a:r>
+          </a:p>
+          <a:p>
+            <a:r>
+              <a:rPr lang="en-US" dirty="0" smtClean="0"/>
+              <a:t>Server Controls</a:t>
+            </a:r>
+          </a:p>
+          <a:p>
+            <a:endParaRPr lang="en-GB" dirty="0"/>
+          </a:p>
+        </p:txBody>
+      </p:sp>
+      <p:sp>
+        <p:nvSpPr>
+          <p:cNvPr id="7" name="Text Placeholder 6"/>
+          <p:cNvSpPr>
+            <a:spLocks noGrp="1"/>
+          </p:cNvSpPr>
+          <p:nvPr>
+            <p:ph type="body" sz="quarter" idx="3"/>
+          </p:nvPr>
+        </p:nvSpPr>
+        <p:spPr/>
+        <p:txBody>
+          <a:bodyPr/>
+          <a:lstStyle/>
+          <a:p>
+            <a:r>
+              <a:rPr lang="en-US" dirty="0" smtClean="0"/>
+              <a:t>ASP.NET MVC</a:t>
+            </a:r>
+            <a:endParaRPr lang="en-GB" dirty="0"/>
+          </a:p>
+        </p:txBody>
+      </p:sp>
+      <p:sp>
+        <p:nvSpPr>
+          <p:cNvPr id="8" name="Content Placeholder 7"/>
+          <p:cNvSpPr>
+            <a:spLocks noGrp="1"/>
+          </p:cNvSpPr>
+          <p:nvPr>
+            <p:ph sz="quarter" idx="4"/>
+          </p:nvPr>
+        </p:nvSpPr>
+        <p:spPr/>
+        <p:txBody>
+          <a:bodyPr/>
+          <a:lstStyle/>
+          <a:p>
+            <a:r>
+              <a:rPr lang="en-US" dirty="0" smtClean="0"/>
+              <a:t>Front Controller Pattern</a:t>
+            </a:r>
+          </a:p>
+          <a:p>
+            <a:r>
+              <a:rPr lang="en-US" dirty="0" smtClean="0"/>
+              <a:t>Loosely Coupled</a:t>
+            </a:r>
+          </a:p>
+          <a:p>
+            <a:r>
+              <a:rPr lang="en-US" dirty="0" smtClean="0"/>
+              <a:t>Easy to do Automated Testing</a:t>
+            </a:r>
+          </a:p>
+          <a:p>
+            <a:r>
+              <a:rPr lang="en-US" dirty="0" err="1" smtClean="0"/>
+              <a:t>ViewState</a:t>
+            </a:r>
+            <a:r>
+              <a:rPr lang="en-US" dirty="0" smtClean="0"/>
+              <a:t> is not available</a:t>
+            </a:r>
+          </a:p>
+          <a:p>
+            <a:r>
+              <a:rPr lang="en-US" dirty="0" smtClean="0"/>
+              <a:t>Full control </a:t>
+            </a:r>
+            <a:r>
+              <a:rPr lang="en-US" dirty="0"/>
+              <a:t>over HTML/CSS/JS</a:t>
+            </a:r>
+          </a:p>
+          <a:p>
+            <a:r>
+              <a:rPr lang="en-US" dirty="0" smtClean="0"/>
+              <a:t>HTML Helpers</a:t>
+            </a:r>
+            <a:endParaRPr lang="en-GB" dirty="0"/>
+          </a:p>
+        </p:txBody>
+      </p:sp>
+    </p:spTree>
+    <p:extLst>
+      <p:ext uri="{BB962C8B-B14F-4D97-AF65-F5344CB8AC3E}">
+        <p14:creationId xmlns:p14="http://schemas.microsoft.com/office/powerpoint/2010/main" val="709186148"/>
+      </p:ext>
+    </p:extLst>
+  </p:cSld>
+  <p:clrMapOvr>
+    <a:masterClrMapping/>
+  </p:clrMapOvr>
+</p:sld>
+</file>
+
+<file path=ppt/slides/slide7.xml><?xml version="1.0" encoding="utf-8"?>
 <p:sld xmlns:a="http://schemas.openxmlformats.org/drawingml/2006/main" xmlns:r="http://schemas.openxmlformats.org/officeDocument/2006/relationships" xmlns:p="http://schemas.openxmlformats.org/presentationml/2006/main">
   <p:cSld>
     <p:spTree>
@@ -14632,7 +15584,7 @@
 </p:sld>
 </file>
 
-<file path=ppt/slides/slide7.xml><?xml version="1.0" encoding="utf-8"?>
+<file path=ppt/slides/slide8.xml><?xml version="1.0" encoding="utf-8"?>
 <p:sld xmlns:a="http://schemas.openxmlformats.org/drawingml/2006/main" xmlns:r="http://schemas.openxmlformats.org/officeDocument/2006/relationships" xmlns:p="http://schemas.openxmlformats.org/presentationml/2006/main">
   <p:cSld>
     <p:spTree>
@@ -14919,85 +15871,6 @@
 </p:sld>
 </file>
 
-<file path=ppt/slides/slide8.xml><?xml version="1.0" encoding="utf-8"?>
-<p:sld xmlns:a="http://schemas.openxmlformats.org/drawingml/2006/main" xmlns:r="http://schemas.openxmlformats.org/officeDocument/2006/relationships" xmlns:p="http://schemas.openxmlformats.org/presentationml/2006/main">
-  <p:cSld>
-    <p:spTree>
-      <p:nvGrpSpPr>
-        <p:cNvPr id="1" name=""/>
-        <p:cNvGrpSpPr/>
-        <p:nvPr/>
-      </p:nvGrpSpPr>
-      <p:grpSpPr>
-        <a:xfrm>
-          <a:off x="0" y="0"/>
-          <a:ext cx="0" cy="0"/>
-          <a:chOff x="0" y="0"/>
-          <a:chExt cx="0" cy="0"/>
-        </a:xfrm>
-      </p:grpSpPr>
-      <p:sp>
-        <p:nvSpPr>
-          <p:cNvPr id="4" name="Title 3"/>
-          <p:cNvSpPr>
-            <a:spLocks noGrp="1"/>
-          </p:cNvSpPr>
-          <p:nvPr>
-            <p:ph type="title"/>
-          </p:nvPr>
-        </p:nvSpPr>
-        <p:spPr/>
-        <p:txBody>
-          <a:bodyPr/>
-          <a:lstStyle/>
-          <a:p>
-            <a:r>
-              <a:rPr lang="en-US" dirty="0" smtClean="0"/>
-              <a:t>QUESTIONS ???</a:t>
-            </a:r>
-            <a:endParaRPr lang="en-GB" dirty="0"/>
-          </a:p>
-        </p:txBody>
-      </p:sp>
-      <p:sp>
-        <p:nvSpPr>
-          <p:cNvPr id="5" name="Text Placeholder 4"/>
-          <p:cNvSpPr>
-            <a:spLocks noGrp="1"/>
-          </p:cNvSpPr>
-          <p:nvPr>
-            <p:ph type="body" idx="1"/>
-          </p:nvPr>
-        </p:nvSpPr>
-        <p:spPr/>
-        <p:txBody>
-          <a:bodyPr/>
-          <a:lstStyle/>
-          <a:p>
-            <a:endParaRPr lang="en-GB" dirty="0"/>
-          </a:p>
-        </p:txBody>
-      </p:sp>
-    </p:spTree>
-    <p:extLst>
-      <p:ext uri="{BB962C8B-B14F-4D97-AF65-F5344CB8AC3E}">
-        <p14:creationId xmlns:p14="http://schemas.microsoft.com/office/powerpoint/2010/main" val="1304889787"/>
-      </p:ext>
-    </p:extLst>
-  </p:cSld>
-  <p:clrMapOvr>
-    <a:masterClrMapping/>
-  </p:clrMapOvr>
-  <p:timing>
-    <p:tnLst>
-      <p:par>
-        <p:cTn id="1" dur="indefinite" restart="never" nodeType="tmRoot"/>
-      </p:par>
-    </p:tnLst>
-  </p:timing>
-</p:sld>
-</file>
-
 <file path=ppt/slides/slide9.xml><?xml version="1.0" encoding="utf-8"?>
 <p:sld xmlns:a="http://schemas.openxmlformats.org/drawingml/2006/main" xmlns:r="http://schemas.openxmlformats.org/officeDocument/2006/relationships" xmlns:p="http://schemas.openxmlformats.org/presentationml/2006/main">
   <p:cSld>
@@ -15017,7 +15890,7 @@
       </p:grpSpPr>
       <p:sp>
         <p:nvSpPr>
-          <p:cNvPr id="4" name="Title 3"/>
+          <p:cNvPr id="2" name="Title 1"/>
           <p:cNvSpPr>
             <a:spLocks noGrp="1"/>
           </p:cNvSpPr>
@@ -15032,7 +15905,7 @@
           <a:p>
             <a:r>
               <a:rPr lang="en-US" dirty="0" smtClean="0"/>
-              <a:t>THANK YOU</a:t>
+              <a:t>Tooling &amp; Setting up Environment </a:t>
             </a:r>
             <a:endParaRPr lang="en-GB" dirty="0"/>
           </a:p>
@@ -15040,12 +15913,12 @@
       </p:sp>
       <p:sp>
         <p:nvSpPr>
-          <p:cNvPr id="5" name="Text Placeholder 4"/>
+          <p:cNvPr id="3" name="Content Placeholder 2"/>
           <p:cNvSpPr>
             <a:spLocks noGrp="1"/>
           </p:cNvSpPr>
           <p:nvPr>
-            <p:ph type="body" idx="1"/>
+            <p:ph idx="1"/>
           </p:nvPr>
         </p:nvSpPr>
         <p:spPr/>
@@ -15053,10 +15926,33 @@
           <a:bodyPr/>
           <a:lstStyle/>
           <a:p>
+            <a:endParaRPr lang="en-US" dirty="0" smtClean="0"/>
+          </a:p>
+          <a:p>
             <a:r>
               <a:rPr lang="en-US" dirty="0" smtClean="0"/>
-              <a:t>AMAL DEV</a:t>
-            </a:r>
+              <a:t>Visual Studio Express 2013 for Web/Visual Studio Community 2013/Visual Studio Ultimate 2013</a:t>
+            </a:r>
+          </a:p>
+          <a:p>
+            <a:r>
+              <a:rPr lang="en-US" dirty="0" smtClean="0"/>
+              <a:t>.NET 4.5</a:t>
+            </a:r>
+          </a:p>
+          <a:p>
+            <a:r>
+              <a:rPr lang="en-US" dirty="0" smtClean="0"/>
+              <a:t>IIS(optional)</a:t>
+            </a:r>
+          </a:p>
+          <a:p>
+            <a:r>
+              <a:rPr lang="en-US" dirty="0" smtClean="0"/>
+              <a:t>Windows 7 or higher</a:t>
+            </a:r>
+          </a:p>
+          <a:p>
             <a:endParaRPr lang="en-GB" dirty="0"/>
           </a:p>
         </p:txBody>
@@ -15064,20 +15960,13 @@
     </p:spTree>
     <p:extLst>
       <p:ext uri="{BB962C8B-B14F-4D97-AF65-F5344CB8AC3E}">
-        <p14:creationId xmlns:p14="http://schemas.microsoft.com/office/powerpoint/2010/main" val="3145290803"/>
+        <p14:creationId xmlns:p14="http://schemas.microsoft.com/office/powerpoint/2010/main" val="3010627172"/>
       </p:ext>
     </p:extLst>
   </p:cSld>
   <p:clrMapOvr>
     <a:masterClrMapping/>
   </p:clrMapOvr>
-  <p:timing>
-    <p:tnLst>
-      <p:par>
-        <p:cTn id="1" dur="indefinite" restart="never" nodeType="tmRoot"/>
-      </p:par>
-    </p:tnLst>
-  </p:timing>
 </p:sld>
 </file>
 
@@ -15337,7 +16226,7 @@
   <a:extraClrSchemeLst/>
   <a:extLst>
     <a:ext uri="{05A4C25C-085E-4340-85A3-A5531E510DB2}">
-      <thm15:themeFamily xmlns:thm15="http://schemas.microsoft.com/office/thememl/2012/main" xmlns="" name="Banded" id="{98DFF888-2449-4D28-977C-6306C017633E}" vid="{9792607F-9579-4224-82FF-9C88C3E1E53D}"/>
+      <thm15:themeFamily xmlns="" xmlns:thm15="http://schemas.microsoft.com/office/thememl/2012/main" name="Banded" id="{98DFF888-2449-4D28-977C-6306C017633E}" vid="{9792607F-9579-4224-82FF-9C88C3E1E53D}"/>
     </a:ext>
   </a:extLst>
 </a:theme>

</xml_diff>